<commit_message>
fixed averaging kernel, made seasonal individual measurement comparison plots
</commit_message>
<xml_diff>
--- a/Midterm Presentation1.pptx
+++ b/Midterm Presentation1.pptx
@@ -2,29 +2,29 @@
 <file path=ppt/presentation.xml><?xml version="1.0" encoding="utf-8"?>
 <p:presentation xmlns:a="http://schemas.openxmlformats.org/drawingml/2006/main" xmlns:r="http://schemas.openxmlformats.org/officeDocument/2006/relationships" xmlns:p="http://schemas.openxmlformats.org/presentationml/2006/main" autoCompressPictures="0">
   <p:sldMasterIdLst>
-    <p:sldMasterId id="2147483696" r:id="rId4"/>
+    <p:sldMasterId id="2147483696" r:id="rId1"/>
   </p:sldMasterIdLst>
   <p:notesMasterIdLst>
-    <p:notesMasterId r:id="rId19"/>
+    <p:notesMasterId r:id="rId16"/>
   </p:notesMasterIdLst>
   <p:handoutMasterIdLst>
-    <p:handoutMasterId r:id="rId20"/>
+    <p:handoutMasterId r:id="rId17"/>
   </p:handoutMasterIdLst>
   <p:sldIdLst>
-    <p:sldId id="256" r:id="rId5"/>
-    <p:sldId id="285" r:id="rId6"/>
-    <p:sldId id="278" r:id="rId7"/>
-    <p:sldId id="284" r:id="rId8"/>
-    <p:sldId id="262" r:id="rId9"/>
-    <p:sldId id="265" r:id="rId10"/>
-    <p:sldId id="268" r:id="rId11"/>
-    <p:sldId id="267" r:id="rId12"/>
-    <p:sldId id="269" r:id="rId13"/>
-    <p:sldId id="273" r:id="rId14"/>
-    <p:sldId id="270" r:id="rId15"/>
-    <p:sldId id="279" r:id="rId16"/>
-    <p:sldId id="281" r:id="rId17"/>
-    <p:sldId id="282" r:id="rId18"/>
+    <p:sldId id="256" r:id="rId2"/>
+    <p:sldId id="285" r:id="rId3"/>
+    <p:sldId id="286" r:id="rId4"/>
+    <p:sldId id="278" r:id="rId5"/>
+    <p:sldId id="284" r:id="rId6"/>
+    <p:sldId id="262" r:id="rId7"/>
+    <p:sldId id="265" r:id="rId8"/>
+    <p:sldId id="268" r:id="rId9"/>
+    <p:sldId id="267" r:id="rId10"/>
+    <p:sldId id="269" r:id="rId11"/>
+    <p:sldId id="273" r:id="rId12"/>
+    <p:sldId id="270" r:id="rId13"/>
+    <p:sldId id="279" r:id="rId14"/>
+    <p:sldId id="281" r:id="rId15"/>
   </p:sldIdLst>
   <p:sldSz cx="12192000" cy="6858000"/>
   <p:notesSz cx="6858000" cy="9144000"/>
@@ -137,7 +137,7 @@
 <file path=ppt/revisionInfo.xml><?xml version="1.0" encoding="utf-8"?>
 <p1510:revInfo xmlns:a="http://schemas.openxmlformats.org/drawingml/2006/main" xmlns:r="http://schemas.openxmlformats.org/officeDocument/2006/relationships" xmlns:p1510="http://schemas.microsoft.com/office/powerpoint/2015/10/main">
   <p1510:revLst>
-    <p1510:client id="{5DBE52BC-2832-45EB-BD25-D170F535C554}" v="144" dt="2025-07-08T19:42:34.383"/>
+    <p1510:client id="{5DBE52BC-2832-45EB-BD25-D170F535C554}" v="279" dt="2025-07-08T22:37:06.385"/>
   </p1510:revLst>
 </p1510:revInfo>
 </file>
@@ -146,34 +146,637 @@
 <pc:chgInfo xmlns:a="http://schemas.openxmlformats.org/drawingml/2006/main" xmlns:r="http://schemas.openxmlformats.org/officeDocument/2006/relationships" xmlns:ac="http://schemas.microsoft.com/office/drawing/2013/main/command" xmlns:pc="http://schemas.microsoft.com/office/powerpoint/2013/main/command">
   <pc:docChgLst>
     <pc:chgData name="Sallam Saka" userId="f204d973-d51e-47d8-884c-bdcba18d93b4" providerId="ADAL" clId="{5DBE52BC-2832-45EB-BD25-D170F535C554}"/>
-    <pc:docChg chg="modMainMaster">
-      <pc:chgData name="Sallam Saka" userId="f204d973-d51e-47d8-884c-bdcba18d93b4" providerId="ADAL" clId="{5DBE52BC-2832-45EB-BD25-D170F535C554}" dt="2025-07-08T19:49:27.502" v="15"/>
+    <pc:docChg chg="undo redo custSel addSld delSld modSld sldOrd modMainMaster modNotesMaster">
+      <pc:chgData name="Sallam Saka" userId="f204d973-d51e-47d8-884c-bdcba18d93b4" providerId="ADAL" clId="{5DBE52BC-2832-45EB-BD25-D170F535C554}" dt="2025-07-14T00:56:10.146" v="4040" actId="20577"/>
       <pc:docMkLst>
         <pc:docMk/>
       </pc:docMkLst>
-      <pc:sldMasterChg chg="modSp modSldLayout">
-        <pc:chgData name="Sallam Saka" userId="f204d973-d51e-47d8-884c-bdcba18d93b4" providerId="ADAL" clId="{5DBE52BC-2832-45EB-BD25-D170F535C554}" dt="2025-07-08T19:49:27.502" v="15"/>
+      <pc:sldChg chg="addSp delSp modSp mod ord modNotesTx">
+        <pc:chgData name="Sallam Saka" userId="f204d973-d51e-47d8-884c-bdcba18d93b4" providerId="ADAL" clId="{5DBE52BC-2832-45EB-BD25-D170F535C554}" dt="2025-07-08T18:32:48.941" v="3328" actId="20577"/>
+        <pc:sldMkLst>
+          <pc:docMk/>
+          <pc:sldMk cId="1819153595" sldId="256"/>
+        </pc:sldMkLst>
+        <pc:spChg chg="mod">
+          <ac:chgData name="Sallam Saka" userId="f204d973-d51e-47d8-884c-bdcba18d93b4" providerId="ADAL" clId="{5DBE52BC-2832-45EB-BD25-D170F535C554}" dt="2025-07-07T20:03:51.268" v="2297" actId="1076"/>
+          <ac:spMkLst>
+            <pc:docMk/>
+            <pc:sldMk cId="1819153595" sldId="256"/>
+            <ac:spMk id="2" creationId="{430DC5FC-99E7-F610-5B6B-CB894B7D29FD}"/>
+          </ac:spMkLst>
+        </pc:spChg>
+        <pc:spChg chg="mod">
+          <ac:chgData name="Sallam Saka" userId="f204d973-d51e-47d8-884c-bdcba18d93b4" providerId="ADAL" clId="{5DBE52BC-2832-45EB-BD25-D170F535C554}" dt="2025-07-07T20:04:05.440" v="2300" actId="1076"/>
+          <ac:spMkLst>
+            <pc:docMk/>
+            <pc:sldMk cId="1819153595" sldId="256"/>
+            <ac:spMk id="3" creationId="{8CF238E7-8927-F72F-56BF-CED351C48FB3}"/>
+          </ac:spMkLst>
+        </pc:spChg>
+      </pc:sldChg>
+      <pc:sldChg chg="modSp del mod modNotesTx">
+        <pc:chgData name="Sallam Saka" userId="f204d973-d51e-47d8-884c-bdcba18d93b4" providerId="ADAL" clId="{5DBE52BC-2832-45EB-BD25-D170F535C554}" dt="2025-07-07T20:04:26.753" v="2301" actId="2696"/>
+        <pc:sldMkLst>
+          <pc:docMk/>
+          <pc:sldMk cId="3996344196" sldId="257"/>
+        </pc:sldMkLst>
+      </pc:sldChg>
+      <pc:sldChg chg="del">
+        <pc:chgData name="Sallam Saka" userId="f204d973-d51e-47d8-884c-bdcba18d93b4" providerId="ADAL" clId="{5DBE52BC-2832-45EB-BD25-D170F535C554}" dt="2025-07-04T20:11:19.421" v="240" actId="2696"/>
+        <pc:sldMkLst>
+          <pc:docMk/>
+          <pc:sldMk cId="3785794011" sldId="258"/>
+        </pc:sldMkLst>
+      </pc:sldChg>
+      <pc:sldChg chg="modSp del mod modNotesTx">
+        <pc:chgData name="Sallam Saka" userId="f204d973-d51e-47d8-884c-bdcba18d93b4" providerId="ADAL" clId="{5DBE52BC-2832-45EB-BD25-D170F535C554}" dt="2025-07-08T15:43:07.791" v="3104" actId="2696"/>
+        <pc:sldMkLst>
+          <pc:docMk/>
+          <pc:sldMk cId="326719808" sldId="259"/>
+        </pc:sldMkLst>
+      </pc:sldChg>
+      <pc:sldChg chg="del">
+        <pc:chgData name="Sallam Saka" userId="f204d973-d51e-47d8-884c-bdcba18d93b4" providerId="ADAL" clId="{5DBE52BC-2832-45EB-BD25-D170F535C554}" dt="2025-07-05T18:12:16.093" v="258" actId="2696"/>
+        <pc:sldMkLst>
+          <pc:docMk/>
+          <pc:sldMk cId="3115839712" sldId="260"/>
+        </pc:sldMkLst>
+      </pc:sldChg>
+      <pc:sldChg chg="add del">
+        <pc:chgData name="Sallam Saka" userId="f204d973-d51e-47d8-884c-bdcba18d93b4" providerId="ADAL" clId="{5DBE52BC-2832-45EB-BD25-D170F535C554}" dt="2025-07-04T20:10:41.814" v="239" actId="47"/>
+        <pc:sldMkLst>
+          <pc:docMk/>
+          <pc:sldMk cId="1698663498" sldId="261"/>
+        </pc:sldMkLst>
+      </pc:sldChg>
+      <pc:sldChg chg="addSp modSp mod ord modNotesTx">
+        <pc:chgData name="Sallam Saka" userId="f204d973-d51e-47d8-884c-bdcba18d93b4" providerId="ADAL" clId="{5DBE52BC-2832-45EB-BD25-D170F535C554}" dt="2025-07-08T20:25:18.684" v="3766" actId="20577"/>
+        <pc:sldMkLst>
+          <pc:docMk/>
+          <pc:sldMk cId="1720524664" sldId="262"/>
+        </pc:sldMkLst>
+        <pc:spChg chg="mod">
+          <ac:chgData name="Sallam Saka" userId="f204d973-d51e-47d8-884c-bdcba18d93b4" providerId="ADAL" clId="{5DBE52BC-2832-45EB-BD25-D170F535C554}" dt="2025-07-08T20:25:18.684" v="3766" actId="20577"/>
+          <ac:spMkLst>
+            <pc:docMk/>
+            <pc:sldMk cId="1720524664" sldId="262"/>
+            <ac:spMk id="2" creationId="{4E1D867A-3907-26F3-B77B-2E6213623970}"/>
+          </ac:spMkLst>
+        </pc:spChg>
+        <pc:spChg chg="mod">
+          <ac:chgData name="Sallam Saka" userId="f204d973-d51e-47d8-884c-bdcba18d93b4" providerId="ADAL" clId="{5DBE52BC-2832-45EB-BD25-D170F535C554}" dt="2025-07-08T20:25:13.693" v="3760" actId="1076"/>
+          <ac:spMkLst>
+            <pc:docMk/>
+            <pc:sldMk cId="1720524664" sldId="262"/>
+            <ac:spMk id="3" creationId="{EBD5F899-0003-11DD-8D27-1542F1D54871}"/>
+          </ac:spMkLst>
+        </pc:spChg>
+        <pc:spChg chg="mod">
+          <ac:chgData name="Sallam Saka" userId="f204d973-d51e-47d8-884c-bdcba18d93b4" providerId="ADAL" clId="{5DBE52BC-2832-45EB-BD25-D170F535C554}" dt="2025-07-07T16:10:00.820" v="1037" actId="1076"/>
+          <ac:spMkLst>
+            <pc:docMk/>
+            <pc:sldMk cId="1720524664" sldId="262"/>
+            <ac:spMk id="4" creationId="{6F5125E3-CA90-5995-4C23-D4F6B9782029}"/>
+          </ac:spMkLst>
+        </pc:spChg>
+        <pc:picChg chg="add mod">
+          <ac:chgData name="Sallam Saka" userId="f204d973-d51e-47d8-884c-bdcba18d93b4" providerId="ADAL" clId="{5DBE52BC-2832-45EB-BD25-D170F535C554}" dt="2025-07-08T20:25:16.087" v="3761" actId="1076"/>
+          <ac:picMkLst>
+            <pc:docMk/>
+            <pc:sldMk cId="1720524664" sldId="262"/>
+            <ac:picMk id="3074" creationId="{EDF2E7ED-F233-7A83-F262-5198EE1AD896}"/>
+          </ac:picMkLst>
+        </pc:picChg>
+      </pc:sldChg>
+      <pc:sldChg chg="addSp delSp modSp del mod setBg addAnim delAnim modNotesTx">
+        <pc:chgData name="Sallam Saka" userId="f204d973-d51e-47d8-884c-bdcba18d93b4" providerId="ADAL" clId="{5DBE52BC-2832-45EB-BD25-D170F535C554}" dt="2025-07-07T20:26:28.564" v="2422" actId="47"/>
+        <pc:sldMkLst>
+          <pc:docMk/>
+          <pc:sldMk cId="1802762808" sldId="263"/>
+        </pc:sldMkLst>
+      </pc:sldChg>
+      <pc:sldChg chg="del ord">
+        <pc:chgData name="Sallam Saka" userId="f204d973-d51e-47d8-884c-bdcba18d93b4" providerId="ADAL" clId="{5DBE52BC-2832-45EB-BD25-D170F535C554}" dt="2025-07-05T18:17:38.110" v="347" actId="2696"/>
+        <pc:sldMkLst>
+          <pc:docMk/>
+          <pc:sldMk cId="3022207675" sldId="264"/>
+        </pc:sldMkLst>
+      </pc:sldChg>
+      <pc:sldChg chg="addSp delSp modSp mod ord modNotesTx">
+        <pc:chgData name="Sallam Saka" userId="f204d973-d51e-47d8-884c-bdcba18d93b4" providerId="ADAL" clId="{5DBE52BC-2832-45EB-BD25-D170F535C554}" dt="2025-07-08T18:33:00.913" v="3331" actId="20577"/>
+        <pc:sldMkLst>
+          <pc:docMk/>
+          <pc:sldMk cId="787353098" sldId="265"/>
+        </pc:sldMkLst>
+        <pc:picChg chg="mod">
+          <ac:chgData name="Sallam Saka" userId="f204d973-d51e-47d8-884c-bdcba18d93b4" providerId="ADAL" clId="{5DBE52BC-2832-45EB-BD25-D170F535C554}" dt="2025-07-08T16:19:54.691" v="3188" actId="1076"/>
+          <ac:picMkLst>
+            <pc:docMk/>
+            <pc:sldMk cId="787353098" sldId="265"/>
+            <ac:picMk id="10" creationId="{AE605676-4273-BBEE-A5F9-B82B5EF126E7}"/>
+          </ac:picMkLst>
+        </pc:picChg>
+      </pc:sldChg>
+      <pc:sldChg chg="addSp delSp modSp add del mod ord setBg addAnim">
+        <pc:chgData name="Sallam Saka" userId="f204d973-d51e-47d8-884c-bdcba18d93b4" providerId="ADAL" clId="{5DBE52BC-2832-45EB-BD25-D170F535C554}" dt="2025-07-07T16:19:18.140" v="1106" actId="47"/>
+        <pc:sldMkLst>
+          <pc:docMk/>
+          <pc:sldMk cId="2635246491" sldId="266"/>
+        </pc:sldMkLst>
+      </pc:sldChg>
+      <pc:sldChg chg="modSp mod modNotesTx">
+        <pc:chgData name="Sallam Saka" userId="f204d973-d51e-47d8-884c-bdcba18d93b4" providerId="ADAL" clId="{5DBE52BC-2832-45EB-BD25-D170F535C554}" dt="2025-07-14T00:56:10.146" v="4040" actId="20577"/>
+        <pc:sldMkLst>
+          <pc:docMk/>
+          <pc:sldMk cId="56333691" sldId="267"/>
+        </pc:sldMkLst>
+        <pc:spChg chg="mod">
+          <ac:chgData name="Sallam Saka" userId="f204d973-d51e-47d8-884c-bdcba18d93b4" providerId="ADAL" clId="{5DBE52BC-2832-45EB-BD25-D170F535C554}" dt="2025-07-08T14:52:24.770" v="2807" actId="1076"/>
+          <ac:spMkLst>
+            <pc:docMk/>
+            <pc:sldMk cId="56333691" sldId="267"/>
+            <ac:spMk id="2" creationId="{B1E33F58-D219-71B0-899C-AC64DA4EA566}"/>
+          </ac:spMkLst>
+        </pc:spChg>
+        <pc:spChg chg="mod">
+          <ac:chgData name="Sallam Saka" userId="f204d973-d51e-47d8-884c-bdcba18d93b4" providerId="ADAL" clId="{5DBE52BC-2832-45EB-BD25-D170F535C554}" dt="2025-07-14T00:56:10.146" v="4040" actId="20577"/>
+          <ac:spMkLst>
+            <pc:docMk/>
+            <pc:sldMk cId="56333691" sldId="267"/>
+            <ac:spMk id="3" creationId="{02701640-DD03-C95C-2123-D0E1D90D0B9C}"/>
+          </ac:spMkLst>
+        </pc:spChg>
+      </pc:sldChg>
+      <pc:sldChg chg="addSp delSp modSp mod ord modNotesTx">
+        <pc:chgData name="Sallam Saka" userId="f204d973-d51e-47d8-884c-bdcba18d93b4" providerId="ADAL" clId="{5DBE52BC-2832-45EB-BD25-D170F535C554}" dt="2025-07-14T00:55:08.933" v="4039" actId="27309"/>
+        <pc:sldMkLst>
+          <pc:docMk/>
+          <pc:sldMk cId="3182023264" sldId="268"/>
+        </pc:sldMkLst>
+        <pc:grpChg chg="add mod">
+          <ac:chgData name="Sallam Saka" userId="f204d973-d51e-47d8-884c-bdcba18d93b4" providerId="ADAL" clId="{5DBE52BC-2832-45EB-BD25-D170F535C554}" dt="2025-07-08T16:24:26.403" v="3210" actId="164"/>
+          <ac:grpSpMkLst>
+            <pc:docMk/>
+            <pc:sldMk cId="3182023264" sldId="268"/>
+            <ac:grpSpMk id="2" creationId="{007641A3-CA04-0766-4D4F-1507CC438358}"/>
+          </ac:grpSpMkLst>
+        </pc:grpChg>
+        <pc:grpChg chg="add mod">
+          <ac:chgData name="Sallam Saka" userId="f204d973-d51e-47d8-884c-bdcba18d93b4" providerId="ADAL" clId="{5DBE52BC-2832-45EB-BD25-D170F535C554}" dt="2025-07-08T16:24:30.457" v="3211" actId="164"/>
+          <ac:grpSpMkLst>
+            <pc:docMk/>
+            <pc:sldMk cId="3182023264" sldId="268"/>
+            <ac:grpSpMk id="4" creationId="{A627D9BA-E1F1-72EE-9594-07EFD89DE4D9}"/>
+          </ac:grpSpMkLst>
+        </pc:grpChg>
+        <pc:graphicFrameChg chg="add del modGraphic">
+          <ac:chgData name="Sallam Saka" userId="f204d973-d51e-47d8-884c-bdcba18d93b4" providerId="ADAL" clId="{5DBE52BC-2832-45EB-BD25-D170F535C554}" dt="2025-07-14T00:55:08.933" v="4039" actId="27309"/>
+          <ac:graphicFrameMkLst>
+            <pc:docMk/>
+            <pc:sldMk cId="3182023264" sldId="268"/>
+            <ac:graphicFrameMk id="7" creationId="{94DBA0EC-1FFD-9C82-E374-8F95B2DD7F28}"/>
+          </ac:graphicFrameMkLst>
+        </pc:graphicFrameChg>
+        <pc:picChg chg="mod topLvl modCrop">
+          <ac:chgData name="Sallam Saka" userId="f204d973-d51e-47d8-884c-bdcba18d93b4" providerId="ADAL" clId="{5DBE52BC-2832-45EB-BD25-D170F535C554}" dt="2025-07-08T16:24:26.403" v="3210" actId="164"/>
+          <ac:picMkLst>
+            <pc:docMk/>
+            <pc:sldMk cId="3182023264" sldId="268"/>
+            <ac:picMk id="3" creationId="{AAC26FC4-6B54-E547-8ADB-6F910639DE07}"/>
+          </ac:picMkLst>
+        </pc:picChg>
+        <pc:picChg chg="mod topLvl">
+          <ac:chgData name="Sallam Saka" userId="f204d973-d51e-47d8-884c-bdcba18d93b4" providerId="ADAL" clId="{5DBE52BC-2832-45EB-BD25-D170F535C554}" dt="2025-07-08T16:24:26.403" v="3210" actId="164"/>
+          <ac:picMkLst>
+            <pc:docMk/>
+            <pc:sldMk cId="3182023264" sldId="268"/>
+            <ac:picMk id="10" creationId="{9C27173B-FD9E-8CB7-8DEA-3C5EC4D86E94}"/>
+          </ac:picMkLst>
+        </pc:picChg>
+        <pc:picChg chg="mod topLvl">
+          <ac:chgData name="Sallam Saka" userId="f204d973-d51e-47d8-884c-bdcba18d93b4" providerId="ADAL" clId="{5DBE52BC-2832-45EB-BD25-D170F535C554}" dt="2025-07-08T16:24:30.457" v="3211" actId="164"/>
+          <ac:picMkLst>
+            <pc:docMk/>
+            <pc:sldMk cId="3182023264" sldId="268"/>
+            <ac:picMk id="12" creationId="{A0EFA2B7-40BF-6436-EF9F-7C8F3BF9E922}"/>
+          </ac:picMkLst>
+        </pc:picChg>
+        <pc:picChg chg="mod topLvl modCrop">
+          <ac:chgData name="Sallam Saka" userId="f204d973-d51e-47d8-884c-bdcba18d93b4" providerId="ADAL" clId="{5DBE52BC-2832-45EB-BD25-D170F535C554}" dt="2025-07-08T16:24:30.457" v="3211" actId="164"/>
+          <ac:picMkLst>
+            <pc:docMk/>
+            <pc:sldMk cId="3182023264" sldId="268"/>
+            <ac:picMk id="15" creationId="{E59250D2-47E6-4188-F8EF-9ACA62700943}"/>
+          </ac:picMkLst>
+        </pc:picChg>
+      </pc:sldChg>
+      <pc:sldChg chg="addSp delSp modSp mod modNotesTx">
+        <pc:chgData name="Sallam Saka" userId="f204d973-d51e-47d8-884c-bdcba18d93b4" providerId="ADAL" clId="{5DBE52BC-2832-45EB-BD25-D170F535C554}" dt="2025-07-07T18:54:05.556" v="1930" actId="14100"/>
+        <pc:sldMkLst>
+          <pc:docMk/>
+          <pc:sldMk cId="3966488039" sldId="269"/>
+        </pc:sldMkLst>
+        <pc:spChg chg="add mod">
+          <ac:chgData name="Sallam Saka" userId="f204d973-d51e-47d8-884c-bdcba18d93b4" providerId="ADAL" clId="{5DBE52BC-2832-45EB-BD25-D170F535C554}" dt="2025-07-07T16:24:42.944" v="1256" actId="20577"/>
+          <ac:spMkLst>
+            <pc:docMk/>
+            <pc:sldMk cId="3966488039" sldId="269"/>
+            <ac:spMk id="15" creationId="{E28340B0-E310-B2EF-EFC4-0A93876FE4E2}"/>
+          </ac:spMkLst>
+        </pc:spChg>
+        <pc:picChg chg="add mod">
+          <ac:chgData name="Sallam Saka" userId="f204d973-d51e-47d8-884c-bdcba18d93b4" providerId="ADAL" clId="{5DBE52BC-2832-45EB-BD25-D170F535C554}" dt="2025-07-07T18:54:05.556" v="1930" actId="14100"/>
+          <ac:picMkLst>
+            <pc:docMk/>
+            <pc:sldMk cId="3966488039" sldId="269"/>
+            <ac:picMk id="4" creationId="{3B75B243-0D6F-0E75-F6C9-53AC15AC1C72}"/>
+          </ac:picMkLst>
+        </pc:picChg>
+        <pc:picChg chg="add mod ord">
+          <ac:chgData name="Sallam Saka" userId="f204d973-d51e-47d8-884c-bdcba18d93b4" providerId="ADAL" clId="{5DBE52BC-2832-45EB-BD25-D170F535C554}" dt="2025-07-07T16:24:03.710" v="1211" actId="14100"/>
+          <ac:picMkLst>
+            <pc:docMk/>
+            <pc:sldMk cId="3966488039" sldId="269"/>
+            <ac:picMk id="9" creationId="{8A3EF694-355E-630E-17A6-A6D209B233FA}"/>
+          </ac:picMkLst>
+        </pc:picChg>
+        <pc:picChg chg="add mod">
+          <ac:chgData name="Sallam Saka" userId="f204d973-d51e-47d8-884c-bdcba18d93b4" providerId="ADAL" clId="{5DBE52BC-2832-45EB-BD25-D170F535C554}" dt="2025-07-07T16:24:27.191" v="1218" actId="1076"/>
+          <ac:picMkLst>
+            <pc:docMk/>
+            <pc:sldMk cId="3966488039" sldId="269"/>
+            <ac:picMk id="14" creationId="{3FCE4965-ABD8-6ED4-A23D-B4ED60437C6A}"/>
+          </ac:picMkLst>
+        </pc:picChg>
+        <pc:cxnChg chg="mod ord">
+          <ac:chgData name="Sallam Saka" userId="f204d973-d51e-47d8-884c-bdcba18d93b4" providerId="ADAL" clId="{5DBE52BC-2832-45EB-BD25-D170F535C554}" dt="2025-07-07T16:24:08.889" v="1213" actId="14100"/>
+          <ac:cxnSpMkLst>
+            <pc:docMk/>
+            <pc:sldMk cId="3966488039" sldId="269"/>
+            <ac:cxnSpMk id="5" creationId="{DE1713F3-A061-02C9-BA8F-ABA4E84356C4}"/>
+          </ac:cxnSpMkLst>
+        </pc:cxnChg>
+        <pc:cxnChg chg="mod ord">
+          <ac:chgData name="Sallam Saka" userId="f204d973-d51e-47d8-884c-bdcba18d93b4" providerId="ADAL" clId="{5DBE52BC-2832-45EB-BD25-D170F535C554}" dt="2025-07-07T16:24:05.829" v="1212" actId="1076"/>
+          <ac:cxnSpMkLst>
+            <pc:docMk/>
+            <pc:sldMk cId="3966488039" sldId="269"/>
+            <ac:cxnSpMk id="8" creationId="{E2668E73-A410-0AC3-C4A7-CBE128CAAAEC}"/>
+          </ac:cxnSpMkLst>
+        </pc:cxnChg>
+      </pc:sldChg>
+      <pc:sldChg chg="modSp mod ord modNotesTx">
+        <pc:chgData name="Sallam Saka" userId="f204d973-d51e-47d8-884c-bdcba18d93b4" providerId="ADAL" clId="{5DBE52BC-2832-45EB-BD25-D170F535C554}" dt="2025-07-08T20:31:42.030" v="3786" actId="20577"/>
+        <pc:sldMkLst>
+          <pc:docMk/>
+          <pc:sldMk cId="1793765436" sldId="270"/>
+        </pc:sldMkLst>
+        <pc:spChg chg="mod">
+          <ac:chgData name="Sallam Saka" userId="f204d973-d51e-47d8-884c-bdcba18d93b4" providerId="ADAL" clId="{5DBE52BC-2832-45EB-BD25-D170F535C554}" dt="2025-07-08T18:19:28.437" v="3302" actId="20577"/>
+          <ac:spMkLst>
+            <pc:docMk/>
+            <pc:sldMk cId="1793765436" sldId="270"/>
+            <ac:spMk id="2" creationId="{A46EB721-D92D-34D3-1523-E5F037A6470F}"/>
+          </ac:spMkLst>
+        </pc:spChg>
+        <pc:spChg chg="mod">
+          <ac:chgData name="Sallam Saka" userId="f204d973-d51e-47d8-884c-bdcba18d93b4" providerId="ADAL" clId="{5DBE52BC-2832-45EB-BD25-D170F535C554}" dt="2025-07-08T20:31:42.030" v="3786" actId="20577"/>
+          <ac:spMkLst>
+            <pc:docMk/>
+            <pc:sldMk cId="1793765436" sldId="270"/>
+            <ac:spMk id="3" creationId="{E8F051E9-66DD-440A-1D1A-45960DC18F3F}"/>
+          </ac:spMkLst>
+        </pc:spChg>
+      </pc:sldChg>
+      <pc:sldChg chg="modSp del mod">
+        <pc:chgData name="Sallam Saka" userId="f204d973-d51e-47d8-884c-bdcba18d93b4" providerId="ADAL" clId="{5DBE52BC-2832-45EB-BD25-D170F535C554}" dt="2025-07-05T18:27:26.400" v="488" actId="47"/>
+        <pc:sldMkLst>
+          <pc:docMk/>
+          <pc:sldMk cId="4023663782" sldId="272"/>
+        </pc:sldMkLst>
+      </pc:sldChg>
+      <pc:sldChg chg="addSp delSp modSp mod ord setBg">
+        <pc:chgData name="Sallam Saka" userId="f204d973-d51e-47d8-884c-bdcba18d93b4" providerId="ADAL" clId="{5DBE52BC-2832-45EB-BD25-D170F535C554}" dt="2025-07-07T16:24:50.219" v="1262" actId="20577"/>
+        <pc:sldMkLst>
+          <pc:docMk/>
+          <pc:sldMk cId="451837092" sldId="273"/>
+        </pc:sldMkLst>
+        <pc:spChg chg="add mod">
+          <ac:chgData name="Sallam Saka" userId="f204d973-d51e-47d8-884c-bdcba18d93b4" providerId="ADAL" clId="{5DBE52BC-2832-45EB-BD25-D170F535C554}" dt="2025-07-07T16:24:50.219" v="1262" actId="20577"/>
+          <ac:spMkLst>
+            <pc:docMk/>
+            <pc:sldMk cId="451837092" sldId="273"/>
+            <ac:spMk id="22" creationId="{59AA2443-BA16-212A-CDD3-A6C8FD6DE5F3}"/>
+          </ac:spMkLst>
+        </pc:spChg>
+        <pc:picChg chg="add mod">
+          <ac:chgData name="Sallam Saka" userId="f204d973-d51e-47d8-884c-bdcba18d93b4" providerId="ADAL" clId="{5DBE52BC-2832-45EB-BD25-D170F535C554}" dt="2025-07-07T16:21:15.580" v="1129" actId="14100"/>
+          <ac:picMkLst>
+            <pc:docMk/>
+            <pc:sldMk cId="451837092" sldId="273"/>
+            <ac:picMk id="6" creationId="{E2AA9225-6C81-33FC-B432-E87DB2DCF45D}"/>
+          </ac:picMkLst>
+        </pc:picChg>
+        <pc:picChg chg="add mod">
+          <ac:chgData name="Sallam Saka" userId="f204d973-d51e-47d8-884c-bdcba18d93b4" providerId="ADAL" clId="{5DBE52BC-2832-45EB-BD25-D170F535C554}" dt="2025-07-07T16:21:11.127" v="1128" actId="14100"/>
+          <ac:picMkLst>
+            <pc:docMk/>
+            <pc:sldMk cId="451837092" sldId="273"/>
+            <ac:picMk id="10" creationId="{8A361848-9779-15F3-AFE0-C52BC993E917}"/>
+          </ac:picMkLst>
+        </pc:picChg>
+        <pc:picChg chg="add mod">
+          <ac:chgData name="Sallam Saka" userId="f204d973-d51e-47d8-884c-bdcba18d93b4" providerId="ADAL" clId="{5DBE52BC-2832-45EB-BD25-D170F535C554}" dt="2025-07-07T16:22:05.200" v="1147" actId="1076"/>
+          <ac:picMkLst>
+            <pc:docMk/>
+            <pc:sldMk cId="451837092" sldId="273"/>
+            <ac:picMk id="18" creationId="{FA6568F6-6103-B9AE-5EC4-0DF64D167DA5}"/>
+          </ac:picMkLst>
+        </pc:picChg>
+        <pc:cxnChg chg="add mod">
+          <ac:chgData name="Sallam Saka" userId="f204d973-d51e-47d8-884c-bdcba18d93b4" providerId="ADAL" clId="{5DBE52BC-2832-45EB-BD25-D170F535C554}" dt="2025-07-07T16:21:21.874" v="1131" actId="14100"/>
+          <ac:cxnSpMkLst>
+            <pc:docMk/>
+            <pc:sldMk cId="451837092" sldId="273"/>
+            <ac:cxnSpMk id="11" creationId="{68D2F5B4-B82A-BF75-487D-37A7FF59EB48}"/>
+          </ac:cxnSpMkLst>
+        </pc:cxnChg>
+        <pc:cxnChg chg="add mod">
+          <ac:chgData name="Sallam Saka" userId="f204d973-d51e-47d8-884c-bdcba18d93b4" providerId="ADAL" clId="{5DBE52BC-2832-45EB-BD25-D170F535C554}" dt="2025-07-07T16:21:17.446" v="1130" actId="1076"/>
+          <ac:cxnSpMkLst>
+            <pc:docMk/>
+            <pc:sldMk cId="451837092" sldId="273"/>
+            <ac:cxnSpMk id="13" creationId="{48EF5E12-0950-0CA8-D2E8-7A0E2548FC40}"/>
+          </ac:cxnSpMkLst>
+        </pc:cxnChg>
+      </pc:sldChg>
+      <pc:sldChg chg="addSp delSp modSp del mod ord modNotesTx">
+        <pc:chgData name="Sallam Saka" userId="f204d973-d51e-47d8-884c-bdcba18d93b4" providerId="ADAL" clId="{5DBE52BC-2832-45EB-BD25-D170F535C554}" dt="2025-07-07T16:25:03.310" v="1263" actId="47"/>
+        <pc:sldMkLst>
+          <pc:docMk/>
+          <pc:sldMk cId="1457128146" sldId="274"/>
+        </pc:sldMkLst>
+      </pc:sldChg>
+      <pc:sldChg chg="addSp delSp modSp add del mod ord">
+        <pc:chgData name="Sallam Saka" userId="f204d973-d51e-47d8-884c-bdcba18d93b4" providerId="ADAL" clId="{5DBE52BC-2832-45EB-BD25-D170F535C554}" dt="2025-07-07T16:23:50.261" v="1209" actId="47"/>
+        <pc:sldMkLst>
+          <pc:docMk/>
+          <pc:sldMk cId="722023237" sldId="276"/>
+        </pc:sldMkLst>
+      </pc:sldChg>
+      <pc:sldChg chg="modSp new del mod ord">
+        <pc:chgData name="Sallam Saka" userId="f204d973-d51e-47d8-884c-bdcba18d93b4" providerId="ADAL" clId="{5DBE52BC-2832-45EB-BD25-D170F535C554}" dt="2025-07-04T20:10:26.965" v="236" actId="47"/>
+        <pc:sldMkLst>
+          <pc:docMk/>
+          <pc:sldMk cId="1642170144" sldId="277"/>
+        </pc:sldMkLst>
+      </pc:sldChg>
+      <pc:sldChg chg="addSp delSp modSp new mod delAnim modAnim modNotesTx">
+        <pc:chgData name="Sallam Saka" userId="f204d973-d51e-47d8-884c-bdcba18d93b4" providerId="ADAL" clId="{5DBE52BC-2832-45EB-BD25-D170F535C554}" dt="2025-07-08T22:34:19.030" v="4005" actId="14100"/>
+        <pc:sldMkLst>
+          <pc:docMk/>
+          <pc:sldMk cId="2912614909" sldId="278"/>
+        </pc:sldMkLst>
+        <pc:spChg chg="mod">
+          <ac:chgData name="Sallam Saka" userId="f204d973-d51e-47d8-884c-bdcba18d93b4" providerId="ADAL" clId="{5DBE52BC-2832-45EB-BD25-D170F535C554}" dt="2025-07-08T20:18:52.842" v="3522" actId="27636"/>
+          <ac:spMkLst>
+            <pc:docMk/>
+            <pc:sldMk cId="2912614909" sldId="278"/>
+            <ac:spMk id="6" creationId="{076FD1D5-ADF9-A5A0-2D6D-67A642FB2732}"/>
+          </ac:spMkLst>
+        </pc:spChg>
+        <pc:spChg chg="add mod">
+          <ac:chgData name="Sallam Saka" userId="f204d973-d51e-47d8-884c-bdcba18d93b4" providerId="ADAL" clId="{5DBE52BC-2832-45EB-BD25-D170F535C554}" dt="2025-07-08T22:34:19.030" v="4005" actId="14100"/>
+          <ac:spMkLst>
+            <pc:docMk/>
+            <pc:sldMk cId="2912614909" sldId="278"/>
+            <ac:spMk id="8" creationId="{B6BF4284-63C2-20CD-37D1-05B105E8FB44}"/>
+          </ac:spMkLst>
+        </pc:spChg>
+        <pc:spChg chg="add mod">
+          <ac:chgData name="Sallam Saka" userId="f204d973-d51e-47d8-884c-bdcba18d93b4" providerId="ADAL" clId="{5DBE52BC-2832-45EB-BD25-D170F535C554}" dt="2025-07-08T20:31:56.591" v="3788"/>
+          <ac:spMkLst>
+            <pc:docMk/>
+            <pc:sldMk cId="2912614909" sldId="278"/>
+            <ac:spMk id="9" creationId="{81059460-38A7-518E-729A-475741608166}"/>
+          </ac:spMkLst>
+        </pc:spChg>
+        <pc:picChg chg="add mod">
+          <ac:chgData name="Sallam Saka" userId="f204d973-d51e-47d8-884c-bdcba18d93b4" providerId="ADAL" clId="{5DBE52BC-2832-45EB-BD25-D170F535C554}" dt="2025-07-08T20:29:28.202" v="3772" actId="14100"/>
+          <ac:picMkLst>
+            <pc:docMk/>
+            <pc:sldMk cId="2912614909" sldId="278"/>
+            <ac:picMk id="1026" creationId="{C4847228-8927-11DF-FC85-341791184E72}"/>
+          </ac:picMkLst>
+        </pc:picChg>
+        <pc:picChg chg="add mod">
+          <ac:chgData name="Sallam Saka" userId="f204d973-d51e-47d8-884c-bdcba18d93b4" providerId="ADAL" clId="{5DBE52BC-2832-45EB-BD25-D170F535C554}" dt="2025-07-08T14:21:20.229" v="2633" actId="14100"/>
+          <ac:picMkLst>
+            <pc:docMk/>
+            <pc:sldMk cId="2912614909" sldId="278"/>
+            <ac:picMk id="1028" creationId="{984F6E6F-3690-7F88-120B-007AA4B38AA0}"/>
+          </ac:picMkLst>
+        </pc:picChg>
+      </pc:sldChg>
+      <pc:sldChg chg="modSp new mod">
+        <pc:chgData name="Sallam Saka" userId="f204d973-d51e-47d8-884c-bdcba18d93b4" providerId="ADAL" clId="{5DBE52BC-2832-45EB-BD25-D170F535C554}" dt="2025-07-08T20:32:01.626" v="3795" actId="27636"/>
+        <pc:sldMkLst>
+          <pc:docMk/>
+          <pc:sldMk cId="2411064901" sldId="279"/>
+        </pc:sldMkLst>
+        <pc:spChg chg="mod">
+          <ac:chgData name="Sallam Saka" userId="f204d973-d51e-47d8-884c-bdcba18d93b4" providerId="ADAL" clId="{5DBE52BC-2832-45EB-BD25-D170F535C554}" dt="2025-07-07T16:09:38.013" v="1035" actId="20577"/>
+          <ac:spMkLst>
+            <pc:docMk/>
+            <pc:sldMk cId="2411064901" sldId="279"/>
+            <ac:spMk id="2" creationId="{9AED7EEF-3EAD-4323-D1D0-514916978476}"/>
+          </ac:spMkLst>
+        </pc:spChg>
+        <pc:spChg chg="mod">
+          <ac:chgData name="Sallam Saka" userId="f204d973-d51e-47d8-884c-bdcba18d93b4" providerId="ADAL" clId="{5DBE52BC-2832-45EB-BD25-D170F535C554}" dt="2025-07-08T20:32:01.626" v="3795" actId="27636"/>
+          <ac:spMkLst>
+            <pc:docMk/>
+            <pc:sldMk cId="2411064901" sldId="279"/>
+            <ac:spMk id="3" creationId="{DD633D91-DEDF-B4D2-1CD9-4F683EF72FDA}"/>
+          </ac:spMkLst>
+        </pc:spChg>
+      </pc:sldChg>
+      <pc:sldChg chg="new del">
+        <pc:chgData name="Sallam Saka" userId="f204d973-d51e-47d8-884c-bdcba18d93b4" providerId="ADAL" clId="{5DBE52BC-2832-45EB-BD25-D170F535C554}" dt="2025-07-07T16:19:36.746" v="1109" actId="2696"/>
+        <pc:sldMkLst>
+          <pc:docMk/>
+          <pc:sldMk cId="2773819253" sldId="280"/>
+        </pc:sldMkLst>
+      </pc:sldChg>
+      <pc:sldChg chg="addSp delSp modSp new mod setBg addAnim delAnim setClrOvrMap">
+        <pc:chgData name="Sallam Saka" userId="f204d973-d51e-47d8-884c-bdcba18d93b4" providerId="ADAL" clId="{5DBE52BC-2832-45EB-BD25-D170F535C554}" dt="2025-07-07T16:15:45.667" v="1069" actId="478"/>
+        <pc:sldMkLst>
+          <pc:docMk/>
+          <pc:sldMk cId="3024117669" sldId="281"/>
+        </pc:sldMkLst>
+        <pc:spChg chg="mod">
+          <ac:chgData name="Sallam Saka" userId="f204d973-d51e-47d8-884c-bdcba18d93b4" providerId="ADAL" clId="{5DBE52BC-2832-45EB-BD25-D170F535C554}" dt="2025-07-07T16:15:38.866" v="1067" actId="26606"/>
+          <ac:spMkLst>
+            <pc:docMk/>
+            <pc:sldMk cId="3024117669" sldId="281"/>
+            <ac:spMk id="2" creationId="{0D63B405-EE22-71A7-5D2C-8E18BF262FA0}"/>
+          </ac:spMkLst>
+        </pc:spChg>
+        <pc:picChg chg="add">
+          <ac:chgData name="Sallam Saka" userId="f204d973-d51e-47d8-884c-bdcba18d93b4" providerId="ADAL" clId="{5DBE52BC-2832-45EB-BD25-D170F535C554}" dt="2025-07-07T16:15:38.866" v="1067" actId="26606"/>
+          <ac:picMkLst>
+            <pc:docMk/>
+            <pc:sldMk cId="3024117669" sldId="281"/>
+            <ac:picMk id="15" creationId="{17456338-DC03-6278-DA37-6EA5AC0D963C}"/>
+          </ac:picMkLst>
+        </pc:picChg>
+      </pc:sldChg>
+      <pc:sldChg chg="addSp delSp modSp new del mod setBg addAnim">
+        <pc:chgData name="Sallam Saka" userId="f204d973-d51e-47d8-884c-bdcba18d93b4" providerId="ADAL" clId="{5DBE52BC-2832-45EB-BD25-D170F535C554}" dt="2025-07-08T20:44:15.713" v="3796" actId="2696"/>
+        <pc:sldMkLst>
+          <pc:docMk/>
+          <pc:sldMk cId="3589351187" sldId="282"/>
+        </pc:sldMkLst>
+      </pc:sldChg>
+      <pc:sldChg chg="addSp delSp modSp new del mod setBg">
+        <pc:chgData name="Sallam Saka" userId="f204d973-d51e-47d8-884c-bdcba18d93b4" providerId="ADAL" clId="{5DBE52BC-2832-45EB-BD25-D170F535C554}" dt="2025-07-07T20:26:28.564" v="2422" actId="47"/>
+        <pc:sldMkLst>
+          <pc:docMk/>
+          <pc:sldMk cId="745284860" sldId="283"/>
+        </pc:sldMkLst>
+      </pc:sldChg>
+      <pc:sldChg chg="addSp delSp modSp add mod modAnim modNotesTx">
+        <pc:chgData name="Sallam Saka" userId="f204d973-d51e-47d8-884c-bdcba18d93b4" providerId="ADAL" clId="{5DBE52BC-2832-45EB-BD25-D170F535C554}" dt="2025-07-08T20:23:46.714" v="3640" actId="20577"/>
+        <pc:sldMkLst>
+          <pc:docMk/>
+          <pc:sldMk cId="2974313499" sldId="284"/>
+        </pc:sldMkLst>
+        <pc:spChg chg="mod">
+          <ac:chgData name="Sallam Saka" userId="f204d973-d51e-47d8-884c-bdcba18d93b4" providerId="ADAL" clId="{5DBE52BC-2832-45EB-BD25-D170F535C554}" dt="2025-07-08T20:21:38.915" v="3563" actId="21"/>
+          <ac:spMkLst>
+            <pc:docMk/>
+            <pc:sldMk cId="2974313499" sldId="284"/>
+            <ac:spMk id="6" creationId="{A6A620A8-54C5-D872-CEC8-4F98A076FB29}"/>
+          </ac:spMkLst>
+        </pc:spChg>
+        <pc:spChg chg="mod">
+          <ac:chgData name="Sallam Saka" userId="f204d973-d51e-47d8-884c-bdcba18d93b4" providerId="ADAL" clId="{5DBE52BC-2832-45EB-BD25-D170F535C554}" dt="2025-07-07T20:25:17.508" v="2414" actId="20577"/>
+          <ac:spMkLst>
+            <pc:docMk/>
+            <pc:sldMk cId="2974313499" sldId="284"/>
+            <ac:spMk id="9" creationId="{F48B2727-1E43-9D79-FFA2-008E136D4548}"/>
+          </ac:spMkLst>
+        </pc:spChg>
+        <pc:spChg chg="mod">
+          <ac:chgData name="Sallam Saka" userId="f204d973-d51e-47d8-884c-bdcba18d93b4" providerId="ADAL" clId="{5DBE52BC-2832-45EB-BD25-D170F535C554}" dt="2025-07-08T20:23:46.714" v="3640" actId="20577"/>
+          <ac:spMkLst>
+            <pc:docMk/>
+            <pc:sldMk cId="2974313499" sldId="284"/>
+            <ac:spMk id="10" creationId="{F16CC0CD-7F5F-1C0C-70B0-6D73ACCDB09B}"/>
+          </ac:spMkLst>
+        </pc:spChg>
+        <pc:picChg chg="add mod ord">
+          <ac:chgData name="Sallam Saka" userId="f204d973-d51e-47d8-884c-bdcba18d93b4" providerId="ADAL" clId="{5DBE52BC-2832-45EB-BD25-D170F535C554}" dt="2025-07-08T14:25:22.625" v="2661" actId="1076"/>
+          <ac:picMkLst>
+            <pc:docMk/>
+            <pc:sldMk cId="2974313499" sldId="284"/>
+            <ac:picMk id="12" creationId="{0160FFAF-697E-BC1E-079B-8908A2D7CE68}"/>
+          </ac:picMkLst>
+        </pc:picChg>
+        <pc:picChg chg="add mod">
+          <ac:chgData name="Sallam Saka" userId="f204d973-d51e-47d8-884c-bdcba18d93b4" providerId="ADAL" clId="{5DBE52BC-2832-45EB-BD25-D170F535C554}" dt="2025-07-08T14:25:19.478" v="2660" actId="14100"/>
+          <ac:picMkLst>
+            <pc:docMk/>
+            <pc:sldMk cId="2974313499" sldId="284"/>
+            <ac:picMk id="2050" creationId="{F6A8AE43-A449-102F-22D3-DEA3A389D083}"/>
+          </ac:picMkLst>
+        </pc:picChg>
+      </pc:sldChg>
+      <pc:sldChg chg="addSp delSp modSp new mod ord">
+        <pc:chgData name="Sallam Saka" userId="f204d973-d51e-47d8-884c-bdcba18d93b4" providerId="ADAL" clId="{5DBE52BC-2832-45EB-BD25-D170F535C554}" dt="2025-07-14T00:50:11.604" v="4037" actId="20577"/>
+        <pc:sldMkLst>
+          <pc:docMk/>
+          <pc:sldMk cId="1079714986" sldId="285"/>
+        </pc:sldMkLst>
+        <pc:spChg chg="mod">
+          <ac:chgData name="Sallam Saka" userId="f204d973-d51e-47d8-884c-bdcba18d93b4" providerId="ADAL" clId="{5DBE52BC-2832-45EB-BD25-D170F535C554}" dt="2025-07-08T22:36:56.975" v="4034" actId="1076"/>
+          <ac:spMkLst>
+            <pc:docMk/>
+            <pc:sldMk cId="1079714986" sldId="285"/>
+            <ac:spMk id="2" creationId="{56DC2101-D8A7-6912-B670-F86B2C978954}"/>
+          </ac:spMkLst>
+        </pc:spChg>
+        <pc:spChg chg="add del mod">
+          <ac:chgData name="Sallam Saka" userId="f204d973-d51e-47d8-884c-bdcba18d93b4" providerId="ADAL" clId="{5DBE52BC-2832-45EB-BD25-D170F535C554}" dt="2025-07-14T00:50:11.604" v="4037" actId="20577"/>
+          <ac:spMkLst>
+            <pc:docMk/>
+            <pc:sldMk cId="1079714986" sldId="285"/>
+            <ac:spMk id="3" creationId="{6BBC4F44-BB9D-1B23-4C90-5DE1EE0C4544}"/>
+          </ac:spMkLst>
+        </pc:spChg>
+        <pc:spChg chg="add mod">
+          <ac:chgData name="Sallam Saka" userId="f204d973-d51e-47d8-884c-bdcba18d93b4" providerId="ADAL" clId="{5DBE52BC-2832-45EB-BD25-D170F535C554}" dt="2025-07-08T18:25:28.278" v="3324" actId="20577"/>
+          <ac:spMkLst>
+            <pc:docMk/>
+            <pc:sldMk cId="1079714986" sldId="285"/>
+            <ac:spMk id="6" creationId="{FFFF6C52-A863-76EC-9CE9-3C4283AB5008}"/>
+          </ac:spMkLst>
+        </pc:spChg>
+        <pc:picChg chg="add mod">
+          <ac:chgData name="Sallam Saka" userId="f204d973-d51e-47d8-884c-bdcba18d93b4" providerId="ADAL" clId="{5DBE52BC-2832-45EB-BD25-D170F535C554}" dt="2025-07-08T22:37:06.385" v="4035" actId="1076"/>
+          <ac:picMkLst>
+            <pc:docMk/>
+            <pc:sldMk cId="1079714986" sldId="285"/>
+            <ac:picMk id="2052" creationId="{678F91E5-A562-C561-02EB-A5ECC49372ED}"/>
+          </ac:picMkLst>
+        </pc:picChg>
+      </pc:sldChg>
+      <pc:sldChg chg="modSp new mod">
+        <pc:chgData name="Sallam Saka" userId="f204d973-d51e-47d8-884c-bdcba18d93b4" providerId="ADAL" clId="{5DBE52BC-2832-45EB-BD25-D170F535C554}" dt="2025-07-08T22:38:15.193" v="4036" actId="20577"/>
+        <pc:sldMkLst>
+          <pc:docMk/>
+          <pc:sldMk cId="399888809" sldId="286"/>
+        </pc:sldMkLst>
+        <pc:spChg chg="mod">
+          <ac:chgData name="Sallam Saka" userId="f204d973-d51e-47d8-884c-bdcba18d93b4" providerId="ADAL" clId="{5DBE52BC-2832-45EB-BD25-D170F535C554}" dt="2025-07-08T22:38:15.193" v="4036" actId="20577"/>
+          <ac:spMkLst>
+            <pc:docMk/>
+            <pc:sldMk cId="399888809" sldId="286"/>
+            <ac:spMk id="2" creationId="{CEC6DA5D-7A7F-12D2-3EFF-397D03162119}"/>
+          </ac:spMkLst>
+        </pc:spChg>
+        <pc:spChg chg="mod">
+          <ac:chgData name="Sallam Saka" userId="f204d973-d51e-47d8-884c-bdcba18d93b4" providerId="ADAL" clId="{5DBE52BC-2832-45EB-BD25-D170F535C554}" dt="2025-07-08T22:26:55.050" v="3911" actId="14100"/>
+          <ac:spMkLst>
+            <pc:docMk/>
+            <pc:sldMk cId="399888809" sldId="286"/>
+            <ac:spMk id="3" creationId="{88F6A081-0FE9-9A3F-5569-1E3E41852AF4}"/>
+          </ac:spMkLst>
+        </pc:spChg>
+      </pc:sldChg>
+      <pc:sldMasterChg chg="modSp mod modSldLayout">
+        <pc:chgData name="Sallam Saka" userId="f204d973-d51e-47d8-884c-bdcba18d93b4" providerId="ADAL" clId="{5DBE52BC-2832-45EB-BD25-D170F535C554}" dt="2025-07-08T20:13:01.012" v="3381" actId="1076"/>
         <pc:sldMasterMkLst>
           <pc:docMk/>
           <pc:sldMasterMk cId="0" sldId="2147483696"/>
         </pc:sldMasterMkLst>
         <pc:spChg chg="mod">
-          <ac:chgData name="Sallam Saka" userId="f204d973-d51e-47d8-884c-bdcba18d93b4" providerId="ADAL" clId="{5DBE52BC-2832-45EB-BD25-D170F535C554}" dt="2025-07-08T19:49:27.486" v="1"/>
+          <ac:chgData name="Sallam Saka" userId="f204d973-d51e-47d8-884c-bdcba18d93b4" providerId="ADAL" clId="{5DBE52BC-2832-45EB-BD25-D170F535C554}" dt="2025-07-08T20:11:44.007" v="3370" actId="1076"/>
           <ac:spMkLst>
             <pc:docMk/>
             <pc:sldMasterMk cId="0" sldId="2147483696"/>
             <ac:spMk id="6" creationId="{00000000-0000-0000-0000-000000000000}"/>
           </ac:spMkLst>
         </pc:spChg>
-        <pc:sldLayoutChg chg="modSp">
-          <pc:chgData name="Sallam Saka" userId="f204d973-d51e-47d8-884c-bdcba18d93b4" providerId="ADAL" clId="{5DBE52BC-2832-45EB-BD25-D170F535C554}" dt="2025-07-08T19:49:27.486" v="3"/>
+        <pc:sldLayoutChg chg="modSp mod">
+          <pc:chgData name="Sallam Saka" userId="f204d973-d51e-47d8-884c-bdcba18d93b4" providerId="ADAL" clId="{5DBE52BC-2832-45EB-BD25-D170F535C554}" dt="2025-07-08T20:12:03.490" v="3371" actId="1076"/>
           <pc:sldLayoutMkLst>
             <pc:docMk/>
             <pc:sldMasterMk cId="0" sldId="2147483696"/>
             <pc:sldLayoutMk cId="0" sldId="2147483697"/>
           </pc:sldLayoutMkLst>
           <pc:spChg chg="mod">
-            <ac:chgData name="Sallam Saka" userId="f204d973-d51e-47d8-884c-bdcba18d93b4" providerId="ADAL" clId="{5DBE52BC-2832-45EB-BD25-D170F535C554}" dt="2025-07-08T19:49:27.486" v="3"/>
+            <ac:chgData name="Sallam Saka" userId="f204d973-d51e-47d8-884c-bdcba18d93b4" providerId="ADAL" clId="{5DBE52BC-2832-45EB-BD25-D170F535C554}" dt="2025-07-08T20:12:03.490" v="3371" actId="1076"/>
             <ac:spMkLst>
               <pc:docMk/>
               <pc:sldMasterMk cId="0" sldId="2147483696"/>
@@ -182,15 +785,15 @@
             </ac:spMkLst>
           </pc:spChg>
         </pc:sldLayoutChg>
-        <pc:sldLayoutChg chg="modSp">
-          <pc:chgData name="Sallam Saka" userId="f204d973-d51e-47d8-884c-bdcba18d93b4" providerId="ADAL" clId="{5DBE52BC-2832-45EB-BD25-D170F535C554}" dt="2025-07-08T19:49:27.486" v="5"/>
+        <pc:sldLayoutChg chg="modSp mod">
+          <pc:chgData name="Sallam Saka" userId="f204d973-d51e-47d8-884c-bdcba18d93b4" providerId="ADAL" clId="{5DBE52BC-2832-45EB-BD25-D170F535C554}" dt="2025-07-08T20:12:09.977" v="3372" actId="1076"/>
           <pc:sldLayoutMkLst>
             <pc:docMk/>
             <pc:sldMasterMk cId="0" sldId="2147483696"/>
             <pc:sldLayoutMk cId="0" sldId="2147483698"/>
           </pc:sldLayoutMkLst>
           <pc:spChg chg="mod">
-            <ac:chgData name="Sallam Saka" userId="f204d973-d51e-47d8-884c-bdcba18d93b4" providerId="ADAL" clId="{5DBE52BC-2832-45EB-BD25-D170F535C554}" dt="2025-07-08T19:49:27.486" v="5"/>
+            <ac:chgData name="Sallam Saka" userId="f204d973-d51e-47d8-884c-bdcba18d93b4" providerId="ADAL" clId="{5DBE52BC-2832-45EB-BD25-D170F535C554}" dt="2025-07-08T20:12:09.977" v="3372" actId="1076"/>
             <ac:spMkLst>
               <pc:docMk/>
               <pc:sldMasterMk cId="0" sldId="2147483696"/>
@@ -199,15 +802,15 @@
             </ac:spMkLst>
           </pc:spChg>
         </pc:sldLayoutChg>
-        <pc:sldLayoutChg chg="modSp">
-          <pc:chgData name="Sallam Saka" userId="f204d973-d51e-47d8-884c-bdcba18d93b4" providerId="ADAL" clId="{5DBE52BC-2832-45EB-BD25-D170F535C554}" dt="2025-07-08T19:49:27.502" v="7"/>
+        <pc:sldLayoutChg chg="modSp mod">
+          <pc:chgData name="Sallam Saka" userId="f204d973-d51e-47d8-884c-bdcba18d93b4" providerId="ADAL" clId="{5DBE52BC-2832-45EB-BD25-D170F535C554}" dt="2025-07-08T20:12:16.204" v="3373" actId="1076"/>
           <pc:sldLayoutMkLst>
             <pc:docMk/>
             <pc:sldMasterMk cId="0" sldId="2147483696"/>
             <pc:sldLayoutMk cId="0" sldId="2147483699"/>
           </pc:sldLayoutMkLst>
           <pc:spChg chg="mod">
-            <ac:chgData name="Sallam Saka" userId="f204d973-d51e-47d8-884c-bdcba18d93b4" providerId="ADAL" clId="{5DBE52BC-2832-45EB-BD25-D170F535C554}" dt="2025-07-08T19:49:27.502" v="7"/>
+            <ac:chgData name="Sallam Saka" userId="f204d973-d51e-47d8-884c-bdcba18d93b4" providerId="ADAL" clId="{5DBE52BC-2832-45EB-BD25-D170F535C554}" dt="2025-07-08T20:12:16.204" v="3373" actId="1076"/>
             <ac:spMkLst>
               <pc:docMk/>
               <pc:sldMasterMk cId="0" sldId="2147483696"/>
@@ -216,15 +819,15 @@
             </ac:spMkLst>
           </pc:spChg>
         </pc:sldLayoutChg>
-        <pc:sldLayoutChg chg="modSp">
-          <pc:chgData name="Sallam Saka" userId="f204d973-d51e-47d8-884c-bdcba18d93b4" providerId="ADAL" clId="{5DBE52BC-2832-45EB-BD25-D170F535C554}" dt="2025-07-08T19:49:27.502" v="9"/>
+        <pc:sldLayoutChg chg="modSp mod">
+          <pc:chgData name="Sallam Saka" userId="f204d973-d51e-47d8-884c-bdcba18d93b4" providerId="ADAL" clId="{5DBE52BC-2832-45EB-BD25-D170F535C554}" dt="2025-07-08T20:12:22.954" v="3374" actId="1076"/>
           <pc:sldLayoutMkLst>
             <pc:docMk/>
             <pc:sldMasterMk cId="0" sldId="2147483696"/>
             <pc:sldLayoutMk cId="0" sldId="2147483700"/>
           </pc:sldLayoutMkLst>
           <pc:spChg chg="mod">
-            <ac:chgData name="Sallam Saka" userId="f204d973-d51e-47d8-884c-bdcba18d93b4" providerId="ADAL" clId="{5DBE52BC-2832-45EB-BD25-D170F535C554}" dt="2025-07-08T19:49:27.502" v="9"/>
+            <ac:chgData name="Sallam Saka" userId="f204d973-d51e-47d8-884c-bdcba18d93b4" providerId="ADAL" clId="{5DBE52BC-2832-45EB-BD25-D170F535C554}" dt="2025-07-08T20:12:22.954" v="3374" actId="1076"/>
             <ac:spMkLst>
               <pc:docMk/>
               <pc:sldMasterMk cId="0" sldId="2147483696"/>
@@ -233,15 +836,15 @@
             </ac:spMkLst>
           </pc:spChg>
         </pc:sldLayoutChg>
-        <pc:sldLayoutChg chg="modSp">
-          <pc:chgData name="Sallam Saka" userId="f204d973-d51e-47d8-884c-bdcba18d93b4" providerId="ADAL" clId="{5DBE52BC-2832-45EB-BD25-D170F535C554}" dt="2025-07-08T19:49:27.502" v="11"/>
+        <pc:sldLayoutChg chg="modSp mod">
+          <pc:chgData name="Sallam Saka" userId="f204d973-d51e-47d8-884c-bdcba18d93b4" providerId="ADAL" clId="{5DBE52BC-2832-45EB-BD25-D170F535C554}" dt="2025-07-08T20:12:29.397" v="3375" actId="1076"/>
           <pc:sldLayoutMkLst>
             <pc:docMk/>
             <pc:sldMasterMk cId="0" sldId="2147483696"/>
             <pc:sldLayoutMk cId="0" sldId="2147483701"/>
           </pc:sldLayoutMkLst>
           <pc:spChg chg="mod">
-            <ac:chgData name="Sallam Saka" userId="f204d973-d51e-47d8-884c-bdcba18d93b4" providerId="ADAL" clId="{5DBE52BC-2832-45EB-BD25-D170F535C554}" dt="2025-07-08T19:49:27.502" v="11"/>
+            <ac:chgData name="Sallam Saka" userId="f204d973-d51e-47d8-884c-bdcba18d93b4" providerId="ADAL" clId="{5DBE52BC-2832-45EB-BD25-D170F535C554}" dt="2025-07-08T20:12:29.397" v="3375" actId="1076"/>
             <ac:spMkLst>
               <pc:docMk/>
               <pc:sldMasterMk cId="0" sldId="2147483696"/>
@@ -250,15 +853,15 @@
             </ac:spMkLst>
           </pc:spChg>
         </pc:sldLayoutChg>
-        <pc:sldLayoutChg chg="modSp">
-          <pc:chgData name="Sallam Saka" userId="f204d973-d51e-47d8-884c-bdcba18d93b4" providerId="ADAL" clId="{5DBE52BC-2832-45EB-BD25-D170F535C554}" dt="2025-07-08T19:49:27.502" v="13"/>
+        <pc:sldLayoutChg chg="modSp mod">
+          <pc:chgData name="Sallam Saka" userId="f204d973-d51e-47d8-884c-bdcba18d93b4" providerId="ADAL" clId="{5DBE52BC-2832-45EB-BD25-D170F535C554}" dt="2025-07-08T20:12:35.022" v="3376" actId="1076"/>
           <pc:sldLayoutMkLst>
             <pc:docMk/>
             <pc:sldMasterMk cId="0" sldId="2147483696"/>
             <pc:sldLayoutMk cId="0" sldId="2147483702"/>
           </pc:sldLayoutMkLst>
           <pc:spChg chg="mod">
-            <ac:chgData name="Sallam Saka" userId="f204d973-d51e-47d8-884c-bdcba18d93b4" providerId="ADAL" clId="{5DBE52BC-2832-45EB-BD25-D170F535C554}" dt="2025-07-08T19:49:27.502" v="13"/>
+            <ac:chgData name="Sallam Saka" userId="f204d973-d51e-47d8-884c-bdcba18d93b4" providerId="ADAL" clId="{5DBE52BC-2832-45EB-BD25-D170F535C554}" dt="2025-07-08T20:12:35.022" v="3376" actId="1076"/>
             <ac:spMkLst>
               <pc:docMk/>
               <pc:sldMasterMk cId="0" sldId="2147483696"/>
@@ -267,20 +870,88 @@
             </ac:spMkLst>
           </pc:spChg>
         </pc:sldLayoutChg>
-        <pc:sldLayoutChg chg="modSp">
-          <pc:chgData name="Sallam Saka" userId="f204d973-d51e-47d8-884c-bdcba18d93b4" providerId="ADAL" clId="{5DBE52BC-2832-45EB-BD25-D170F535C554}" dt="2025-07-08T19:49:27.502" v="15"/>
+        <pc:sldLayoutChg chg="modSp mod">
+          <pc:chgData name="Sallam Saka" userId="f204d973-d51e-47d8-884c-bdcba18d93b4" providerId="ADAL" clId="{5DBE52BC-2832-45EB-BD25-D170F535C554}" dt="2025-07-08T20:12:39.894" v="3377" actId="1076"/>
           <pc:sldLayoutMkLst>
             <pc:docMk/>
             <pc:sldMasterMk cId="0" sldId="2147483696"/>
             <pc:sldLayoutMk cId="0" sldId="2147483703"/>
           </pc:sldLayoutMkLst>
           <pc:spChg chg="mod">
-            <ac:chgData name="Sallam Saka" userId="f204d973-d51e-47d8-884c-bdcba18d93b4" providerId="ADAL" clId="{5DBE52BC-2832-45EB-BD25-D170F535C554}" dt="2025-07-08T19:49:27.502" v="15"/>
+            <ac:chgData name="Sallam Saka" userId="f204d973-d51e-47d8-884c-bdcba18d93b4" providerId="ADAL" clId="{5DBE52BC-2832-45EB-BD25-D170F535C554}" dt="2025-07-08T20:12:39.894" v="3377" actId="1076"/>
             <ac:spMkLst>
               <pc:docMk/>
               <pc:sldMasterMk cId="0" sldId="2147483696"/>
               <pc:sldLayoutMk cId="0" sldId="2147483703"/>
               <ac:spMk id="4" creationId="{00000000-0000-0000-0000-000000000000}"/>
+            </ac:spMkLst>
+          </pc:spChg>
+        </pc:sldLayoutChg>
+        <pc:sldLayoutChg chg="modSp mod">
+          <pc:chgData name="Sallam Saka" userId="f204d973-d51e-47d8-884c-bdcba18d93b4" providerId="ADAL" clId="{5DBE52BC-2832-45EB-BD25-D170F535C554}" dt="2025-07-08T20:12:47.271" v="3378" actId="1076"/>
+          <pc:sldLayoutMkLst>
+            <pc:docMk/>
+            <pc:sldMasterMk cId="0" sldId="2147483696"/>
+            <pc:sldLayoutMk cId="0" sldId="2147483704"/>
+          </pc:sldLayoutMkLst>
+          <pc:spChg chg="mod">
+            <ac:chgData name="Sallam Saka" userId="f204d973-d51e-47d8-884c-bdcba18d93b4" providerId="ADAL" clId="{5DBE52BC-2832-45EB-BD25-D170F535C554}" dt="2025-07-08T20:12:47.271" v="3378" actId="1076"/>
+            <ac:spMkLst>
+              <pc:docMk/>
+              <pc:sldMasterMk cId="0" sldId="2147483696"/>
+              <pc:sldLayoutMk cId="0" sldId="2147483704"/>
+              <ac:spMk id="11" creationId="{00000000-0000-0000-0000-000000000000}"/>
+            </ac:spMkLst>
+          </pc:spChg>
+        </pc:sldLayoutChg>
+        <pc:sldLayoutChg chg="modSp mod">
+          <pc:chgData name="Sallam Saka" userId="f204d973-d51e-47d8-884c-bdcba18d93b4" providerId="ADAL" clId="{5DBE52BC-2832-45EB-BD25-D170F535C554}" dt="2025-07-08T20:12:52.239" v="3379" actId="1076"/>
+          <pc:sldLayoutMkLst>
+            <pc:docMk/>
+            <pc:sldMasterMk cId="0" sldId="2147483696"/>
+            <pc:sldLayoutMk cId="0" sldId="2147483705"/>
+          </pc:sldLayoutMkLst>
+          <pc:spChg chg="mod">
+            <ac:chgData name="Sallam Saka" userId="f204d973-d51e-47d8-884c-bdcba18d93b4" providerId="ADAL" clId="{5DBE52BC-2832-45EB-BD25-D170F535C554}" dt="2025-07-08T20:12:52.239" v="3379" actId="1076"/>
+            <ac:spMkLst>
+              <pc:docMk/>
+              <pc:sldMasterMk cId="0" sldId="2147483696"/>
+              <pc:sldLayoutMk cId="0" sldId="2147483705"/>
+              <ac:spMk id="10" creationId="{00000000-0000-0000-0000-000000000000}"/>
+            </ac:spMkLst>
+          </pc:spChg>
+        </pc:sldLayoutChg>
+        <pc:sldLayoutChg chg="modSp mod">
+          <pc:chgData name="Sallam Saka" userId="f204d973-d51e-47d8-884c-bdcba18d93b4" providerId="ADAL" clId="{5DBE52BC-2832-45EB-BD25-D170F535C554}" dt="2025-07-08T20:12:56.310" v="3380" actId="1076"/>
+          <pc:sldLayoutMkLst>
+            <pc:docMk/>
+            <pc:sldMasterMk cId="0" sldId="2147483696"/>
+            <pc:sldLayoutMk cId="0" sldId="2147483706"/>
+          </pc:sldLayoutMkLst>
+          <pc:spChg chg="mod">
+            <ac:chgData name="Sallam Saka" userId="f204d973-d51e-47d8-884c-bdcba18d93b4" providerId="ADAL" clId="{5DBE52BC-2832-45EB-BD25-D170F535C554}" dt="2025-07-08T20:12:56.310" v="3380" actId="1076"/>
+            <ac:spMkLst>
+              <pc:docMk/>
+              <pc:sldMasterMk cId="0" sldId="2147483696"/>
+              <pc:sldLayoutMk cId="0" sldId="2147483706"/>
+              <ac:spMk id="6" creationId="{00000000-0000-0000-0000-000000000000}"/>
+            </ac:spMkLst>
+          </pc:spChg>
+        </pc:sldLayoutChg>
+        <pc:sldLayoutChg chg="modSp mod">
+          <pc:chgData name="Sallam Saka" userId="f204d973-d51e-47d8-884c-bdcba18d93b4" providerId="ADAL" clId="{5DBE52BC-2832-45EB-BD25-D170F535C554}" dt="2025-07-08T20:13:01.012" v="3381" actId="1076"/>
+          <pc:sldLayoutMkLst>
+            <pc:docMk/>
+            <pc:sldMasterMk cId="0" sldId="2147483696"/>
+            <pc:sldLayoutMk cId="0" sldId="2147483707"/>
+          </pc:sldLayoutMkLst>
+          <pc:spChg chg="mod">
+            <ac:chgData name="Sallam Saka" userId="f204d973-d51e-47d8-884c-bdcba18d93b4" providerId="ADAL" clId="{5DBE52BC-2832-45EB-BD25-D170F535C554}" dt="2025-07-08T20:13:01.012" v="3381" actId="1076"/>
+            <ac:spMkLst>
+              <pc:docMk/>
+              <pc:sldMasterMk cId="0" sldId="2147483696"/>
+              <pc:sldLayoutMk cId="0" sldId="2147483707"/>
+              <ac:spMk id="6" creationId="{00000000-0000-0000-0000-000000000000}"/>
             </ac:spMkLst>
           </pc:spChg>
         </pc:sldLayoutChg>
@@ -384,7 +1055,7 @@
           <a:p>
             <a:fld id="{4B933C30-B7E7-4080-9C70-75AC29AD909E}" type="datetimeFigureOut">
               <a:rPr lang="en-CA" smtClean="0"/>
-              <a:t>2025-07-08</a:t>
+              <a:t>2025-07-13</a:t>
             </a:fld>
             <a:endParaRPr lang="en-CA"/>
           </a:p>
@@ -561,7 +1232,7 @@
           <a:p>
             <a:fld id="{9EC6EA57-E00F-4EA4-8324-57F699D5F3BD}" type="datetimeFigureOut">
               <a:rPr lang="en-CA" smtClean="0"/>
-              <a:t>2025-07-08</a:t>
+              <a:t>2025-07-13</a:t>
             </a:fld>
             <a:endParaRPr lang="en-CA"/>
           </a:p>
@@ -978,7 +1649,7 @@
           <a:p>
             <a:fld id="{8B41CBF8-1438-49AC-8524-04FF51CA9B3F}" type="slidenum">
               <a:rPr lang="en-CA" smtClean="0"/>
-              <a:t>11</a:t>
+              <a:t>12</a:t>
             </a:fld>
             <a:endParaRPr lang="en-CA"/>
           </a:p>
@@ -1163,7 +1834,7 @@
           <a:p>
             <a:fld id="{8B41CBF8-1438-49AC-8524-04FF51CA9B3F}" type="slidenum">
               <a:rPr lang="en-CA" smtClean="0"/>
-              <a:t>3</a:t>
+              <a:t>4</a:t>
             </a:fld>
             <a:endParaRPr lang="en-CA"/>
           </a:p>
@@ -1288,7 +1959,7 @@
           <a:p>
             <a:fld id="{8B41CBF8-1438-49AC-8524-04FF51CA9B3F}" type="slidenum">
               <a:rPr lang="en-CA" smtClean="0"/>
-              <a:t>4</a:t>
+              <a:t>5</a:t>
             </a:fld>
             <a:endParaRPr lang="en-CA"/>
           </a:p>
@@ -1372,7 +2043,7 @@
           <a:p>
             <a:fld id="{8B41CBF8-1438-49AC-8524-04FF51CA9B3F}" type="slidenum">
               <a:rPr lang="en-CA" smtClean="0"/>
-              <a:t>5</a:t>
+              <a:t>6</a:t>
             </a:fld>
             <a:endParaRPr lang="en-CA"/>
           </a:p>
@@ -1456,7 +2127,7 @@
           <a:p>
             <a:fld id="{8B41CBF8-1438-49AC-8524-04FF51CA9B3F}" type="slidenum">
               <a:rPr lang="en-CA" smtClean="0"/>
-              <a:t>6</a:t>
+              <a:t>7</a:t>
             </a:fld>
             <a:endParaRPr lang="en-CA"/>
           </a:p>
@@ -1543,7 +2214,7 @@
           <a:p>
             <a:fld id="{8B41CBF8-1438-49AC-8524-04FF51CA9B3F}" type="slidenum">
               <a:rPr lang="en-CA" smtClean="0"/>
-              <a:t>7</a:t>
+              <a:t>8</a:t>
             </a:fld>
             <a:endParaRPr lang="en-CA"/>
           </a:p>
@@ -1627,7 +2298,7 @@
           <a:p>
             <a:fld id="{8B41CBF8-1438-49AC-8524-04FF51CA9B3F}" type="slidenum">
               <a:rPr lang="en-CA" smtClean="0"/>
-              <a:t>8</a:t>
+              <a:t>9</a:t>
             </a:fld>
             <a:endParaRPr lang="en-CA"/>
           </a:p>
@@ -1711,7 +2382,7 @@
           <a:p>
             <a:fld id="{8B41CBF8-1438-49AC-8524-04FF51CA9B3F}" type="slidenum">
               <a:rPr lang="en-CA" smtClean="0"/>
-              <a:t>9</a:t>
+              <a:t>10</a:t>
             </a:fld>
             <a:endParaRPr lang="en-CA"/>
           </a:p>
@@ -1891,9 +2562,9 @@
           <a:bodyPr/>
           <a:lstStyle/>
           <a:p>
-            <a:fld id="{1FD4FA3F-CBB4-4341-94BD-DDF2731769FF}" type="datetime1">
+            <a:fld id="{7E42272D-C864-4260-9695-DE72F2C3DC59}" type="datetime1">
               <a:rPr lang="en-US" smtClean="0"/>
-              <a:t>7/8/2025</a:t>
+              <a:t>7/13/2025</a:t>
             </a:fld>
             <a:endParaRPr lang="en-US" dirty="0"/>
           </a:p>
@@ -1930,7 +2601,7 @@
         </p:nvSpPr>
         <p:spPr>
           <a:xfrm>
-            <a:off x="11572240" y="254000"/>
+            <a:off x="180000" y="180000"/>
             <a:ext cx="365760" cy="365760"/>
           </a:xfrm>
         </p:spPr>
@@ -2062,9 +2733,9 @@
           <a:bodyPr/>
           <a:lstStyle/>
           <a:p>
-            <a:fld id="{119E7919-6F9B-43DC-A0D4-6FB7FDBB6026}" type="datetime1">
+            <a:fld id="{A9F9FB3E-AA8D-444D-B4C0-0BA292B3630C}" type="datetime1">
               <a:rPr lang="en-US" smtClean="0"/>
-              <a:t>7/8/2025</a:t>
+              <a:t>7/13/2025</a:t>
             </a:fld>
             <a:endParaRPr lang="en-US" dirty="0"/>
           </a:p>
@@ -2099,7 +2770,12 @@
             <p:ph type="sldNum" sz="quarter" idx="12"/>
           </p:nvPr>
         </p:nvSpPr>
-        <p:spPr/>
+        <p:spPr>
+          <a:xfrm>
+            <a:off x="180000" y="180000"/>
+            <a:ext cx="365760" cy="365760"/>
+          </a:xfrm>
+        </p:spPr>
         <p:txBody>
           <a:bodyPr/>
           <a:lstStyle/>
@@ -2237,9 +2913,9 @@
           <a:bodyPr/>
           <a:lstStyle/>
           <a:p>
-            <a:fld id="{F8F4EF5D-9853-4451-A197-629BC83CB170}" type="datetime1">
+            <a:fld id="{ACDE6FF0-8AAB-4689-A4E7-51B4E11975FD}" type="datetime1">
               <a:rPr lang="en-US" smtClean="0"/>
-              <a:t>7/8/2025</a:t>
+              <a:t>7/13/2025</a:t>
             </a:fld>
             <a:endParaRPr lang="en-US" dirty="0"/>
           </a:p>
@@ -2274,7 +2950,12 @@
             <p:ph type="sldNum" sz="quarter" idx="12"/>
           </p:nvPr>
         </p:nvSpPr>
-        <p:spPr/>
+        <p:spPr>
+          <a:xfrm>
+            <a:off x="180000" y="180000"/>
+            <a:ext cx="365760" cy="365760"/>
+          </a:xfrm>
+        </p:spPr>
         <p:txBody>
           <a:bodyPr/>
           <a:lstStyle/>
@@ -2402,9 +3083,9 @@
           <a:bodyPr/>
           <a:lstStyle/>
           <a:p>
-            <a:fld id="{2BAC4BE1-A51F-4379-91AB-80BF8B47500D}" type="datetime1">
+            <a:fld id="{BEB540B3-2366-49F1-A3D9-6CC7C4D7FCCE}" type="datetime1">
               <a:rPr lang="en-US" smtClean="0"/>
-              <a:t>7/8/2025</a:t>
+              <a:t>7/13/2025</a:t>
             </a:fld>
             <a:endParaRPr lang="en-US" dirty="0"/>
           </a:p>
@@ -2441,7 +3122,7 @@
         </p:nvSpPr>
         <p:spPr>
           <a:xfrm>
-            <a:off x="11572240" y="254000"/>
+            <a:off x="180000" y="180000"/>
             <a:ext cx="365760" cy="365760"/>
           </a:xfrm>
         </p:spPr>
@@ -2671,9 +3352,9 @@
           <a:bodyPr/>
           <a:lstStyle/>
           <a:p>
-            <a:fld id="{0FBBD482-63E5-42C7-B4BF-991A6AED3AD0}" type="datetime1">
+            <a:fld id="{10F52E3D-C0B7-43E4-A024-214A2690058A}" type="datetime1">
               <a:rPr lang="en-US" smtClean="0"/>
-              <a:t>7/8/2025</a:t>
+              <a:t>7/13/2025</a:t>
             </a:fld>
             <a:endParaRPr lang="en-US" dirty="0"/>
           </a:p>
@@ -2710,7 +3391,7 @@
         </p:nvSpPr>
         <p:spPr>
           <a:xfrm>
-            <a:off x="11572240" y="254000"/>
+            <a:off x="180000" y="180000"/>
             <a:ext cx="365760" cy="365760"/>
           </a:xfrm>
         </p:spPr>
@@ -2904,9 +3585,9 @@
           <a:bodyPr/>
           <a:lstStyle/>
           <a:p>
-            <a:fld id="{F0572A24-0AD1-4DE0-B41C-8DE865DF9576}" type="datetime1">
+            <a:fld id="{20EB94D1-00ED-4FDB-998D-E2672FBBF4C2}" type="datetime1">
               <a:rPr lang="en-US" smtClean="0"/>
-              <a:t>7/8/2025</a:t>
+              <a:t>7/13/2025</a:t>
             </a:fld>
             <a:endParaRPr lang="en-US" dirty="0"/>
           </a:p>
@@ -2943,7 +3624,7 @@
         </p:nvSpPr>
         <p:spPr>
           <a:xfrm>
-            <a:off x="11572240" y="254000"/>
+            <a:off x="180000" y="180000"/>
             <a:ext cx="365760" cy="365760"/>
           </a:xfrm>
         </p:spPr>
@@ -3263,9 +3944,9 @@
           <a:bodyPr/>
           <a:lstStyle/>
           <a:p>
-            <a:fld id="{A0AE3E82-8D39-4566-81AB-5444FEB3874A}" type="datetime1">
+            <a:fld id="{54E5A78D-3582-4D5A-A41F-774723BEAE38}" type="datetime1">
               <a:rPr lang="en-US" smtClean="0"/>
-              <a:t>7/8/2025</a:t>
+              <a:t>7/13/2025</a:t>
             </a:fld>
             <a:endParaRPr lang="en-US" dirty="0"/>
           </a:p>
@@ -3302,7 +3983,7 @@
         </p:nvSpPr>
         <p:spPr>
           <a:xfrm>
-            <a:off x="11572240" y="254000"/>
+            <a:off x="180000" y="180000"/>
             <a:ext cx="365760" cy="365760"/>
           </a:xfrm>
         </p:spPr>
@@ -3404,9 +4085,9 @@
           <a:bodyPr/>
           <a:lstStyle/>
           <a:p>
-            <a:fld id="{5BD46EBA-98C7-4491-AFB1-1F4ADDA826DB}" type="datetime1">
+            <a:fld id="{73FFA491-5FCE-43B4-95D3-EA0D3CCC93AF}" type="datetime1">
               <a:rPr lang="en-US" smtClean="0"/>
-              <a:t>7/8/2025</a:t>
+              <a:t>7/13/2025</a:t>
             </a:fld>
             <a:endParaRPr lang="en-US" dirty="0"/>
           </a:p>
@@ -3443,7 +4124,7 @@
         </p:nvSpPr>
         <p:spPr>
           <a:xfrm>
-            <a:off x="11572240" y="254000"/>
+            <a:off x="180000" y="180000"/>
             <a:ext cx="365760" cy="365760"/>
           </a:xfrm>
         </p:spPr>
@@ -3499,9 +4180,9 @@
           <a:bodyPr/>
           <a:lstStyle/>
           <a:p>
-            <a:fld id="{02DF6EBF-6D3A-4498-A443-200030F8841D}" type="datetime1">
+            <a:fld id="{F3D9A1BE-0714-4174-B26A-60B9B3036729}" type="datetime1">
               <a:rPr lang="en-US" smtClean="0"/>
-              <a:t>7/8/2025</a:t>
+              <a:t>7/13/2025</a:t>
             </a:fld>
             <a:endParaRPr lang="en-US" dirty="0"/>
           </a:p>
@@ -3538,7 +4219,7 @@
         </p:nvSpPr>
         <p:spPr>
           <a:xfrm>
-            <a:off x="11572240" y="254000"/>
+            <a:off x="180000" y="180000"/>
             <a:ext cx="365760" cy="365760"/>
           </a:xfrm>
         </p:spPr>
@@ -3856,9 +4537,9 @@
           <a:bodyPr/>
           <a:lstStyle/>
           <a:p>
-            <a:fld id="{393F326A-548E-49A7-9D8D-F4BFD93AC6E7}" type="datetime1">
+            <a:fld id="{F12E75A4-08C5-430B-A942-B1EF97C038F1}" type="datetime1">
               <a:rPr lang="en-US" smtClean="0"/>
-              <a:t>7/8/2025</a:t>
+              <a:t>7/13/2025</a:t>
             </a:fld>
             <a:endParaRPr lang="en-US" dirty="0"/>
           </a:p>
@@ -3908,7 +4589,12 @@
             <p:ph type="sldNum" sz="quarter" idx="12"/>
           </p:nvPr>
         </p:nvSpPr>
-        <p:spPr/>
+        <p:spPr>
+          <a:xfrm>
+            <a:off x="180000" y="180000"/>
+            <a:ext cx="365760" cy="365760"/>
+          </a:xfrm>
+        </p:spPr>
         <p:txBody>
           <a:bodyPr/>
           <a:lstStyle/>
@@ -4208,9 +4894,9 @@
             </a:lvl1pPr>
           </a:lstStyle>
           <a:p>
-            <a:fld id="{445F8AAD-BEEA-40E7-84F7-72F9504555FD}" type="datetime1">
+            <a:fld id="{22CB1FBC-A380-4CB0-BB6A-2458CBD6DD5C}" type="datetime1">
               <a:rPr lang="en-US" smtClean="0"/>
-              <a:t>7/8/2025</a:t>
+              <a:t>7/13/2025</a:t>
             </a:fld>
             <a:endParaRPr lang="en-US" dirty="0"/>
           </a:p>
@@ -4260,7 +4946,12 @@
             <p:ph type="sldNum" sz="quarter" idx="12"/>
           </p:nvPr>
         </p:nvSpPr>
-        <p:spPr/>
+        <p:spPr>
+          <a:xfrm>
+            <a:off x="180000" y="180000"/>
+            <a:ext cx="365760" cy="365760"/>
+          </a:xfrm>
+        </p:spPr>
         <p:txBody>
           <a:bodyPr/>
           <a:lstStyle/>
@@ -4445,9 +5136,9 @@
             </a:lvl1pPr>
           </a:lstStyle>
           <a:p>
-            <a:fld id="{5F07AE00-74B3-41AC-B15D-E520FA6E2B10}" type="datetime1">
+            <a:fld id="{7AF78EA4-54E5-41EC-B46D-FBE1A4CE6570}" type="datetime1">
               <a:rPr lang="en-US" smtClean="0"/>
-              <a:t>7/8/2025</a:t>
+              <a:t>7/13/2025</a:t>
             </a:fld>
             <a:endParaRPr lang="en-US" dirty="0"/>
           </a:p>
@@ -4502,7 +5193,7 @@
         </p:nvSpPr>
         <p:spPr>
           <a:xfrm>
-            <a:off x="11572240" y="254000"/>
+            <a:off x="180000" y="180000"/>
             <a:ext cx="365760" cy="365760"/>
           </a:xfrm>
           <a:prstGeom prst="ellipse">
@@ -4975,10 +5666,10 @@
       </p:sp>
       <p:sp>
         <p:nvSpPr>
-          <p:cNvPr id="6" name="Slide Number Placeholder 5">
+          <p:cNvPr id="4" name="Slide Number Placeholder 3">
             <a:extLst>
               <a:ext uri="{FF2B5EF4-FFF2-40B4-BE49-F238E27FC236}">
-                <a16:creationId xmlns:a16="http://schemas.microsoft.com/office/drawing/2014/main" id="{58DB17B1-F5F0-EDB5-ABA9-CF0764AA1517}"/>
+                <a16:creationId xmlns:a16="http://schemas.microsoft.com/office/drawing/2014/main" id="{B2DD525E-9C66-181E-43BE-8269230F8CA9}"/>
               </a:ext>
             </a:extLst>
           </p:cNvPr>
@@ -4989,12 +5680,7 @@
             <p:ph type="sldNum" sz="quarter" idx="12"/>
           </p:nvPr>
         </p:nvSpPr>
-        <p:spPr>
-          <a:xfrm>
-            <a:off x="11744267" y="69368"/>
-            <a:ext cx="365760" cy="365760"/>
-          </a:xfrm>
-        </p:spPr>
+        <p:spPr/>
         <p:txBody>
           <a:bodyPr/>
           <a:lstStyle/>
@@ -5022,6 +5708,287 @@
 </file>
 
 <file path=ppt/slides/slide10.xml><?xml version="1.0" encoding="utf-8"?>
+<p:sld xmlns:a="http://schemas.openxmlformats.org/drawingml/2006/main" xmlns:r="http://schemas.openxmlformats.org/officeDocument/2006/relationships" xmlns:p="http://schemas.openxmlformats.org/presentationml/2006/main">
+  <p:cSld>
+    <p:bg>
+      <p:bgPr>
+        <a:solidFill>
+          <a:schemeClr val="bg1">
+            <a:lumMod val="95000"/>
+          </a:schemeClr>
+        </a:solidFill>
+        <a:effectLst/>
+      </p:bgPr>
+    </p:bg>
+    <p:spTree>
+      <p:nvGrpSpPr>
+        <p:cNvPr id="1" name=""/>
+        <p:cNvGrpSpPr/>
+        <p:nvPr/>
+      </p:nvGrpSpPr>
+      <p:grpSpPr>
+        <a:xfrm>
+          <a:off x="0" y="0"/>
+          <a:ext cx="0" cy="0"/>
+          <a:chOff x="0" y="0"/>
+          <a:chExt cx="0" cy="0"/>
+        </a:xfrm>
+      </p:grpSpPr>
+      <p:pic>
+        <p:nvPicPr>
+          <p:cNvPr id="4" name="Picture 3">
+            <a:extLst>
+              <a:ext uri="{FF2B5EF4-FFF2-40B4-BE49-F238E27FC236}">
+                <a16:creationId xmlns:a16="http://schemas.microsoft.com/office/drawing/2014/main" id="{3B75B243-0D6F-0E75-F6C9-53AC15AC1C72}"/>
+              </a:ext>
+            </a:extLst>
+          </p:cNvPr>
+          <p:cNvPicPr>
+            <a:picLocks noChangeAspect="1"/>
+          </p:cNvPicPr>
+          <p:nvPr/>
+        </p:nvPicPr>
+        <p:blipFill>
+          <a:blip r:embed="rId3"/>
+          <a:stretch>
+            <a:fillRect/>
+          </a:stretch>
+        </p:blipFill>
+        <p:spPr>
+          <a:xfrm>
+            <a:off x="5804457" y="-8389"/>
+            <a:ext cx="6387543" cy="3415510"/>
+          </a:xfrm>
+          <a:prstGeom prst="rect">
+            <a:avLst/>
+          </a:prstGeom>
+        </p:spPr>
+      </p:pic>
+      <p:pic>
+        <p:nvPicPr>
+          <p:cNvPr id="9" name="Content Placeholder 8">
+            <a:extLst>
+              <a:ext uri="{FF2B5EF4-FFF2-40B4-BE49-F238E27FC236}">
+                <a16:creationId xmlns:a16="http://schemas.microsoft.com/office/drawing/2014/main" id="{8A3EF694-355E-630E-17A6-A6D209B233FA}"/>
+              </a:ext>
+            </a:extLst>
+          </p:cNvPr>
+          <p:cNvPicPr>
+            <a:picLocks noGrp="1" noChangeAspect="1"/>
+          </p:cNvPicPr>
+          <p:nvPr>
+            <p:ph sz="half" idx="2"/>
+          </p:nvPr>
+        </p:nvPicPr>
+        <p:blipFill>
+          <a:blip r:embed="rId4"/>
+          <a:stretch>
+            <a:fillRect/>
+          </a:stretch>
+        </p:blipFill>
+        <p:spPr>
+          <a:xfrm>
+            <a:off x="5804457" y="3448878"/>
+            <a:ext cx="6387544" cy="3429000"/>
+          </a:xfrm>
+        </p:spPr>
+      </p:pic>
+      <p:cxnSp>
+        <p:nvCxnSpPr>
+          <p:cNvPr id="5" name="Straight Connector 4">
+            <a:extLst>
+              <a:ext uri="{FF2B5EF4-FFF2-40B4-BE49-F238E27FC236}">
+                <a16:creationId xmlns:a16="http://schemas.microsoft.com/office/drawing/2014/main" id="{DE1713F3-A061-02C9-BA8F-ABA4E84356C4}"/>
+              </a:ext>
+            </a:extLst>
+          </p:cNvPr>
+          <p:cNvCxnSpPr>
+            <a:cxnSpLocks/>
+          </p:cNvCxnSpPr>
+          <p:nvPr/>
+        </p:nvCxnSpPr>
+        <p:spPr>
+          <a:xfrm flipH="1">
+            <a:off x="5804457" y="3419855"/>
+            <a:ext cx="6440810" cy="29023"/>
+          </a:xfrm>
+          <a:prstGeom prst="line">
+            <a:avLst/>
+          </a:prstGeom>
+          <a:ln w="57150">
+            <a:solidFill>
+              <a:schemeClr val="tx1"/>
+            </a:solidFill>
+          </a:ln>
+        </p:spPr>
+        <p:style>
+          <a:lnRef idx="1">
+            <a:schemeClr val="accent1"/>
+          </a:lnRef>
+          <a:fillRef idx="0">
+            <a:schemeClr val="accent1"/>
+          </a:fillRef>
+          <a:effectRef idx="0">
+            <a:schemeClr val="accent1"/>
+          </a:effectRef>
+          <a:fontRef idx="minor">
+            <a:schemeClr val="tx1"/>
+          </a:fontRef>
+        </p:style>
+      </p:cxnSp>
+      <p:cxnSp>
+        <p:nvCxnSpPr>
+          <p:cNvPr id="8" name="Straight Connector 7">
+            <a:extLst>
+              <a:ext uri="{FF2B5EF4-FFF2-40B4-BE49-F238E27FC236}">
+                <a16:creationId xmlns:a16="http://schemas.microsoft.com/office/drawing/2014/main" id="{E2668E73-A410-0AC3-C4A7-CBE128CAAAEC}"/>
+              </a:ext>
+            </a:extLst>
+          </p:cNvPr>
+          <p:cNvCxnSpPr>
+            <a:cxnSpLocks/>
+          </p:cNvCxnSpPr>
+          <p:nvPr/>
+        </p:nvCxnSpPr>
+        <p:spPr>
+          <a:xfrm flipV="1">
+            <a:off x="5804457" y="-21879"/>
+            <a:ext cx="0" cy="6858000"/>
+          </a:xfrm>
+          <a:prstGeom prst="line">
+            <a:avLst/>
+          </a:prstGeom>
+          <a:ln w="57150">
+            <a:solidFill>
+              <a:schemeClr val="tx1"/>
+            </a:solidFill>
+          </a:ln>
+        </p:spPr>
+        <p:style>
+          <a:lnRef idx="1">
+            <a:schemeClr val="accent1"/>
+          </a:lnRef>
+          <a:fillRef idx="0">
+            <a:schemeClr val="accent1"/>
+          </a:fillRef>
+          <a:effectRef idx="0">
+            <a:schemeClr val="accent1"/>
+          </a:effectRef>
+          <a:fontRef idx="minor">
+            <a:schemeClr val="tx1"/>
+          </a:fontRef>
+        </p:style>
+      </p:cxnSp>
+      <p:pic>
+        <p:nvPicPr>
+          <p:cNvPr id="14" name="Content Placeholder 3">
+            <a:extLst>
+              <a:ext uri="{FF2B5EF4-FFF2-40B4-BE49-F238E27FC236}">
+                <a16:creationId xmlns:a16="http://schemas.microsoft.com/office/drawing/2014/main" id="{3FCE4965-ABD8-6ED4-A23D-B4ED60437C6A}"/>
+              </a:ext>
+            </a:extLst>
+          </p:cNvPr>
+          <p:cNvPicPr>
+            <a:picLocks noGrp="1" noChangeAspect="1"/>
+          </p:cNvPicPr>
+          <p:nvPr>
+            <p:ph idx="1"/>
+          </p:nvPr>
+        </p:nvPicPr>
+        <p:blipFill>
+          <a:blip r:embed="rId5"/>
+          <a:stretch>
+            <a:fillRect/>
+          </a:stretch>
+        </p:blipFill>
+        <p:spPr>
+          <a:xfrm>
+            <a:off x="0" y="2150231"/>
+            <a:ext cx="5771764" cy="2597294"/>
+          </a:xfrm>
+          <a:prstGeom prst="rect">
+            <a:avLst/>
+          </a:prstGeom>
+        </p:spPr>
+      </p:pic>
+      <p:sp>
+        <p:nvSpPr>
+          <p:cNvPr id="15" name="Title 1">
+            <a:extLst>
+              <a:ext uri="{FF2B5EF4-FFF2-40B4-BE49-F238E27FC236}">
+                <a16:creationId xmlns:a16="http://schemas.microsoft.com/office/drawing/2014/main" id="{E28340B0-E310-B2EF-EFC4-0A93876FE4E2}"/>
+              </a:ext>
+            </a:extLst>
+          </p:cNvPr>
+          <p:cNvSpPr>
+            <a:spLocks noGrp="1"/>
+          </p:cNvSpPr>
+          <p:nvPr>
+            <p:ph type="title"/>
+          </p:nvPr>
+        </p:nvSpPr>
+        <p:spPr>
+          <a:xfrm>
+            <a:off x="824286" y="271655"/>
+            <a:ext cx="4106184" cy="1146337"/>
+          </a:xfrm>
+        </p:spPr>
+        <p:txBody>
+          <a:bodyPr vert="horz" lIns="182880" tIns="182880" rIns="182880" bIns="182880" rtlCol="0" anchor="ctr">
+            <a:noAutofit/>
+          </a:bodyPr>
+          <a:lstStyle/>
+          <a:p>
+            <a:r>
+              <a:rPr lang="en-US" sz="2100" dirty="0"/>
+              <a:t>OSIRIS vs ACE-FTS OZONE PROFILE PLOTS</a:t>
+            </a:r>
+          </a:p>
+        </p:txBody>
+      </p:sp>
+      <p:sp>
+        <p:nvSpPr>
+          <p:cNvPr id="2" name="Slide Number Placeholder 1">
+            <a:extLst>
+              <a:ext uri="{FF2B5EF4-FFF2-40B4-BE49-F238E27FC236}">
+                <a16:creationId xmlns:a16="http://schemas.microsoft.com/office/drawing/2014/main" id="{EBFE2D77-7BED-3133-31AD-920AAC1D0751}"/>
+              </a:ext>
+            </a:extLst>
+          </p:cNvPr>
+          <p:cNvSpPr>
+            <a:spLocks noGrp="1"/>
+          </p:cNvSpPr>
+          <p:nvPr>
+            <p:ph type="sldNum" sz="quarter" idx="12"/>
+          </p:nvPr>
+        </p:nvSpPr>
+        <p:spPr/>
+        <p:txBody>
+          <a:bodyPr/>
+          <a:lstStyle/>
+          <a:p>
+            <a:fld id="{8A7A6979-0714-4377-B894-6BE4C2D6E202}" type="slidenum">
+              <a:rPr lang="en-US" smtClean="0"/>
+              <a:t>10</a:t>
+            </a:fld>
+            <a:endParaRPr lang="en-US" dirty="0"/>
+          </a:p>
+        </p:txBody>
+      </p:sp>
+    </p:spTree>
+    <p:extLst>
+      <p:ext uri="{BB962C8B-B14F-4D97-AF65-F5344CB8AC3E}">
+        <p14:creationId xmlns:p14="http://schemas.microsoft.com/office/powerpoint/2010/main" val="3966488039"/>
+      </p:ext>
+    </p:extLst>
+  </p:cSld>
+  <p:clrMapOvr>
+    <a:masterClrMapping/>
+  </p:clrMapOvr>
+</p:sld>
+</file>
+
+<file path=ppt/slides/slide11.xml><?xml version="1.0" encoding="utf-8"?>
 <p:sld xmlns:a="http://schemas.openxmlformats.org/drawingml/2006/main" xmlns:r="http://schemas.openxmlformats.org/officeDocument/2006/relationships" xmlns:p="http://schemas.openxmlformats.org/presentationml/2006/main">
   <p:cSld>
     <p:bg>
@@ -5262,7 +6229,7 @@
           <p:cNvPr id="2" name="Slide Number Placeholder 1">
             <a:extLst>
               <a:ext uri="{FF2B5EF4-FFF2-40B4-BE49-F238E27FC236}">
-                <a16:creationId xmlns:a16="http://schemas.microsoft.com/office/drawing/2014/main" id="{605BCBB9-EF3E-748A-CDB8-779E46622F2B}"/>
+                <a16:creationId xmlns:a16="http://schemas.microsoft.com/office/drawing/2014/main" id="{332296BB-A91D-BF7F-A355-5083AE66B3F8}"/>
               </a:ext>
             </a:extLst>
           </p:cNvPr>
@@ -5280,7 +6247,7 @@
           <a:p>
             <a:fld id="{8A7A6979-0714-4377-B894-6BE4C2D6E202}" type="slidenum">
               <a:rPr lang="en-US" smtClean="0"/>
-              <a:t>10</a:t>
+              <a:t>11</a:t>
             </a:fld>
             <a:endParaRPr lang="en-US" dirty="0"/>
           </a:p>
@@ -5290,146 +6257,6 @@
     <p:extLst>
       <p:ext uri="{BB962C8B-B14F-4D97-AF65-F5344CB8AC3E}">
         <p14:creationId xmlns:p14="http://schemas.microsoft.com/office/powerpoint/2010/main" val="451837092"/>
-      </p:ext>
-    </p:extLst>
-  </p:cSld>
-  <p:clrMapOvr>
-    <a:masterClrMapping/>
-  </p:clrMapOvr>
-</p:sld>
-</file>
-
-<file path=ppt/slides/slide11.xml><?xml version="1.0" encoding="utf-8"?>
-<p:sld xmlns:a="http://schemas.openxmlformats.org/drawingml/2006/main" xmlns:r="http://schemas.openxmlformats.org/officeDocument/2006/relationships" xmlns:p="http://schemas.openxmlformats.org/presentationml/2006/main">
-  <p:cSld>
-    <p:spTree>
-      <p:nvGrpSpPr>
-        <p:cNvPr id="1" name=""/>
-        <p:cNvGrpSpPr/>
-        <p:nvPr/>
-      </p:nvGrpSpPr>
-      <p:grpSpPr>
-        <a:xfrm>
-          <a:off x="0" y="0"/>
-          <a:ext cx="0" cy="0"/>
-          <a:chOff x="0" y="0"/>
-          <a:chExt cx="0" cy="0"/>
-        </a:xfrm>
-      </p:grpSpPr>
-      <p:sp>
-        <p:nvSpPr>
-          <p:cNvPr id="2" name="Title 1">
-            <a:extLst>
-              <a:ext uri="{FF2B5EF4-FFF2-40B4-BE49-F238E27FC236}">
-                <a16:creationId xmlns:a16="http://schemas.microsoft.com/office/drawing/2014/main" id="{A46EB721-D92D-34D3-1523-E5F037A6470F}"/>
-              </a:ext>
-            </a:extLst>
-          </p:cNvPr>
-          <p:cNvSpPr>
-            <a:spLocks noGrp="1"/>
-          </p:cNvSpPr>
-          <p:nvPr>
-            <p:ph type="title"/>
-          </p:nvPr>
-        </p:nvSpPr>
-        <p:spPr/>
-        <p:txBody>
-          <a:bodyPr/>
-          <a:lstStyle/>
-          <a:p>
-            <a:r>
-              <a:rPr lang="en-CA" dirty="0"/>
-              <a:t>POTENTIAL Next </a:t>
-            </a:r>
-            <a:r>
-              <a:rPr lang="en-CA" dirty="0" err="1"/>
-              <a:t>stepS</a:t>
-            </a:r>
-            <a:endParaRPr lang="en-CA" dirty="0"/>
-          </a:p>
-        </p:txBody>
-      </p:sp>
-      <p:sp>
-        <p:nvSpPr>
-          <p:cNvPr id="3" name="Content Placeholder 2">
-            <a:extLst>
-              <a:ext uri="{FF2B5EF4-FFF2-40B4-BE49-F238E27FC236}">
-                <a16:creationId xmlns:a16="http://schemas.microsoft.com/office/drawing/2014/main" id="{E8F051E9-66DD-440A-1D1A-45960DC18F3F}"/>
-              </a:ext>
-            </a:extLst>
-          </p:cNvPr>
-          <p:cNvSpPr>
-            <a:spLocks noGrp="1"/>
-          </p:cNvSpPr>
-          <p:nvPr>
-            <p:ph idx="1"/>
-          </p:nvPr>
-        </p:nvSpPr>
-        <p:spPr/>
-        <p:txBody>
-          <a:bodyPr/>
-          <a:lstStyle/>
-          <a:p>
-            <a:r>
-              <a:rPr lang="en-US" dirty="0"/>
-              <a:t>Analysis of the Averaging Kernels of the PEARL FTIR instrument to allow for more accurate comparisons.</a:t>
-            </a:r>
-          </a:p>
-          <a:p>
-            <a:r>
-              <a:rPr lang="en-US" dirty="0"/>
-              <a:t>Refining coincidence criteria</a:t>
-            </a:r>
-          </a:p>
-          <a:p>
-            <a:r>
-              <a:rPr lang="en-US" dirty="0"/>
-              <a:t>Examining seasonality of agreement</a:t>
-            </a:r>
-          </a:p>
-          <a:p>
-            <a:r>
-              <a:rPr lang="en-US" dirty="0"/>
-              <a:t>Examining agreement overtime</a:t>
-            </a:r>
-            <a:endParaRPr lang="en-CA" dirty="0"/>
-          </a:p>
-        </p:txBody>
-      </p:sp>
-      <p:sp>
-        <p:nvSpPr>
-          <p:cNvPr id="4" name="Slide Number Placeholder 3">
-            <a:extLst>
-              <a:ext uri="{FF2B5EF4-FFF2-40B4-BE49-F238E27FC236}">
-                <a16:creationId xmlns:a16="http://schemas.microsoft.com/office/drawing/2014/main" id="{D142C994-4415-F172-E09A-63E0EDC64F62}"/>
-              </a:ext>
-            </a:extLst>
-          </p:cNvPr>
-          <p:cNvSpPr>
-            <a:spLocks noGrp="1"/>
-          </p:cNvSpPr>
-          <p:nvPr>
-            <p:ph type="sldNum" sz="quarter" idx="12"/>
-          </p:nvPr>
-        </p:nvSpPr>
-        <p:spPr/>
-        <p:txBody>
-          <a:bodyPr/>
-          <a:lstStyle/>
-          <a:p>
-            <a:fld id="{8A7A6979-0714-4377-B894-6BE4C2D6E202}" type="slidenum">
-              <a:rPr lang="en-US" smtClean="0"/>
-              <a:pPr/>
-              <a:t>11</a:t>
-            </a:fld>
-            <a:endParaRPr lang="en-US" dirty="0"/>
-          </a:p>
-        </p:txBody>
-      </p:sp>
-    </p:spTree>
-    <p:extLst>
-      <p:ext uri="{BB962C8B-B14F-4D97-AF65-F5344CB8AC3E}">
-        <p14:creationId xmlns:p14="http://schemas.microsoft.com/office/powerpoint/2010/main" val="1793765436"/>
       </p:ext>
     </p:extLst>
   </p:cSld>
@@ -5461,6 +6288,146 @@
           <p:cNvPr id="2" name="Title 1">
             <a:extLst>
               <a:ext uri="{FF2B5EF4-FFF2-40B4-BE49-F238E27FC236}">
+                <a16:creationId xmlns:a16="http://schemas.microsoft.com/office/drawing/2014/main" id="{A46EB721-D92D-34D3-1523-E5F037A6470F}"/>
+              </a:ext>
+            </a:extLst>
+          </p:cNvPr>
+          <p:cNvSpPr>
+            <a:spLocks noGrp="1"/>
+          </p:cNvSpPr>
+          <p:nvPr>
+            <p:ph type="title"/>
+          </p:nvPr>
+        </p:nvSpPr>
+        <p:spPr/>
+        <p:txBody>
+          <a:bodyPr/>
+          <a:lstStyle/>
+          <a:p>
+            <a:r>
+              <a:rPr lang="en-CA" dirty="0"/>
+              <a:t>POTENTIAL Next </a:t>
+            </a:r>
+            <a:r>
+              <a:rPr lang="en-CA" dirty="0" err="1"/>
+              <a:t>stepS</a:t>
+            </a:r>
+            <a:endParaRPr lang="en-CA" dirty="0"/>
+          </a:p>
+        </p:txBody>
+      </p:sp>
+      <p:sp>
+        <p:nvSpPr>
+          <p:cNvPr id="3" name="Content Placeholder 2">
+            <a:extLst>
+              <a:ext uri="{FF2B5EF4-FFF2-40B4-BE49-F238E27FC236}">
+                <a16:creationId xmlns:a16="http://schemas.microsoft.com/office/drawing/2014/main" id="{E8F051E9-66DD-440A-1D1A-45960DC18F3F}"/>
+              </a:ext>
+            </a:extLst>
+          </p:cNvPr>
+          <p:cNvSpPr>
+            <a:spLocks noGrp="1"/>
+          </p:cNvSpPr>
+          <p:nvPr>
+            <p:ph idx="1"/>
+          </p:nvPr>
+        </p:nvSpPr>
+        <p:spPr/>
+        <p:txBody>
+          <a:bodyPr/>
+          <a:lstStyle/>
+          <a:p>
+            <a:r>
+              <a:rPr lang="en-US" dirty="0"/>
+              <a:t>Analysis of the Averaging Kernels of the PEARL FTIR instrument to allow for more accurate comparisons</a:t>
+            </a:r>
+          </a:p>
+          <a:p>
+            <a:r>
+              <a:rPr lang="en-US" dirty="0"/>
+              <a:t>Refining coincidence criteria</a:t>
+            </a:r>
+          </a:p>
+          <a:p>
+            <a:r>
+              <a:rPr lang="en-US" dirty="0"/>
+              <a:t>Examining seasonality of agreement</a:t>
+            </a:r>
+          </a:p>
+          <a:p>
+            <a:r>
+              <a:rPr lang="en-US" dirty="0"/>
+              <a:t>Examining agreement overtime</a:t>
+            </a:r>
+            <a:endParaRPr lang="en-CA" dirty="0"/>
+          </a:p>
+        </p:txBody>
+      </p:sp>
+      <p:sp>
+        <p:nvSpPr>
+          <p:cNvPr id="4" name="Slide Number Placeholder 3">
+            <a:extLst>
+              <a:ext uri="{FF2B5EF4-FFF2-40B4-BE49-F238E27FC236}">
+                <a16:creationId xmlns:a16="http://schemas.microsoft.com/office/drawing/2014/main" id="{2DF6F61C-0776-94C1-9552-8EE006D2184D}"/>
+              </a:ext>
+            </a:extLst>
+          </p:cNvPr>
+          <p:cNvSpPr>
+            <a:spLocks noGrp="1"/>
+          </p:cNvSpPr>
+          <p:nvPr>
+            <p:ph type="sldNum" sz="quarter" idx="12"/>
+          </p:nvPr>
+        </p:nvSpPr>
+        <p:spPr/>
+        <p:txBody>
+          <a:bodyPr/>
+          <a:lstStyle/>
+          <a:p>
+            <a:fld id="{8A7A6979-0714-4377-B894-6BE4C2D6E202}" type="slidenum">
+              <a:rPr lang="en-US" smtClean="0"/>
+              <a:pPr/>
+              <a:t>12</a:t>
+            </a:fld>
+            <a:endParaRPr lang="en-US" dirty="0"/>
+          </a:p>
+        </p:txBody>
+      </p:sp>
+    </p:spTree>
+    <p:extLst>
+      <p:ext uri="{BB962C8B-B14F-4D97-AF65-F5344CB8AC3E}">
+        <p14:creationId xmlns:p14="http://schemas.microsoft.com/office/powerpoint/2010/main" val="1793765436"/>
+      </p:ext>
+    </p:extLst>
+  </p:cSld>
+  <p:clrMapOvr>
+    <a:masterClrMapping/>
+  </p:clrMapOvr>
+</p:sld>
+</file>
+
+<file path=ppt/slides/slide13.xml><?xml version="1.0" encoding="utf-8"?>
+<p:sld xmlns:a="http://schemas.openxmlformats.org/drawingml/2006/main" xmlns:r="http://schemas.openxmlformats.org/officeDocument/2006/relationships" xmlns:p="http://schemas.openxmlformats.org/presentationml/2006/main">
+  <p:cSld>
+    <p:spTree>
+      <p:nvGrpSpPr>
+        <p:cNvPr id="1" name=""/>
+        <p:cNvGrpSpPr/>
+        <p:nvPr/>
+      </p:nvGrpSpPr>
+      <p:grpSpPr>
+        <a:xfrm>
+          <a:off x="0" y="0"/>
+          <a:ext cx="0" cy="0"/>
+          <a:chOff x="0" y="0"/>
+          <a:chExt cx="0" cy="0"/>
+        </a:xfrm>
+      </p:grpSpPr>
+      <p:sp>
+        <p:nvSpPr>
+          <p:cNvPr id="2" name="Title 1">
+            <a:extLst>
+              <a:ext uri="{FF2B5EF4-FFF2-40B4-BE49-F238E27FC236}">
                 <a16:creationId xmlns:a16="http://schemas.microsoft.com/office/drawing/2014/main" id="{9AED7EEF-3EAD-4323-D1D0-514916978476}"/>
               </a:ext>
             </a:extLst>
@@ -5504,7 +6471,7 @@
         <p:spPr/>
         <p:txBody>
           <a:bodyPr>
-            <a:normAutofit fontScale="85000" lnSpcReduction="20000"/>
+            <a:normAutofit fontScale="77500" lnSpcReduction="20000"/>
           </a:bodyPr>
           <a:lstStyle/>
           <a:p>
@@ -5645,11 +6612,14 @@
               <a:buFont typeface="Arial" panose="020B0604020202020204" pitchFamily="34" charset="0"/>
               <a:buAutoNum type="arabicPeriod"/>
             </a:pPr>
-            <a:endParaRPr lang="en-US" dirty="0">
-              <a:solidFill>
-                <a:srgbClr val="646464"/>
-              </a:solidFill>
-            </a:endParaRPr>
+            <a:r>
+              <a:rPr lang="en-US" dirty="0">
+                <a:solidFill>
+                  <a:srgbClr val="646464"/>
+                </a:solidFill>
+              </a:rPr>
+              <a:t>https://www.nasa.gov/image-article/scientific-satellite-atmospheric-chemistry-experiment-1-scisat-1/</a:t>
+            </a:r>
           </a:p>
           <a:p>
             <a:pPr>
@@ -5671,7 +6641,7 @@
           <p:cNvPr id="4" name="Slide Number Placeholder 3">
             <a:extLst>
               <a:ext uri="{FF2B5EF4-FFF2-40B4-BE49-F238E27FC236}">
-                <a16:creationId xmlns:a16="http://schemas.microsoft.com/office/drawing/2014/main" id="{DE46851F-A86A-045D-14F0-0E7663164E69}"/>
+                <a16:creationId xmlns:a16="http://schemas.microsoft.com/office/drawing/2014/main" id="{0F90223A-2FB6-67A9-82E3-3207DC5CFA97}"/>
               </a:ext>
             </a:extLst>
           </p:cNvPr>
@@ -5690,7 +6660,7 @@
             <a:fld id="{8A7A6979-0714-4377-B894-6BE4C2D6E202}" type="slidenum">
               <a:rPr lang="en-US" smtClean="0"/>
               <a:pPr/>
-              <a:t>12</a:t>
+              <a:t>13</a:t>
             </a:fld>
             <a:endParaRPr lang="en-US" dirty="0"/>
           </a:p>
@@ -5709,7 +6679,7 @@
 </p:sld>
 </file>
 
-<file path=ppt/slides/slide13.xml><?xml version="1.0" encoding="utf-8"?>
+<file path=ppt/slides/slide14.xml><?xml version="1.0" encoding="utf-8"?>
 <p:sld xmlns:a="http://schemas.openxmlformats.org/drawingml/2006/main" xmlns:r="http://schemas.openxmlformats.org/officeDocument/2006/relationships" xmlns:p="http://schemas.openxmlformats.org/presentationml/2006/main">
   <p:cSld>
     <p:bg>
@@ -5823,251 +6793,7 @@
           <p:cNvPr id="3" name="Slide Number Placeholder 2">
             <a:extLst>
               <a:ext uri="{FF2B5EF4-FFF2-40B4-BE49-F238E27FC236}">
-                <a16:creationId xmlns:a16="http://schemas.microsoft.com/office/drawing/2014/main" id="{9234C13B-EADE-120D-BF17-B96E039B8658}"/>
-              </a:ext>
-            </a:extLst>
-          </p:cNvPr>
-          <p:cNvSpPr>
-            <a:spLocks noGrp="1"/>
-          </p:cNvSpPr>
-          <p:nvPr>
-            <p:ph type="sldNum" sz="quarter" idx="12"/>
-          </p:nvPr>
-        </p:nvSpPr>
-        <p:spPr/>
-        <p:txBody>
-          <a:bodyPr/>
-          <a:lstStyle/>
-          <a:p>
-            <a:fld id="{8A7A6979-0714-4377-B894-6BE4C2D6E202}" type="slidenum">
-              <a:rPr lang="en-US" smtClean="0"/>
-              <a:pPr/>
-              <a:t>13</a:t>
-            </a:fld>
-            <a:endParaRPr lang="en-US" dirty="0"/>
-          </a:p>
-        </p:txBody>
-      </p:sp>
-    </p:spTree>
-    <p:extLst>
-      <p:ext uri="{BB962C8B-B14F-4D97-AF65-F5344CB8AC3E}">
-        <p14:creationId xmlns:p14="http://schemas.microsoft.com/office/powerpoint/2010/main" val="3024117669"/>
-      </p:ext>
-    </p:extLst>
-  </p:cSld>
-  <p:clrMapOvr>
-    <a:masterClrMapping/>
-  </p:clrMapOvr>
-  <p:timing>
-    <p:tnLst>
-      <p:par>
-        <p:cTn id="1" dur="indefinite" restart="never" nodeType="tmRoot">
-          <p:childTnLst>
-            <p:seq concurrent="1" nextAc="seek">
-              <p:cTn id="2" dur="indefinite" nodeType="mainSeq">
-                <p:childTnLst>
-                  <p:par>
-                    <p:cTn id="3" fill="hold">
-                      <p:stCondLst>
-                        <p:cond delay="indefinite"/>
-                        <p:cond evt="onBegin" delay="0">
-                          <p:tn val="2"/>
-                        </p:cond>
-                      </p:stCondLst>
-                      <p:childTnLst>
-                        <p:par>
-                          <p:cTn id="4" fill="hold">
-                            <p:stCondLst>
-                              <p:cond delay="0"/>
-                            </p:stCondLst>
-                            <p:childTnLst>
-                              <p:par>
-                                <p:cTn id="5" presetID="10" presetClass="entr" presetSubtype="0" fill="hold" grpId="0" nodeType="withEffect">
-                                  <p:stCondLst>
-                                    <p:cond delay="1000"/>
-                                  </p:stCondLst>
-                                  <p:iterate type="lt">
-                                    <p:tmPct val="10000"/>
-                                  </p:iterate>
-                                  <p:childTnLst>
-                                    <p:set>
-                                      <p:cBhvr>
-                                        <p:cTn id="6" dur="1" fill="hold">
-                                          <p:stCondLst>
-                                            <p:cond delay="0"/>
-                                          </p:stCondLst>
-                                        </p:cTn>
-                                        <p:tgtEl>
-                                          <p:spTgt spid="2"/>
-                                        </p:tgtEl>
-                                        <p:attrNameLst>
-                                          <p:attrName>style.visibility</p:attrName>
-                                        </p:attrNameLst>
-                                      </p:cBhvr>
-                                      <p:to>
-                                        <p:strVal val="visible"/>
-                                      </p:to>
-                                    </p:set>
-                                    <p:animEffect transition="in" filter="fade">
-                                      <p:cBhvr>
-                                        <p:cTn id="7" dur="400"/>
-                                        <p:tgtEl>
-                                          <p:spTgt spid="2"/>
-                                        </p:tgtEl>
-                                      </p:cBhvr>
-                                    </p:animEffect>
-                                  </p:childTnLst>
-                                </p:cTn>
-                              </p:par>
-                            </p:childTnLst>
-                          </p:cTn>
-                        </p:par>
-                      </p:childTnLst>
-                    </p:cTn>
-                  </p:par>
-                </p:childTnLst>
-              </p:cTn>
-              <p:prevCondLst>
-                <p:cond evt="onPrev" delay="0">
-                  <p:tgtEl>
-                    <p:sldTgt/>
-                  </p:tgtEl>
-                </p:cond>
-              </p:prevCondLst>
-              <p:nextCondLst>
-                <p:cond evt="onNext" delay="0">
-                  <p:tgtEl>
-                    <p:sldTgt/>
-                  </p:tgtEl>
-                </p:cond>
-              </p:nextCondLst>
-            </p:seq>
-          </p:childTnLst>
-        </p:cTn>
-      </p:par>
-    </p:tnLst>
-    <p:bldLst>
-      <p:bldP spid="2" grpId="0" animBg="1"/>
-    </p:bldLst>
-  </p:timing>
-</p:sld>
-</file>
-
-<file path=ppt/slides/slide14.xml><?xml version="1.0" encoding="utf-8"?>
-<p:sld xmlns:a="http://schemas.openxmlformats.org/drawingml/2006/main" xmlns:r="http://schemas.openxmlformats.org/officeDocument/2006/relationships" xmlns:p="http://schemas.openxmlformats.org/presentationml/2006/main">
-  <p:cSld>
-    <p:bg>
-      <p:bgPr>
-        <a:solidFill>
-          <a:schemeClr val="bg1"/>
-        </a:solidFill>
-        <a:effectLst/>
-      </p:bgPr>
-    </p:bg>
-    <p:spTree>
-      <p:nvGrpSpPr>
-        <p:cNvPr id="1" name=""/>
-        <p:cNvGrpSpPr/>
-        <p:nvPr/>
-      </p:nvGrpSpPr>
-      <p:grpSpPr>
-        <a:xfrm>
-          <a:off x="0" y="0"/>
-          <a:ext cx="0" cy="0"/>
-          <a:chOff x="0" y="0"/>
-          <a:chExt cx="0" cy="0"/>
-        </a:xfrm>
-      </p:grpSpPr>
-      <p:pic>
-        <p:nvPicPr>
-          <p:cNvPr id="5" name="Picture 4" descr="Analogue wall clock">
-            <a:extLst>
-              <a:ext uri="{FF2B5EF4-FFF2-40B4-BE49-F238E27FC236}">
-                <a16:creationId xmlns:a16="http://schemas.microsoft.com/office/drawing/2014/main" id="{E45FBA98-4ACA-708F-D7DD-F5EA96FC8BCE}"/>
-              </a:ext>
-            </a:extLst>
-          </p:cNvPr>
-          <p:cNvPicPr>
-            <a:picLocks noChangeAspect="1"/>
-          </p:cNvPicPr>
-          <p:nvPr/>
-        </p:nvPicPr>
-        <p:blipFill>
-          <a:blip r:embed="rId2">
-            <a:alphaModFix amt="40000"/>
-          </a:blip>
-          <a:srcRect t="6514" b="8900"/>
-          <a:stretch>
-            <a:fillRect/>
-          </a:stretch>
-        </p:blipFill>
-        <p:spPr>
-          <a:xfrm>
-            <a:off x="20" y="10"/>
-            <a:ext cx="12191980" cy="6857990"/>
-          </a:xfrm>
-          <a:prstGeom prst="rect">
-            <a:avLst/>
-          </a:prstGeom>
-        </p:spPr>
-      </p:pic>
-      <p:sp>
-        <p:nvSpPr>
-          <p:cNvPr id="2" name="Title 1">
-            <a:extLst>
-              <a:ext uri="{FF2B5EF4-FFF2-40B4-BE49-F238E27FC236}">
-                <a16:creationId xmlns:a16="http://schemas.microsoft.com/office/drawing/2014/main" id="{A5F1F525-CB9C-7C62-1675-1C6135E9FEBB}"/>
-              </a:ext>
-            </a:extLst>
-          </p:cNvPr>
-          <p:cNvSpPr>
-            <a:spLocks noGrp="1"/>
-          </p:cNvSpPr>
-          <p:nvPr>
-            <p:ph type="ctrTitle"/>
-          </p:nvPr>
-        </p:nvSpPr>
-        <p:spPr>
-          <a:xfrm>
-            <a:off x="1600200" y="2386744"/>
-            <a:ext cx="8991600" cy="1645920"/>
-          </a:xfrm>
-          <a:noFill/>
-          <a:ln w="38100" cap="sq">
-            <a:solidFill>
-              <a:schemeClr val="tx1"/>
-            </a:solidFill>
-            <a:miter lim="800000"/>
-          </a:ln>
-        </p:spPr>
-        <p:txBody>
-          <a:bodyPr anchor="ctr">
-            <a:normAutofit/>
-          </a:bodyPr>
-          <a:lstStyle/>
-          <a:p>
-            <a:r>
-              <a:rPr lang="en-US" dirty="0">
-                <a:solidFill>
-                  <a:schemeClr val="tx1"/>
-                </a:solidFill>
-              </a:rPr>
-              <a:t>THANK YOU FOR YOUR TIME</a:t>
-            </a:r>
-            <a:endParaRPr lang="en-CA" dirty="0">
-              <a:solidFill>
-                <a:schemeClr val="tx1"/>
-              </a:solidFill>
-            </a:endParaRPr>
-          </a:p>
-        </p:txBody>
-      </p:sp>
-      <p:sp>
-        <p:nvSpPr>
-          <p:cNvPr id="3" name="Slide Number Placeholder 2">
-            <a:extLst>
-              <a:ext uri="{FF2B5EF4-FFF2-40B4-BE49-F238E27FC236}">
-                <a16:creationId xmlns:a16="http://schemas.microsoft.com/office/drawing/2014/main" id="{96C76D96-66D3-5A5E-8B90-4224BA24F17D}"/>
+                <a16:creationId xmlns:a16="http://schemas.microsoft.com/office/drawing/2014/main" id="{2F473780-2D61-44A1-F2DB-3EF9B56A6D19}"/>
               </a:ext>
             </a:extLst>
           </p:cNvPr>
@@ -6095,7 +6821,7 @@
     </p:spTree>
     <p:extLst>
       <p:ext uri="{BB962C8B-B14F-4D97-AF65-F5344CB8AC3E}">
-        <p14:creationId xmlns:p14="http://schemas.microsoft.com/office/powerpoint/2010/main" val="3589351187"/>
+        <p14:creationId xmlns:p14="http://schemas.microsoft.com/office/powerpoint/2010/main" val="3024117669"/>
       </p:ext>
     </p:extLst>
   </p:cSld>
@@ -6232,8 +6958,8 @@
         </p:nvSpPr>
         <p:spPr>
           <a:xfrm>
-            <a:off x="1768523" y="810313"/>
-            <a:ext cx="8654954" cy="1188720"/>
+            <a:off x="3468435" y="797166"/>
+            <a:ext cx="5255129" cy="1188720"/>
           </a:xfrm>
         </p:spPr>
         <p:txBody>
@@ -6242,7 +6968,7 @@
           <a:p>
             <a:r>
               <a:rPr lang="en-US" dirty="0"/>
-              <a:t>Research Topic: Validating Ozone Data</a:t>
+              <a:t>OZONE’S SIGNIFICANCE</a:t>
             </a:r>
             <a:endParaRPr lang="en-CA" dirty="0"/>
           </a:p>
@@ -6266,8 +6992,8 @@
         </p:nvSpPr>
         <p:spPr>
           <a:xfrm>
-            <a:off x="1768523" y="2335578"/>
-            <a:ext cx="8654954" cy="3101983"/>
+            <a:off x="1162237" y="2403265"/>
+            <a:ext cx="3886841" cy="3101983"/>
           </a:xfrm>
         </p:spPr>
         <p:txBody>
@@ -6285,52 +7011,27 @@
             <a:pPr lvl="1"/>
             <a:r>
               <a:rPr lang="en-CA" sz="1800" dirty="0"/>
-              <a:t>Critical UV shield for Earth; impacts climate &amp; ecosystems.</a:t>
+              <a:t>Critical UV shield for Earth</a:t>
             </a:r>
           </a:p>
           <a:p>
             <a:pPr lvl="1"/>
             <a:r>
               <a:rPr lang="en-CA" sz="1800" dirty="0"/>
-              <a:t>Photochemically destroyed, causing seasonal ozone holes (especially Antarctic).</a:t>
+              <a:t>Impacts climate &amp; ecosystems</a:t>
+            </a:r>
+          </a:p>
+          <a:p>
+            <a:pPr lvl="1"/>
+            <a:r>
+              <a:rPr lang="en-CA" sz="1800" dirty="0"/>
+              <a:t>Photochemically destroyed, causing seasonal ozone holes </a:t>
             </a:r>
           </a:p>
           <a:p>
             <a:r>
               <a:rPr lang="en-CA" dirty="0"/>
-              <a:t>Challenge: Instruments measure ozone differently which creates data uncertainty.</a:t>
-            </a:r>
-          </a:p>
-          <a:p>
-            <a:r>
-              <a:rPr lang="en-CA" dirty="0"/>
-              <a:t>Objective:  Assess consistency of ozone data across ACE-FTS, OSIRIS, and PEARL FTIR.</a:t>
-            </a:r>
-          </a:p>
-          <a:p>
-            <a:r>
-              <a:rPr lang="en-CA" dirty="0"/>
-              <a:t>Approach: Compare individual and aggregated measurements of the instruments.</a:t>
-            </a:r>
-          </a:p>
-          <a:p>
-            <a:r>
-              <a:rPr lang="en-CA" dirty="0"/>
-              <a:t>Why This Work Matters:</a:t>
-            </a:r>
-          </a:p>
-          <a:p>
-            <a:pPr lvl="1"/>
-            <a:r>
-              <a:rPr lang="en-CA" sz="1800" dirty="0"/>
-              <a:t>Ensures reliable ozone data is consistently retrieved from instruments.</a:t>
-            </a:r>
-          </a:p>
-          <a:p>
-            <a:pPr lvl="1"/>
-            <a:r>
-              <a:rPr lang="en-CA" sz="1800" dirty="0"/>
-              <a:t>Enables evidence-based policies (e.g., Montreal Protocol).</a:t>
+              <a:t>Challenge: Instruments measure ozone differently which creates data uncertainty</a:t>
             </a:r>
           </a:p>
         </p:txBody>
@@ -6395,10 +7096,10 @@
       </p:sp>
       <p:sp>
         <p:nvSpPr>
-          <p:cNvPr id="7" name="Slide Number Placeholder 6">
+          <p:cNvPr id="4" name="Slide Number Placeholder 3">
             <a:extLst>
               <a:ext uri="{FF2B5EF4-FFF2-40B4-BE49-F238E27FC236}">
-                <a16:creationId xmlns:a16="http://schemas.microsoft.com/office/drawing/2014/main" id="{17D91D78-3EE2-46D6-7005-7DD92983871E}"/>
+                <a16:creationId xmlns:a16="http://schemas.microsoft.com/office/drawing/2014/main" id="{843ED3EB-F20E-CF0B-B9A2-C7E9342DAC68}"/>
               </a:ext>
             </a:extLst>
           </p:cNvPr>
@@ -6409,12 +7110,7 @@
             <p:ph type="sldNum" sz="quarter" idx="12"/>
           </p:nvPr>
         </p:nvSpPr>
-        <p:spPr>
-          <a:xfrm>
-            <a:off x="11744267" y="69368"/>
-            <a:ext cx="365760" cy="365760"/>
-          </a:xfrm>
-        </p:spPr>
+        <p:spPr/>
         <p:txBody>
           <a:bodyPr/>
           <a:lstStyle/>
@@ -6428,6 +7124,53 @@
           </a:p>
         </p:txBody>
       </p:sp>
+      <p:pic>
+        <p:nvPicPr>
+          <p:cNvPr id="2052" name="Picture 4" descr="UV radiation diagram, entering stratosphere, ozone layer and troposphere">
+            <a:extLst>
+              <a:ext uri="{FF2B5EF4-FFF2-40B4-BE49-F238E27FC236}">
+                <a16:creationId xmlns:a16="http://schemas.microsoft.com/office/drawing/2014/main" id="{678F91E5-A562-C561-02EB-A5ECC49372ED}"/>
+              </a:ext>
+            </a:extLst>
+          </p:cNvPr>
+          <p:cNvPicPr>
+            <a:picLocks noChangeAspect="1" noChangeArrowheads="1"/>
+          </p:cNvPicPr>
+          <p:nvPr/>
+        </p:nvPicPr>
+        <p:blipFill>
+          <a:blip r:embed="rId3">
+            <a:extLst>
+              <a:ext uri="{28A0092B-C50C-407E-A947-70E740481C1C}">
+                <a14:useLocalDpi xmlns:a14="http://schemas.microsoft.com/office/drawing/2010/main" val="0"/>
+              </a:ext>
+            </a:extLst>
+          </a:blip>
+          <a:srcRect/>
+          <a:stretch>
+            <a:fillRect/>
+          </a:stretch>
+        </p:blipFill>
+        <p:spPr bwMode="auto">
+          <a:xfrm>
+            <a:off x="5236932" y="2403265"/>
+            <a:ext cx="5927355" cy="3101983"/>
+          </a:xfrm>
+          <a:prstGeom prst="rect">
+            <a:avLst/>
+          </a:prstGeom>
+          <a:noFill/>
+          <a:extLst>
+            <a:ext uri="{909E8E84-426E-40DD-AFC4-6F175D3DCCD1}">
+              <a14:hiddenFill xmlns:a14="http://schemas.microsoft.com/office/drawing/2010/main">
+                <a:solidFill>
+                  <a:srgbClr val="FFFFFF"/>
+                </a:solidFill>
+              </a14:hiddenFill>
+            </a:ext>
+          </a:extLst>
+        </p:spPr>
+      </p:pic>
     </p:spTree>
     <p:extLst>
       <p:ext uri="{BB962C8B-B14F-4D97-AF65-F5344CB8AC3E}">
@@ -6460,6 +7203,162 @@
       </p:grpSpPr>
       <p:sp>
         <p:nvSpPr>
+          <p:cNvPr id="2" name="Title 1">
+            <a:extLst>
+              <a:ext uri="{FF2B5EF4-FFF2-40B4-BE49-F238E27FC236}">
+                <a16:creationId xmlns:a16="http://schemas.microsoft.com/office/drawing/2014/main" id="{CEC6DA5D-7A7F-12D2-3EFF-397D03162119}"/>
+              </a:ext>
+            </a:extLst>
+          </p:cNvPr>
+          <p:cNvSpPr>
+            <a:spLocks noGrp="1"/>
+          </p:cNvSpPr>
+          <p:nvPr>
+            <p:ph type="title"/>
+          </p:nvPr>
+        </p:nvSpPr>
+        <p:spPr>
+          <a:xfrm>
+            <a:off x="1978616" y="1024327"/>
+            <a:ext cx="8234768" cy="1188720"/>
+          </a:xfrm>
+        </p:spPr>
+        <p:txBody>
+          <a:bodyPr/>
+          <a:lstStyle/>
+          <a:p>
+            <a:r>
+              <a:rPr lang="en-US" dirty="0"/>
+              <a:t>Validating Ozone Data</a:t>
+            </a:r>
+            <a:endParaRPr lang="en-CA" dirty="0"/>
+          </a:p>
+        </p:txBody>
+      </p:sp>
+      <p:sp>
+        <p:nvSpPr>
+          <p:cNvPr id="3" name="Content Placeholder 2">
+            <a:extLst>
+              <a:ext uri="{FF2B5EF4-FFF2-40B4-BE49-F238E27FC236}">
+                <a16:creationId xmlns:a16="http://schemas.microsoft.com/office/drawing/2014/main" id="{88F6A081-0FE9-9A3F-5569-1E3E41852AF4}"/>
+              </a:ext>
+            </a:extLst>
+          </p:cNvPr>
+          <p:cNvSpPr>
+            <a:spLocks noGrp="1"/>
+          </p:cNvSpPr>
+          <p:nvPr>
+            <p:ph idx="1"/>
+          </p:nvPr>
+        </p:nvSpPr>
+        <p:spPr>
+          <a:xfrm>
+            <a:off x="2231136" y="2548591"/>
+            <a:ext cx="7847142" cy="3101983"/>
+          </a:xfrm>
+        </p:spPr>
+        <p:txBody>
+          <a:bodyPr/>
+          <a:lstStyle/>
+          <a:p>
+            <a:r>
+              <a:rPr lang="en-CA" dirty="0"/>
+              <a:t>Objective:  Assess consistency of ozone data across ACE-FTS, OSIRIS, and PEARL FTIR</a:t>
+            </a:r>
+          </a:p>
+          <a:p>
+            <a:r>
+              <a:rPr lang="en-CA" dirty="0"/>
+              <a:t>Approach: Compare individual and aggregated measurements of the instruments</a:t>
+            </a:r>
+          </a:p>
+          <a:p>
+            <a:r>
+              <a:rPr lang="en-CA" dirty="0"/>
+              <a:t>Why This Work Matters:</a:t>
+            </a:r>
+          </a:p>
+          <a:p>
+            <a:pPr lvl="1"/>
+            <a:r>
+              <a:rPr lang="en-CA" sz="1800" dirty="0"/>
+              <a:t>Ensures reliable ozone data is consistently retrieved from instruments</a:t>
+            </a:r>
+          </a:p>
+          <a:p>
+            <a:pPr lvl="1"/>
+            <a:r>
+              <a:rPr lang="en-CA" sz="1800" dirty="0"/>
+              <a:t>Enables evidence-based policies (e.g., Montreal Protocol)</a:t>
+            </a:r>
+          </a:p>
+          <a:p>
+            <a:endParaRPr lang="en-CA" dirty="0"/>
+          </a:p>
+        </p:txBody>
+      </p:sp>
+      <p:sp>
+        <p:nvSpPr>
+          <p:cNvPr id="4" name="Slide Number Placeholder 3">
+            <a:extLst>
+              <a:ext uri="{FF2B5EF4-FFF2-40B4-BE49-F238E27FC236}">
+                <a16:creationId xmlns:a16="http://schemas.microsoft.com/office/drawing/2014/main" id="{FFEE8E89-1311-D152-4A71-73E14AF804F8}"/>
+              </a:ext>
+            </a:extLst>
+          </p:cNvPr>
+          <p:cNvSpPr>
+            <a:spLocks noGrp="1"/>
+          </p:cNvSpPr>
+          <p:nvPr>
+            <p:ph type="sldNum" sz="quarter" idx="12"/>
+          </p:nvPr>
+        </p:nvSpPr>
+        <p:spPr/>
+        <p:txBody>
+          <a:bodyPr/>
+          <a:lstStyle/>
+          <a:p>
+            <a:fld id="{8A7A6979-0714-4377-B894-6BE4C2D6E202}" type="slidenum">
+              <a:rPr lang="en-US" smtClean="0"/>
+              <a:pPr/>
+              <a:t>3</a:t>
+            </a:fld>
+            <a:endParaRPr lang="en-US" dirty="0"/>
+          </a:p>
+        </p:txBody>
+      </p:sp>
+    </p:spTree>
+    <p:extLst>
+      <p:ext uri="{BB962C8B-B14F-4D97-AF65-F5344CB8AC3E}">
+        <p14:creationId xmlns:p14="http://schemas.microsoft.com/office/powerpoint/2010/main" val="399888809"/>
+      </p:ext>
+    </p:extLst>
+  </p:cSld>
+  <p:clrMapOvr>
+    <a:masterClrMapping/>
+  </p:clrMapOvr>
+</p:sld>
+</file>
+
+<file path=ppt/slides/slide4.xml><?xml version="1.0" encoding="utf-8"?>
+<p:sld xmlns:a="http://schemas.openxmlformats.org/drawingml/2006/main" xmlns:r="http://schemas.openxmlformats.org/officeDocument/2006/relationships" xmlns:p="http://schemas.openxmlformats.org/presentationml/2006/main">
+  <p:cSld>
+    <p:spTree>
+      <p:nvGrpSpPr>
+        <p:cNvPr id="1" name=""/>
+        <p:cNvGrpSpPr/>
+        <p:nvPr/>
+      </p:nvGrpSpPr>
+      <p:grpSpPr>
+        <a:xfrm>
+          <a:off x="0" y="0"/>
+          <a:ext cx="0" cy="0"/>
+          <a:chOff x="0" y="0"/>
+          <a:chExt cx="0" cy="0"/>
+        </a:xfrm>
+      </p:grpSpPr>
+      <p:sp>
+        <p:nvSpPr>
           <p:cNvPr id="6" name="Title 5">
             <a:extLst>
               <a:ext uri="{FF2B5EF4-FFF2-40B4-BE49-F238E27FC236}">
@@ -6476,12 +7375,14 @@
         </p:nvSpPr>
         <p:spPr>
           <a:xfrm>
-            <a:off x="2231136" y="731520"/>
-            <a:ext cx="7729728" cy="1188720"/>
+            <a:off x="1789772" y="731520"/>
+            <a:ext cx="8612455" cy="1188720"/>
           </a:xfrm>
         </p:spPr>
         <p:txBody>
-          <a:bodyPr/>
+          <a:bodyPr>
+            <a:normAutofit/>
+          </a:bodyPr>
           <a:lstStyle/>
           <a:p>
             <a:r>
@@ -6509,25 +7410,31 @@
         </p:nvSpPr>
         <p:spPr>
           <a:xfrm>
-            <a:off x="1077985" y="2336185"/>
-            <a:ext cx="4270375" cy="2597150"/>
+            <a:off x="958716" y="2155803"/>
+            <a:ext cx="5137284" cy="2781958"/>
           </a:xfrm>
         </p:spPr>
         <p:txBody>
           <a:bodyPr>
-            <a:normAutofit/>
+            <a:noAutofit/>
           </a:bodyPr>
           <a:lstStyle/>
           <a:p>
             <a:r>
               <a:rPr lang="en-CA" dirty="0"/>
-              <a:t>ACE-FTS is one of the two main instruments on the SCI-SAT</a:t>
+              <a:t>ACE-FTS stands for Atmospheric chemistry experiment Fourier transform spectrometer</a:t>
             </a:r>
           </a:p>
           <a:p>
             <a:r>
               <a:rPr lang="en-CA" dirty="0"/>
-              <a:t>SCI-SAT was launched in 2003</a:t>
+              <a:t>ACE-FTS is one of the two main instruments on the SCISAT</a:t>
+            </a:r>
+          </a:p>
+          <a:p>
+            <a:r>
+              <a:rPr lang="en-CA" dirty="0"/>
+              <a:t>SCISAT was launched in 2003</a:t>
             </a:r>
           </a:p>
           <a:p>
@@ -6538,11 +7445,9 @@
           </a:p>
           <a:p>
             <a:r>
-              <a:rPr lang="en-CA" dirty="0"/>
-              <a:t>ACE-FTS uses Fourier Transform to produce absorption spectra</a:t>
-            </a:r>
-          </a:p>
-          <a:p>
+              <a:rPr lang="en-US" dirty="0"/>
+              <a:t>ACE‑FTS applies Fourier transform to interferograms to yield absorption spectra</a:t>
+            </a:r>
             <a:endParaRPr lang="en-CA" dirty="0"/>
           </a:p>
         </p:txBody>
@@ -6562,7 +7467,7 @@
         <p:spPr>
           <a:xfrm>
             <a:off x="457200" y="6126480"/>
-            <a:ext cx="9768840" cy="400110"/>
+            <a:ext cx="9768840" cy="553998"/>
           </a:xfrm>
           <a:prstGeom prst="rect">
             <a:avLst/>
@@ -6621,6 +7526,19 @@
                 <a:srgbClr val="646464"/>
               </a:solidFill>
             </a:endParaRPr>
+          </a:p>
+          <a:p>
+            <a:pPr marL="228600" indent="-228600">
+              <a:buAutoNum type="arabicPeriod"/>
+            </a:pPr>
+            <a:r>
+              <a:rPr lang="en-US" sz="1000" dirty="0">
+                <a:solidFill>
+                  <a:srgbClr val="646464"/>
+                </a:solidFill>
+              </a:rPr>
+              <a:t>https://www.nasa.gov/image-article/scientific-satellite-atmospheric-chemistry-experiment-1-scisat-1/</a:t>
+            </a:r>
           </a:p>
         </p:txBody>
       </p:sp>
@@ -6671,70 +7589,82 @@
           </a:extLst>
         </p:spPr>
       </p:pic>
+      <p:sp>
+        <p:nvSpPr>
+          <p:cNvPr id="2" name="Slide Number Placeholder 1">
+            <a:extLst>
+              <a:ext uri="{FF2B5EF4-FFF2-40B4-BE49-F238E27FC236}">
+                <a16:creationId xmlns:a16="http://schemas.microsoft.com/office/drawing/2014/main" id="{523288A5-7634-38BC-ED3C-5A58EF198A50}"/>
+              </a:ext>
+            </a:extLst>
+          </p:cNvPr>
+          <p:cNvSpPr>
+            <a:spLocks noGrp="1"/>
+          </p:cNvSpPr>
+          <p:nvPr>
+            <p:ph type="sldNum" sz="quarter" idx="12"/>
+          </p:nvPr>
+        </p:nvSpPr>
+        <p:spPr/>
+        <p:txBody>
+          <a:bodyPr/>
+          <a:lstStyle/>
+          <a:p>
+            <a:fld id="{8A7A6979-0714-4377-B894-6BE4C2D6E202}" type="slidenum">
+              <a:rPr lang="en-US" smtClean="0"/>
+              <a:t>4</a:t>
+            </a:fld>
+            <a:endParaRPr lang="en-US" dirty="0"/>
+          </a:p>
+        </p:txBody>
+      </p:sp>
       <p:pic>
         <p:nvPicPr>
-          <p:cNvPr id="12" name="Content Placeholder 4" descr="A sun in the sky&#10;&#10;AI-generated content may be incorrect.">
+          <p:cNvPr id="1026" name="Picture 2" descr="Scientific Satellite Atmospheric Chemistry Experiment 1 (SciSAT-1)">
             <a:extLst>
               <a:ext uri="{FF2B5EF4-FFF2-40B4-BE49-F238E27FC236}">
-                <a16:creationId xmlns:a16="http://schemas.microsoft.com/office/drawing/2014/main" id="{3D0483D6-3B64-6B6D-49A0-824ED02147C2}"/>
+                <a16:creationId xmlns:a16="http://schemas.microsoft.com/office/drawing/2014/main" id="{C4847228-8927-11DF-FC85-341791184E72}"/>
               </a:ext>
             </a:extLst>
           </p:cNvPr>
           <p:cNvPicPr>
-            <a:picLocks noChangeAspect="1"/>
+            <a:picLocks noChangeAspect="1" noChangeArrowheads="1"/>
           </p:cNvPicPr>
           <p:nvPr/>
         </p:nvPicPr>
         <p:blipFill>
-          <a:blip r:embed="rId5"/>
+          <a:blip r:embed="rId5">
+            <a:extLst>
+              <a:ext uri="{28A0092B-C50C-407E-A947-70E740481C1C}">
+                <a14:useLocalDpi xmlns:a14="http://schemas.microsoft.com/office/drawing/2010/main" val="0"/>
+              </a:ext>
+            </a:extLst>
+          </a:blip>
+          <a:srcRect/>
           <a:stretch>
             <a:fillRect/>
           </a:stretch>
         </p:blipFill>
-        <p:spPr>
+        <p:spPr bwMode="auto">
           <a:xfrm>
-            <a:off x="5613325" y="2143542"/>
-            <a:ext cx="6238921" cy="2965657"/>
+            <a:off x="6322474" y="2155803"/>
+            <a:ext cx="4362091" cy="3271568"/>
           </a:xfrm>
           <a:prstGeom prst="rect">
             <a:avLst/>
           </a:prstGeom>
+          <a:noFill/>
+          <a:extLst>
+            <a:ext uri="{909E8E84-426E-40DD-AFC4-6F175D3DCCD1}">
+              <a14:hiddenFill xmlns:a14="http://schemas.microsoft.com/office/drawing/2010/main">
+                <a:solidFill>
+                  <a:srgbClr val="FFFFFF"/>
+                </a:solidFill>
+              </a14:hiddenFill>
+            </a:ext>
+          </a:extLst>
         </p:spPr>
       </p:pic>
-      <p:sp>
-        <p:nvSpPr>
-          <p:cNvPr id="3" name="Slide Number Placeholder 2">
-            <a:extLst>
-              <a:ext uri="{FF2B5EF4-FFF2-40B4-BE49-F238E27FC236}">
-                <a16:creationId xmlns:a16="http://schemas.microsoft.com/office/drawing/2014/main" id="{38FD6F18-F0C8-A6E0-FBE9-9EEA6C935410}"/>
-              </a:ext>
-            </a:extLst>
-          </p:cNvPr>
-          <p:cNvSpPr>
-            <a:spLocks noGrp="1"/>
-          </p:cNvSpPr>
-          <p:nvPr>
-            <p:ph type="sldNum" sz="quarter" idx="12"/>
-          </p:nvPr>
-        </p:nvSpPr>
-        <p:spPr>
-          <a:xfrm>
-            <a:off x="11744266" y="77251"/>
-            <a:ext cx="365760" cy="365760"/>
-          </a:xfrm>
-        </p:spPr>
-        <p:txBody>
-          <a:bodyPr/>
-          <a:lstStyle/>
-          <a:p>
-            <a:fld id="{8A7A6979-0714-4377-B894-6BE4C2D6E202}" type="slidenum">
-              <a:rPr lang="en-US" smtClean="0"/>
-              <a:t>3</a:t>
-            </a:fld>
-            <a:endParaRPr lang="en-US" dirty="0"/>
-          </a:p>
-        </p:txBody>
-      </p:sp>
     </p:spTree>
     <p:extLst>
       <p:ext uri="{BB962C8B-B14F-4D97-AF65-F5344CB8AC3E}">
@@ -6779,7 +7709,7 @@
                                           </p:stCondLst>
                                         </p:cTn>
                                         <p:tgtEl>
-                                          <p:spTgt spid="12"/>
+                                          <p:spTgt spid="1026"/>
                                         </p:tgtEl>
                                         <p:attrNameLst>
                                           <p:attrName>style.visibility</p:attrName>
@@ -6823,7 +7753,7 @@
 </p:sld>
 </file>
 
-<file path=ppt/slides/slide4.xml><?xml version="1.0" encoding="utf-8"?>
+<file path=ppt/slides/slide5.xml><?xml version="1.0" encoding="utf-8"?>
 <p:sld xmlns:a="http://schemas.openxmlformats.org/drawingml/2006/main" xmlns:r="http://schemas.openxmlformats.org/officeDocument/2006/relationships" xmlns:p="http://schemas.openxmlformats.org/presentationml/2006/main">
   <p:cSld>
     <p:spTree>
@@ -6873,10 +7803,9 @@
           <a:lstStyle/>
           <a:p>
             <a:r>
-              <a:rPr lang="en-CA" dirty="0" err="1"/>
-              <a:t>osiris</a:t>
-            </a:r>
-            <a:endParaRPr lang="en-CA" dirty="0"/>
+              <a:rPr lang="en-CA" dirty="0"/>
+              <a:t>Osiris</a:t>
+            </a:r>
           </a:p>
         </p:txBody>
       </p:sp>
@@ -6959,9 +7888,15 @@
         </p:spPr>
         <p:txBody>
           <a:bodyPr>
-            <a:normAutofit/>
+            <a:noAutofit/>
           </a:bodyPr>
           <a:lstStyle/>
+          <a:p>
+            <a:r>
+              <a:rPr lang="en-CA" dirty="0"/>
+              <a:t>OSIRIS stands for Optical Spectrograph and InfraRed Imaging System</a:t>
+            </a:r>
+          </a:p>
           <a:p>
             <a:r>
               <a:rPr lang="en-CA" dirty="0"/>
@@ -7074,10 +8009,10 @@
       </p:pic>
       <p:sp>
         <p:nvSpPr>
-          <p:cNvPr id="4" name="Slide Number Placeholder 3">
+          <p:cNvPr id="2" name="Slide Number Placeholder 1">
             <a:extLst>
               <a:ext uri="{FF2B5EF4-FFF2-40B4-BE49-F238E27FC236}">
-                <a16:creationId xmlns:a16="http://schemas.microsoft.com/office/drawing/2014/main" id="{D24F7FB0-496C-52A4-3937-8613DFF01FB2}"/>
+                <a16:creationId xmlns:a16="http://schemas.microsoft.com/office/drawing/2014/main" id="{E21E58AF-D2D2-38B9-44B4-476877A841DD}"/>
               </a:ext>
             </a:extLst>
           </p:cNvPr>
@@ -7095,7 +8030,7 @@
           <a:p>
             <a:fld id="{8A7A6979-0714-4377-B894-6BE4C2D6E202}" type="slidenum">
               <a:rPr lang="en-US" smtClean="0"/>
-              <a:t>4</a:t>
+              <a:t>5</a:t>
             </a:fld>
             <a:endParaRPr lang="en-US" dirty="0"/>
           </a:p>
@@ -7189,7 +8124,7 @@
 </p:sld>
 </file>
 
-<file path=ppt/slides/slide5.xml><?xml version="1.0" encoding="utf-8"?>
+<file path=ppt/slides/slide6.xml><?xml version="1.0" encoding="utf-8"?>
 <p:sld xmlns:a="http://schemas.openxmlformats.org/drawingml/2006/main" xmlns:r="http://schemas.openxmlformats.org/officeDocument/2006/relationships" xmlns:p="http://schemas.openxmlformats.org/presentationml/2006/main">
   <p:cSld>
     <p:spTree>
@@ -7257,15 +8192,26 @@
         </p:nvSpPr>
         <p:spPr>
           <a:xfrm>
-            <a:off x="1107010" y="2421880"/>
-            <a:ext cx="6244573" cy="2166898"/>
+            <a:off x="848910" y="2421881"/>
+            <a:ext cx="6456668" cy="2166898"/>
           </a:xfrm>
         </p:spPr>
         <p:txBody>
           <a:bodyPr>
-            <a:normAutofit/>
+            <a:noAutofit/>
           </a:bodyPr>
           <a:lstStyle/>
+          <a:p>
+            <a:r>
+              <a:rPr lang="en-CA" dirty="0"/>
+              <a:t>PEARL FTIR stands for </a:t>
+            </a:r>
+            <a:r>
+              <a:rPr lang="en-US" dirty="0"/>
+              <a:t>Polar Environment Atmospheric Research Laboratory Fourier-Transform Infra-Red Spectrometer</a:t>
+            </a:r>
+            <a:endParaRPr lang="en-CA" dirty="0"/>
+          </a:p>
           <a:p>
             <a:r>
               <a:rPr lang="en-CA" dirty="0"/>
@@ -7363,7 +8309,7 @@
         </p:blipFill>
         <p:spPr bwMode="auto">
           <a:xfrm>
-            <a:off x="7351583" y="2421881"/>
+            <a:off x="7510609" y="2421881"/>
             <a:ext cx="3991507" cy="2999358"/>
           </a:xfrm>
           <a:prstGeom prst="rect">
@@ -7386,7 +8332,7 @@
           <p:cNvPr id="5" name="Slide Number Placeholder 4">
             <a:extLst>
               <a:ext uri="{FF2B5EF4-FFF2-40B4-BE49-F238E27FC236}">
-                <a16:creationId xmlns:a16="http://schemas.microsoft.com/office/drawing/2014/main" id="{48B1D1FC-C9E1-093C-56A1-7C44F185C140}"/>
+                <a16:creationId xmlns:a16="http://schemas.microsoft.com/office/drawing/2014/main" id="{F41A1C12-B62F-C3A4-C1A9-BDAAFB25F1BC}"/>
               </a:ext>
             </a:extLst>
           </p:cNvPr>
@@ -7405,7 +8351,7 @@
             <a:fld id="{8A7A6979-0714-4377-B894-6BE4C2D6E202}" type="slidenum">
               <a:rPr lang="en-US" smtClean="0"/>
               <a:pPr/>
-              <a:t>5</a:t>
+              <a:t>6</a:t>
             </a:fld>
             <a:endParaRPr lang="en-US" dirty="0"/>
           </a:p>
@@ -7424,7 +8370,7 @@
 </p:sld>
 </file>
 
-<file path=ppt/slides/slide6.xml><?xml version="1.0" encoding="utf-8"?>
+<file path=ppt/slides/slide7.xml><?xml version="1.0" encoding="utf-8"?>
 <p:sld xmlns:a="http://schemas.openxmlformats.org/drawingml/2006/main" xmlns:r="http://schemas.openxmlformats.org/officeDocument/2006/relationships" xmlns:p="http://schemas.openxmlformats.org/presentationml/2006/main">
   <p:cSld>
     <p:bg>
@@ -7657,7 +8603,7 @@
           <p:cNvPr id="2" name="Slide Number Placeholder 1">
             <a:extLst>
               <a:ext uri="{FF2B5EF4-FFF2-40B4-BE49-F238E27FC236}">
-                <a16:creationId xmlns:a16="http://schemas.microsoft.com/office/drawing/2014/main" id="{CE762899-B7A2-6113-D166-016D8825978B}"/>
+                <a16:creationId xmlns:a16="http://schemas.microsoft.com/office/drawing/2014/main" id="{323E9378-F876-01D9-A3E4-A8DAA4F6BA98}"/>
               </a:ext>
             </a:extLst>
           </p:cNvPr>
@@ -7676,7 +8622,7 @@
             <a:fld id="{8A7A6979-0714-4377-B894-6BE4C2D6E202}" type="slidenum">
               <a:rPr lang="en-US" smtClean="0"/>
               <a:pPr/>
-              <a:t>6</a:t>
+              <a:t>7</a:t>
             </a:fld>
             <a:endParaRPr lang="en-US" dirty="0"/>
           </a:p>
@@ -7695,7 +8641,7 @@
 </p:sld>
 </file>
 
-<file path=ppt/slides/slide7.xml><?xml version="1.0" encoding="utf-8"?>
+<file path=ppt/slides/slide8.xml><?xml version="1.0" encoding="utf-8"?>
 <p:sld xmlns:a="http://schemas.openxmlformats.org/drawingml/2006/main" xmlns:r="http://schemas.openxmlformats.org/officeDocument/2006/relationships" xmlns:p="http://schemas.openxmlformats.org/presentationml/2006/main">
   <p:cSld>
     <p:spTree>
@@ -8088,7 +9034,7 @@
           <p:cNvPr id="5" name="Slide Number Placeholder 4">
             <a:extLst>
               <a:ext uri="{FF2B5EF4-FFF2-40B4-BE49-F238E27FC236}">
-                <a16:creationId xmlns:a16="http://schemas.microsoft.com/office/drawing/2014/main" id="{E496B972-740E-E533-C348-BFB74C1FF94E}"/>
+                <a16:creationId xmlns:a16="http://schemas.microsoft.com/office/drawing/2014/main" id="{9B2ACD33-113D-4148-DA9B-A37063F07967}"/>
               </a:ext>
             </a:extLst>
           </p:cNvPr>
@@ -8106,7 +9052,7 @@
           <a:p>
             <a:fld id="{8A7A6979-0714-4377-B894-6BE4C2D6E202}" type="slidenum">
               <a:rPr lang="en-US" smtClean="0"/>
-              <a:t>7</a:t>
+              <a:t>8</a:t>
             </a:fld>
             <a:endParaRPr lang="en-US" dirty="0"/>
           </a:p>
@@ -8125,7 +9071,7 @@
 </p:sld>
 </file>
 
-<file path=ppt/slides/slide8.xml><?xml version="1.0" encoding="utf-8"?>
+<file path=ppt/slides/slide9.xml><?xml version="1.0" encoding="utf-8"?>
 <p:sld xmlns:a="http://schemas.openxmlformats.org/drawingml/2006/main" xmlns:r="http://schemas.openxmlformats.org/officeDocument/2006/relationships" xmlns:p="http://schemas.openxmlformats.org/presentationml/2006/main">
   <p:cSld>
     <p:spTree>
@@ -8175,8 +9121,8 @@
           </a:p>
         </p:txBody>
       </p:sp>
-      <mc:AlternateContent xmlns:mc="http://schemas.openxmlformats.org/markup-compatibility/2006" xmlns:a14="http://schemas.microsoft.com/office/drawing/2010/main">
-        <mc:Choice Requires="a14">
+      <mc:AlternateContent xmlns:mc="http://schemas.openxmlformats.org/markup-compatibility/2006">
+        <mc:Choice xmlns:a14="http://schemas.microsoft.com/office/drawing/2010/main" Requires="a14">
           <p:sp>
             <p:nvSpPr>
               <p:cNvPr id="3" name="Content Placeholder 2">
@@ -8966,7 +9912,7 @@
             </p:txBody>
           </p:sp>
         </mc:Choice>
-        <mc:Fallback xmlns="">
+        <mc:Fallback>
           <p:sp>
             <p:nvSpPr>
               <p:cNvPr id="3" name="Content Placeholder 2">
@@ -9011,7 +9957,7 @@
           <p:cNvPr id="4" name="Slide Number Placeholder 3">
             <a:extLst>
               <a:ext uri="{FF2B5EF4-FFF2-40B4-BE49-F238E27FC236}">
-                <a16:creationId xmlns:a16="http://schemas.microsoft.com/office/drawing/2014/main" id="{89F94756-8CD5-8C63-1ADA-0329EED84EB6}"/>
+                <a16:creationId xmlns:a16="http://schemas.microsoft.com/office/drawing/2014/main" id="{C17927C6-4B48-4AF7-5FCE-B44936EF5D06}"/>
               </a:ext>
             </a:extLst>
           </p:cNvPr>
@@ -9030,7 +9976,7 @@
             <a:fld id="{8A7A6979-0714-4377-B894-6BE4C2D6E202}" type="slidenum">
               <a:rPr lang="en-US" smtClean="0"/>
               <a:pPr/>
-              <a:t>8</a:t>
+              <a:t>9</a:t>
             </a:fld>
             <a:endParaRPr lang="en-US" dirty="0"/>
           </a:p>
@@ -9040,287 +9986,6 @@
     <p:extLst>
       <p:ext uri="{BB962C8B-B14F-4D97-AF65-F5344CB8AC3E}">
         <p14:creationId xmlns:p14="http://schemas.microsoft.com/office/powerpoint/2010/main" val="56333691"/>
-      </p:ext>
-    </p:extLst>
-  </p:cSld>
-  <p:clrMapOvr>
-    <a:masterClrMapping/>
-  </p:clrMapOvr>
-</p:sld>
-</file>
-
-<file path=ppt/slides/slide9.xml><?xml version="1.0" encoding="utf-8"?>
-<p:sld xmlns:a="http://schemas.openxmlformats.org/drawingml/2006/main" xmlns:r="http://schemas.openxmlformats.org/officeDocument/2006/relationships" xmlns:p="http://schemas.openxmlformats.org/presentationml/2006/main">
-  <p:cSld>
-    <p:bg>
-      <p:bgPr>
-        <a:solidFill>
-          <a:schemeClr val="bg1">
-            <a:lumMod val="95000"/>
-          </a:schemeClr>
-        </a:solidFill>
-        <a:effectLst/>
-      </p:bgPr>
-    </p:bg>
-    <p:spTree>
-      <p:nvGrpSpPr>
-        <p:cNvPr id="1" name=""/>
-        <p:cNvGrpSpPr/>
-        <p:nvPr/>
-      </p:nvGrpSpPr>
-      <p:grpSpPr>
-        <a:xfrm>
-          <a:off x="0" y="0"/>
-          <a:ext cx="0" cy="0"/>
-          <a:chOff x="0" y="0"/>
-          <a:chExt cx="0" cy="0"/>
-        </a:xfrm>
-      </p:grpSpPr>
-      <p:pic>
-        <p:nvPicPr>
-          <p:cNvPr id="4" name="Picture 3">
-            <a:extLst>
-              <a:ext uri="{FF2B5EF4-FFF2-40B4-BE49-F238E27FC236}">
-                <a16:creationId xmlns:a16="http://schemas.microsoft.com/office/drawing/2014/main" id="{3B75B243-0D6F-0E75-F6C9-53AC15AC1C72}"/>
-              </a:ext>
-            </a:extLst>
-          </p:cNvPr>
-          <p:cNvPicPr>
-            <a:picLocks noChangeAspect="1"/>
-          </p:cNvPicPr>
-          <p:nvPr/>
-        </p:nvPicPr>
-        <p:blipFill>
-          <a:blip r:embed="rId3"/>
-          <a:stretch>
-            <a:fillRect/>
-          </a:stretch>
-        </p:blipFill>
-        <p:spPr>
-          <a:xfrm>
-            <a:off x="5804457" y="-8389"/>
-            <a:ext cx="6387543" cy="3415510"/>
-          </a:xfrm>
-          <a:prstGeom prst="rect">
-            <a:avLst/>
-          </a:prstGeom>
-        </p:spPr>
-      </p:pic>
-      <p:pic>
-        <p:nvPicPr>
-          <p:cNvPr id="9" name="Content Placeholder 8">
-            <a:extLst>
-              <a:ext uri="{FF2B5EF4-FFF2-40B4-BE49-F238E27FC236}">
-                <a16:creationId xmlns:a16="http://schemas.microsoft.com/office/drawing/2014/main" id="{8A3EF694-355E-630E-17A6-A6D209B233FA}"/>
-              </a:ext>
-            </a:extLst>
-          </p:cNvPr>
-          <p:cNvPicPr>
-            <a:picLocks noGrp="1" noChangeAspect="1"/>
-          </p:cNvPicPr>
-          <p:nvPr>
-            <p:ph sz="half" idx="2"/>
-          </p:nvPr>
-        </p:nvPicPr>
-        <p:blipFill>
-          <a:blip r:embed="rId4"/>
-          <a:stretch>
-            <a:fillRect/>
-          </a:stretch>
-        </p:blipFill>
-        <p:spPr>
-          <a:xfrm>
-            <a:off x="5804457" y="3448878"/>
-            <a:ext cx="6387544" cy="3429000"/>
-          </a:xfrm>
-        </p:spPr>
-      </p:pic>
-      <p:cxnSp>
-        <p:nvCxnSpPr>
-          <p:cNvPr id="5" name="Straight Connector 4">
-            <a:extLst>
-              <a:ext uri="{FF2B5EF4-FFF2-40B4-BE49-F238E27FC236}">
-                <a16:creationId xmlns:a16="http://schemas.microsoft.com/office/drawing/2014/main" id="{DE1713F3-A061-02C9-BA8F-ABA4E84356C4}"/>
-              </a:ext>
-            </a:extLst>
-          </p:cNvPr>
-          <p:cNvCxnSpPr>
-            <a:cxnSpLocks/>
-          </p:cNvCxnSpPr>
-          <p:nvPr/>
-        </p:nvCxnSpPr>
-        <p:spPr>
-          <a:xfrm flipH="1">
-            <a:off x="5804457" y="3419855"/>
-            <a:ext cx="6440810" cy="29023"/>
-          </a:xfrm>
-          <a:prstGeom prst="line">
-            <a:avLst/>
-          </a:prstGeom>
-          <a:ln w="57150">
-            <a:solidFill>
-              <a:schemeClr val="tx1"/>
-            </a:solidFill>
-          </a:ln>
-        </p:spPr>
-        <p:style>
-          <a:lnRef idx="1">
-            <a:schemeClr val="accent1"/>
-          </a:lnRef>
-          <a:fillRef idx="0">
-            <a:schemeClr val="accent1"/>
-          </a:fillRef>
-          <a:effectRef idx="0">
-            <a:schemeClr val="accent1"/>
-          </a:effectRef>
-          <a:fontRef idx="minor">
-            <a:schemeClr val="tx1"/>
-          </a:fontRef>
-        </p:style>
-      </p:cxnSp>
-      <p:cxnSp>
-        <p:nvCxnSpPr>
-          <p:cNvPr id="8" name="Straight Connector 7">
-            <a:extLst>
-              <a:ext uri="{FF2B5EF4-FFF2-40B4-BE49-F238E27FC236}">
-                <a16:creationId xmlns:a16="http://schemas.microsoft.com/office/drawing/2014/main" id="{E2668E73-A410-0AC3-C4A7-CBE128CAAAEC}"/>
-              </a:ext>
-            </a:extLst>
-          </p:cNvPr>
-          <p:cNvCxnSpPr>
-            <a:cxnSpLocks/>
-          </p:cNvCxnSpPr>
-          <p:nvPr/>
-        </p:nvCxnSpPr>
-        <p:spPr>
-          <a:xfrm flipV="1">
-            <a:off x="5804457" y="-21879"/>
-            <a:ext cx="0" cy="6858000"/>
-          </a:xfrm>
-          <a:prstGeom prst="line">
-            <a:avLst/>
-          </a:prstGeom>
-          <a:ln w="57150">
-            <a:solidFill>
-              <a:schemeClr val="tx1"/>
-            </a:solidFill>
-          </a:ln>
-        </p:spPr>
-        <p:style>
-          <a:lnRef idx="1">
-            <a:schemeClr val="accent1"/>
-          </a:lnRef>
-          <a:fillRef idx="0">
-            <a:schemeClr val="accent1"/>
-          </a:fillRef>
-          <a:effectRef idx="0">
-            <a:schemeClr val="accent1"/>
-          </a:effectRef>
-          <a:fontRef idx="minor">
-            <a:schemeClr val="tx1"/>
-          </a:fontRef>
-        </p:style>
-      </p:cxnSp>
-      <p:pic>
-        <p:nvPicPr>
-          <p:cNvPr id="14" name="Content Placeholder 3">
-            <a:extLst>
-              <a:ext uri="{FF2B5EF4-FFF2-40B4-BE49-F238E27FC236}">
-                <a16:creationId xmlns:a16="http://schemas.microsoft.com/office/drawing/2014/main" id="{3FCE4965-ABD8-6ED4-A23D-B4ED60437C6A}"/>
-              </a:ext>
-            </a:extLst>
-          </p:cNvPr>
-          <p:cNvPicPr>
-            <a:picLocks noGrp="1" noChangeAspect="1"/>
-          </p:cNvPicPr>
-          <p:nvPr>
-            <p:ph idx="1"/>
-          </p:nvPr>
-        </p:nvPicPr>
-        <p:blipFill>
-          <a:blip r:embed="rId5"/>
-          <a:stretch>
-            <a:fillRect/>
-          </a:stretch>
-        </p:blipFill>
-        <p:spPr>
-          <a:xfrm>
-            <a:off x="0" y="2150231"/>
-            <a:ext cx="5771764" cy="2597294"/>
-          </a:xfrm>
-          <a:prstGeom prst="rect">
-            <a:avLst/>
-          </a:prstGeom>
-        </p:spPr>
-      </p:pic>
-      <p:sp>
-        <p:nvSpPr>
-          <p:cNvPr id="15" name="Title 1">
-            <a:extLst>
-              <a:ext uri="{FF2B5EF4-FFF2-40B4-BE49-F238E27FC236}">
-                <a16:creationId xmlns:a16="http://schemas.microsoft.com/office/drawing/2014/main" id="{E28340B0-E310-B2EF-EFC4-0A93876FE4E2}"/>
-              </a:ext>
-            </a:extLst>
-          </p:cNvPr>
-          <p:cNvSpPr>
-            <a:spLocks noGrp="1"/>
-          </p:cNvSpPr>
-          <p:nvPr>
-            <p:ph type="title"/>
-          </p:nvPr>
-        </p:nvSpPr>
-        <p:spPr>
-          <a:xfrm>
-            <a:off x="824286" y="271655"/>
-            <a:ext cx="4106184" cy="1146337"/>
-          </a:xfrm>
-        </p:spPr>
-        <p:txBody>
-          <a:bodyPr vert="horz" lIns="182880" tIns="182880" rIns="182880" bIns="182880" rtlCol="0" anchor="ctr">
-            <a:noAutofit/>
-          </a:bodyPr>
-          <a:lstStyle/>
-          <a:p>
-            <a:r>
-              <a:rPr lang="en-US" sz="2100" dirty="0"/>
-              <a:t>OSIRIS vs ACE-FTS OZONE PROFILE PLOTS</a:t>
-            </a:r>
-          </a:p>
-        </p:txBody>
-      </p:sp>
-      <p:sp>
-        <p:nvSpPr>
-          <p:cNvPr id="2" name="Slide Number Placeholder 1">
-            <a:extLst>
-              <a:ext uri="{FF2B5EF4-FFF2-40B4-BE49-F238E27FC236}">
-                <a16:creationId xmlns:a16="http://schemas.microsoft.com/office/drawing/2014/main" id="{66C76ACE-9E9E-5020-7496-5D6C1F8A9CF7}"/>
-              </a:ext>
-            </a:extLst>
-          </p:cNvPr>
-          <p:cNvSpPr>
-            <a:spLocks noGrp="1"/>
-          </p:cNvSpPr>
-          <p:nvPr>
-            <p:ph type="sldNum" sz="quarter" idx="12"/>
-          </p:nvPr>
-        </p:nvSpPr>
-        <p:spPr/>
-        <p:txBody>
-          <a:bodyPr/>
-          <a:lstStyle/>
-          <a:p>
-            <a:fld id="{8A7A6979-0714-4377-B894-6BE4C2D6E202}" type="slidenum">
-              <a:rPr lang="en-US" smtClean="0"/>
-              <a:t>9</a:t>
-            </a:fld>
-            <a:endParaRPr lang="en-US" dirty="0"/>
-          </a:p>
-        </p:txBody>
-      </p:sp>
-    </p:spTree>
-    <p:extLst>
-      <p:ext uri="{BB962C8B-B14F-4D97-AF65-F5344CB8AC3E}">
-        <p14:creationId xmlns:p14="http://schemas.microsoft.com/office/powerpoint/2010/main" val="3966488039"/>
       </p:ext>
     </p:extLst>
   </p:cSld>
@@ -10277,306 +10942,6 @@
 </we:webextension>
 </file>
 
-<file path=customXml/item1.xml><?xml version="1.0" encoding="utf-8"?>
-<ct:contentTypeSchema xmlns:ct="http://schemas.microsoft.com/office/2006/metadata/contentType" xmlns:ma="http://schemas.microsoft.com/office/2006/metadata/properties/metaAttributes" ct:_="" ma:_="" ma:contentTypeName="Document" ma:contentTypeID="0x010100F1C098ECAA866A4DB1FC5A2B2BBD7A53" ma:contentTypeVersion="16" ma:contentTypeDescription="Create a new document." ma:contentTypeScope="" ma:versionID="a103264bd586982d6ff00c437eb15130">
-  <xsd:schema xmlns:xsd="http://www.w3.org/2001/XMLSchema" xmlns:xs="http://www.w3.org/2001/XMLSchema" xmlns:p="http://schemas.microsoft.com/office/2006/metadata/properties" xmlns:ns3="7e6d2e68-e2eb-49f7-878f-8779cad349ef" xmlns:ns4="a6ecb0a2-3bdd-43eb-b0ae-32cb03317f95" targetNamespace="http://schemas.microsoft.com/office/2006/metadata/properties" ma:root="true" ma:fieldsID="2351ef589c8b049a48e619c0537cfc0b" ns3:_="" ns4:_="">
-    <xsd:import namespace="7e6d2e68-e2eb-49f7-878f-8779cad349ef"/>
-    <xsd:import namespace="a6ecb0a2-3bdd-43eb-b0ae-32cb03317f95"/>
-    <xsd:element name="properties">
-      <xsd:complexType>
-        <xsd:sequence>
-          <xsd:element name="documentManagement">
-            <xsd:complexType>
-              <xsd:all>
-                <xsd:element ref="ns3:MediaServiceMetadata" minOccurs="0"/>
-                <xsd:element ref="ns3:MediaServiceFastMetadata" minOccurs="0"/>
-                <xsd:element ref="ns3:MediaServiceObjectDetectorVersions" minOccurs="0"/>
-                <xsd:element ref="ns3:MediaServiceGenerationTime" minOccurs="0"/>
-                <xsd:element ref="ns3:MediaServiceEventHashCode" minOccurs="0"/>
-                <xsd:element ref="ns3:MediaServiceAutoTags" minOccurs="0"/>
-                <xsd:element ref="ns3:MediaServiceOCR" minOccurs="0"/>
-                <xsd:element ref="ns3:MediaServiceDateTaken" minOccurs="0"/>
-                <xsd:element ref="ns3:MediaServiceLocation" minOccurs="0"/>
-                <xsd:element ref="ns3:_activity" minOccurs="0"/>
-                <xsd:element ref="ns3:MediaLengthInSeconds" minOccurs="0"/>
-                <xsd:element ref="ns3:MediaServiceSystemTags" minOccurs="0"/>
-                <xsd:element ref="ns4:SharedWithUsers" minOccurs="0"/>
-                <xsd:element ref="ns4:SharedWithDetails" minOccurs="0"/>
-                <xsd:element ref="ns4:SharingHintHash" minOccurs="0"/>
-                <xsd:element ref="ns3:MediaServiceSearchProperties" minOccurs="0"/>
-              </xsd:all>
-            </xsd:complexType>
-          </xsd:element>
-        </xsd:sequence>
-      </xsd:complexType>
-    </xsd:element>
-  </xsd:schema>
-  <xsd:schema xmlns:xsd="http://www.w3.org/2001/XMLSchema" xmlns:xs="http://www.w3.org/2001/XMLSchema" xmlns:dms="http://schemas.microsoft.com/office/2006/documentManagement/types" xmlns:pc="http://schemas.microsoft.com/office/infopath/2007/PartnerControls" targetNamespace="7e6d2e68-e2eb-49f7-878f-8779cad349ef" elementFormDefault="qualified">
-    <xsd:import namespace="http://schemas.microsoft.com/office/2006/documentManagement/types"/>
-    <xsd:import namespace="http://schemas.microsoft.com/office/infopath/2007/PartnerControls"/>
-    <xsd:element name="MediaServiceMetadata" ma:index="8" nillable="true" ma:displayName="MediaServiceMetadata" ma:hidden="true" ma:internalName="MediaServiceMetadata" ma:readOnly="true">
-      <xsd:simpleType>
-        <xsd:restriction base="dms:Note"/>
-      </xsd:simpleType>
-    </xsd:element>
-    <xsd:element name="MediaServiceFastMetadata" ma:index="9" nillable="true" ma:displayName="MediaServiceFastMetadata" ma:hidden="true" ma:internalName="MediaServiceFastMetadata" ma:readOnly="true">
-      <xsd:simpleType>
-        <xsd:restriction base="dms:Note"/>
-      </xsd:simpleType>
-    </xsd:element>
-    <xsd:element name="MediaServiceObjectDetectorVersions" ma:index="10" nillable="true" ma:displayName="MediaServiceObjectDetectorVersions" ma:hidden="true" ma:indexed="true" ma:internalName="MediaServiceObjectDetectorVersions" ma:readOnly="true">
-      <xsd:simpleType>
-        <xsd:restriction base="dms:Text"/>
-      </xsd:simpleType>
-    </xsd:element>
-    <xsd:element name="MediaServiceGenerationTime" ma:index="11" nillable="true" ma:displayName="MediaServiceGenerationTime" ma:hidden="true" ma:internalName="MediaServiceGenerationTime" ma:readOnly="true">
-      <xsd:simpleType>
-        <xsd:restriction base="dms:Text"/>
-      </xsd:simpleType>
-    </xsd:element>
-    <xsd:element name="MediaServiceEventHashCode" ma:index="12" nillable="true" ma:displayName="MediaServiceEventHashCode" ma:hidden="true" ma:internalName="MediaServiceEventHashCode" ma:readOnly="true">
-      <xsd:simpleType>
-        <xsd:restriction base="dms:Text"/>
-      </xsd:simpleType>
-    </xsd:element>
-    <xsd:element name="MediaServiceAutoTags" ma:index="13" nillable="true" ma:displayName="Tags" ma:internalName="MediaServiceAutoTags" ma:readOnly="true">
-      <xsd:simpleType>
-        <xsd:restriction base="dms:Text"/>
-      </xsd:simpleType>
-    </xsd:element>
-    <xsd:element name="MediaServiceOCR" ma:index="14" nillable="true" ma:displayName="Extracted Text" ma:internalName="MediaServiceOCR" ma:readOnly="true">
-      <xsd:simpleType>
-        <xsd:restriction base="dms:Note">
-          <xsd:maxLength value="255"/>
-        </xsd:restriction>
-      </xsd:simpleType>
-    </xsd:element>
-    <xsd:element name="MediaServiceDateTaken" ma:index="15" nillable="true" ma:displayName="MediaServiceDateTaken" ma:hidden="true" ma:indexed="true" ma:internalName="MediaServiceDateTaken" ma:readOnly="true">
-      <xsd:simpleType>
-        <xsd:restriction base="dms:Text"/>
-      </xsd:simpleType>
-    </xsd:element>
-    <xsd:element name="MediaServiceLocation" ma:index="16" nillable="true" ma:displayName="Location" ma:indexed="true" ma:internalName="MediaServiceLocation" ma:readOnly="true">
-      <xsd:simpleType>
-        <xsd:restriction base="dms:Text"/>
-      </xsd:simpleType>
-    </xsd:element>
-    <xsd:element name="_activity" ma:index="17" nillable="true" ma:displayName="_activity" ma:hidden="true" ma:internalName="_activity">
-      <xsd:simpleType>
-        <xsd:restriction base="dms:Note"/>
-      </xsd:simpleType>
-    </xsd:element>
-    <xsd:element name="MediaLengthInSeconds" ma:index="18" nillable="true" ma:displayName="MediaLengthInSeconds" ma:hidden="true" ma:internalName="MediaLengthInSeconds" ma:readOnly="true">
-      <xsd:simpleType>
-        <xsd:restriction base="dms:Unknown"/>
-      </xsd:simpleType>
-    </xsd:element>
-    <xsd:element name="MediaServiceSystemTags" ma:index="19" nillable="true" ma:displayName="MediaServiceSystemTags" ma:hidden="true" ma:internalName="MediaServiceSystemTags" ma:readOnly="true">
-      <xsd:simpleType>
-        <xsd:restriction base="dms:Note"/>
-      </xsd:simpleType>
-    </xsd:element>
-    <xsd:element name="MediaServiceSearchProperties" ma:index="23" nillable="true" ma:displayName="MediaServiceSearchProperties" ma:hidden="true" ma:internalName="MediaServiceSearchProperties" ma:readOnly="true">
-      <xsd:simpleType>
-        <xsd:restriction base="dms:Note"/>
-      </xsd:simpleType>
-    </xsd:element>
-  </xsd:schema>
-  <xsd:schema xmlns:xsd="http://www.w3.org/2001/XMLSchema" xmlns:xs="http://www.w3.org/2001/XMLSchema" xmlns:dms="http://schemas.microsoft.com/office/2006/documentManagement/types" xmlns:pc="http://schemas.microsoft.com/office/infopath/2007/PartnerControls" targetNamespace="a6ecb0a2-3bdd-43eb-b0ae-32cb03317f95" elementFormDefault="qualified">
-    <xsd:import namespace="http://schemas.microsoft.com/office/2006/documentManagement/types"/>
-    <xsd:import namespace="http://schemas.microsoft.com/office/infopath/2007/PartnerControls"/>
-    <xsd:element name="SharedWithUsers" ma:index="20" nillable="true" ma:displayName="Shared With" ma:internalName="SharedWithUsers" ma:readOnly="true">
-      <xsd:complexType>
-        <xsd:complexContent>
-          <xsd:extension base="dms:UserMulti">
-            <xsd:sequence>
-              <xsd:element name="UserInfo" minOccurs="0" maxOccurs="unbounded">
-                <xsd:complexType>
-                  <xsd:sequence>
-                    <xsd:element name="DisplayName" type="xsd:string" minOccurs="0"/>
-                    <xsd:element name="AccountId" type="dms:UserId" minOccurs="0" nillable="true"/>
-                    <xsd:element name="AccountType" type="xsd:string" minOccurs="0"/>
-                  </xsd:sequence>
-                </xsd:complexType>
-              </xsd:element>
-            </xsd:sequence>
-          </xsd:extension>
-        </xsd:complexContent>
-      </xsd:complexType>
-    </xsd:element>
-    <xsd:element name="SharedWithDetails" ma:index="21" nillable="true" ma:displayName="Shared With Details" ma:internalName="SharedWithDetails" ma:readOnly="true">
-      <xsd:simpleType>
-        <xsd:restriction base="dms:Note">
-          <xsd:maxLength value="255"/>
-        </xsd:restriction>
-      </xsd:simpleType>
-    </xsd:element>
-    <xsd:element name="SharingHintHash" ma:index="22" nillable="true" ma:displayName="Sharing Hint Hash" ma:hidden="true" ma:internalName="SharingHintHash" ma:readOnly="true">
-      <xsd:simpleType>
-        <xsd:restriction base="dms:Text"/>
-      </xsd:simpleType>
-    </xsd:element>
-  </xsd:schema>
-  <xsd:schema xmlns="http://schemas.openxmlformats.org/package/2006/metadata/core-properties" xmlns:xsd="http://www.w3.org/2001/XMLSchema" xmlns:xsi="http://www.w3.org/2001/XMLSchema-instance" xmlns:dc="http://purl.org/dc/elements/1.1/" xmlns:dcterms="http://purl.org/dc/terms/" xmlns:odoc="http://schemas.microsoft.com/internal/obd" targetNamespace="http://schemas.openxmlformats.org/package/2006/metadata/core-properties" elementFormDefault="qualified" attributeFormDefault="unqualified" blockDefault="#all">
-    <xsd:import namespace="http://purl.org/dc/elements/1.1/" schemaLocation="http://dublincore.org/schemas/xmls/qdc/2003/04/02/dc.xsd"/>
-    <xsd:import namespace="http://purl.org/dc/terms/" schemaLocation="http://dublincore.org/schemas/xmls/qdc/2003/04/02/dcterms.xsd"/>
-    <xsd:element name="coreProperties" type="CT_coreProperties"/>
-    <xsd:complexType name="CT_coreProperties">
-      <xsd:all>
-        <xsd:element ref="dc:creator" minOccurs="0" maxOccurs="1"/>
-        <xsd:element ref="dcterms:created" minOccurs="0" maxOccurs="1"/>
-        <xsd:element ref="dc:identifier" minOccurs="0" maxOccurs="1"/>
-        <xsd:element name="contentType" minOccurs="0" maxOccurs="1" type="xsd:string" ma:index="0" ma:displayName="Content Type"/>
-        <xsd:element ref="dc:title" minOccurs="0" maxOccurs="1" ma:index="4" ma:displayName="Title"/>
-        <xsd:element ref="dc:subject" minOccurs="0" maxOccurs="1"/>
-        <xsd:element ref="dc:description" minOccurs="0" maxOccurs="1"/>
-        <xsd:element name="keywords" minOccurs="0" maxOccurs="1" type="xsd:string"/>
-        <xsd:element ref="dc:language" minOccurs="0" maxOccurs="1"/>
-        <xsd:element name="category" minOccurs="0" maxOccurs="1" type="xsd:string"/>
-        <xsd:element name="version" minOccurs="0" maxOccurs="1" type="xsd:string"/>
-        <xsd:element name="revision" minOccurs="0" maxOccurs="1" type="xsd:string">
-          <xsd:annotation>
-            <xsd:documentation>
-                        This value indicates the number of saves or revisions. The application is responsible for updating this value after each revision.
-                    </xsd:documentation>
-          </xsd:annotation>
-        </xsd:element>
-        <xsd:element name="lastModifiedBy" minOccurs="0" maxOccurs="1" type="xsd:string"/>
-        <xsd:element ref="dcterms:modified" minOccurs="0" maxOccurs="1"/>
-        <xsd:element name="contentStatus" minOccurs="0" maxOccurs="1" type="xsd:string"/>
-      </xsd:all>
-    </xsd:complexType>
-  </xsd:schema>
-  <xs:schema xmlns:pc="http://schemas.microsoft.com/office/infopath/2007/PartnerControls" xmlns:xs="http://www.w3.org/2001/XMLSchema" targetNamespace="http://schemas.microsoft.com/office/infopath/2007/PartnerControls" elementFormDefault="qualified" attributeFormDefault="unqualified">
-    <xs:element name="Person">
-      <xs:complexType>
-        <xs:sequence>
-          <xs:element ref="pc:DisplayName" minOccurs="0"/>
-          <xs:element ref="pc:AccountId" minOccurs="0"/>
-          <xs:element ref="pc:AccountType" minOccurs="0"/>
-        </xs:sequence>
-      </xs:complexType>
-    </xs:element>
-    <xs:element name="DisplayName" type="xs:string"/>
-    <xs:element name="AccountId" type="xs:string"/>
-    <xs:element name="AccountType" type="xs:string"/>
-    <xs:element name="BDCAssociatedEntity">
-      <xs:complexType>
-        <xs:sequence>
-          <xs:element ref="pc:BDCEntity" minOccurs="0" maxOccurs="unbounded"/>
-        </xs:sequence>
-        <xs:attribute ref="pc:EntityNamespace"/>
-        <xs:attribute ref="pc:EntityName"/>
-        <xs:attribute ref="pc:SystemInstanceName"/>
-        <xs:attribute ref="pc:AssociationName"/>
-      </xs:complexType>
-    </xs:element>
-    <xs:attribute name="EntityNamespace" type="xs:string"/>
-    <xs:attribute name="EntityName" type="xs:string"/>
-    <xs:attribute name="SystemInstanceName" type="xs:string"/>
-    <xs:attribute name="AssociationName" type="xs:string"/>
-    <xs:element name="BDCEntity">
-      <xs:complexType>
-        <xs:sequence>
-          <xs:element ref="pc:EntityDisplayName" minOccurs="0"/>
-          <xs:element ref="pc:EntityInstanceReference" minOccurs="0"/>
-          <xs:element ref="pc:EntityId1" minOccurs="0"/>
-          <xs:element ref="pc:EntityId2" minOccurs="0"/>
-          <xs:element ref="pc:EntityId3" minOccurs="0"/>
-          <xs:element ref="pc:EntityId4" minOccurs="0"/>
-          <xs:element ref="pc:EntityId5" minOccurs="0"/>
-        </xs:sequence>
-      </xs:complexType>
-    </xs:element>
-    <xs:element name="EntityDisplayName" type="xs:string"/>
-    <xs:element name="EntityInstanceReference" type="xs:string"/>
-    <xs:element name="EntityId1" type="xs:string"/>
-    <xs:element name="EntityId2" type="xs:string"/>
-    <xs:element name="EntityId3" type="xs:string"/>
-    <xs:element name="EntityId4" type="xs:string"/>
-    <xs:element name="EntityId5" type="xs:string"/>
-    <xs:element name="Terms">
-      <xs:complexType>
-        <xs:sequence>
-          <xs:element ref="pc:TermInfo" minOccurs="0" maxOccurs="unbounded"/>
-        </xs:sequence>
-      </xs:complexType>
-    </xs:element>
-    <xs:element name="TermInfo">
-      <xs:complexType>
-        <xs:sequence>
-          <xs:element ref="pc:TermName" minOccurs="0"/>
-          <xs:element ref="pc:TermId" minOccurs="0"/>
-        </xs:sequence>
-      </xs:complexType>
-    </xs:element>
-    <xs:element name="TermName" type="xs:string"/>
-    <xs:element name="TermId" type="xs:string"/>
-  </xs:schema>
-</ct:contentTypeSchema>
-</file>
-
-<file path=customXml/item2.xml><?xml version="1.0" encoding="utf-8"?>
-<?mso-contentType ?>
-<FormTemplates xmlns="http://schemas.microsoft.com/sharepoint/v3/contenttype/forms">
-  <Display>DocumentLibraryForm</Display>
-  <Edit>DocumentLibraryForm</Edit>
-  <New>DocumentLibraryForm</New>
-</FormTemplates>
-</file>
-
-<file path=customXml/item3.xml><?xml version="1.0" encoding="utf-8"?>
-<p:properties xmlns:p="http://schemas.microsoft.com/office/2006/metadata/properties" xmlns:xsi="http://www.w3.org/2001/XMLSchema-instance" xmlns:pc="http://schemas.microsoft.com/office/infopath/2007/PartnerControls">
-  <documentManagement>
-    <_activity xmlns="7e6d2e68-e2eb-49f7-878f-8779cad349ef" xsi:nil="true"/>
-  </documentManagement>
-</p:properties>
-</file>
-
-<file path=customXml/itemProps1.xml><?xml version="1.0" encoding="utf-8"?>
-<ds:datastoreItem xmlns:ds="http://schemas.openxmlformats.org/officeDocument/2006/customXml" ds:itemID="{CF6D0201-A1A0-44FC-8B2E-DFA48CE5820E}">
-  <ds:schemaRefs>
-    <ds:schemaRef ds:uri="http://schemas.microsoft.com/office/2006/metadata/contentType"/>
-    <ds:schemaRef ds:uri="http://schemas.microsoft.com/office/2006/metadata/properties/metaAttributes"/>
-    <ds:schemaRef ds:uri="http://www.w3.org/2001/XMLSchema"/>
-    <ds:schemaRef ds:uri="http://schemas.microsoft.com/office/2006/metadata/properties"/>
-    <ds:schemaRef ds:uri="7e6d2e68-e2eb-49f7-878f-8779cad349ef"/>
-    <ds:schemaRef ds:uri="a6ecb0a2-3bdd-43eb-b0ae-32cb03317f95"/>
-    <ds:schemaRef ds:uri="http://schemas.microsoft.com/office/2006/documentManagement/types"/>
-    <ds:schemaRef ds:uri="http://schemas.microsoft.com/office/infopath/2007/PartnerControls"/>
-    <ds:schemaRef ds:uri="http://schemas.openxmlformats.org/package/2006/metadata/core-properties"/>
-    <ds:schemaRef ds:uri="http://purl.org/dc/elements/1.1/"/>
-    <ds:schemaRef ds:uri="http://purl.org/dc/terms/"/>
-    <ds:schemaRef ds:uri="http://schemas.microsoft.com/internal/obd"/>
-  </ds:schemaRefs>
-</ds:datastoreItem>
-</file>
-
-<file path=customXml/itemProps2.xml><?xml version="1.0" encoding="utf-8"?>
-<ds:datastoreItem xmlns:ds="http://schemas.openxmlformats.org/officeDocument/2006/customXml" ds:itemID="{2CEBA9CC-AFAD-4896-8259-CD49C15ABB21}">
-  <ds:schemaRefs>
-    <ds:schemaRef ds:uri="http://schemas.microsoft.com/sharepoint/v3/contenttype/forms"/>
-  </ds:schemaRefs>
-</ds:datastoreItem>
-</file>
-
-<file path=customXml/itemProps3.xml><?xml version="1.0" encoding="utf-8"?>
-<ds:datastoreItem xmlns:ds="http://schemas.openxmlformats.org/officeDocument/2006/customXml" ds:itemID="{71054644-9890-4FFA-8A18-651049CF13B2}">
-  <ds:schemaRefs>
-    <ds:schemaRef ds:uri="7e6d2e68-e2eb-49f7-878f-8779cad349ef"/>
-    <ds:schemaRef ds:uri="http://purl.org/dc/dcmitype/"/>
-    <ds:schemaRef ds:uri="http://purl.org/dc/elements/1.1/"/>
-    <ds:schemaRef ds:uri="a6ecb0a2-3bdd-43eb-b0ae-32cb03317f95"/>
-    <ds:schemaRef ds:uri="http://schemas.microsoft.com/office/2006/metadata/properties"/>
-    <ds:schemaRef ds:uri="http://schemas.microsoft.com/office/2006/documentManagement/types"/>
-    <ds:schemaRef ds:uri="http://schemas.microsoft.com/office/infopath/2007/PartnerControls"/>
-    <ds:schemaRef ds:uri="http://purl.org/dc/terms/"/>
-    <ds:schemaRef ds:uri="http://schemas.openxmlformats.org/package/2006/metadata/core-properties"/>
-    <ds:schemaRef ds:uri="http://www.w3.org/XML/1998/namespace"/>
-  </ds:schemaRefs>
-</ds:datastoreItem>
-</file>
-
 <file path=docMetadata/LabelInfo.xml><?xml version="1.0" encoding="utf-8"?>
 <clbl:labelList xmlns:clbl="http://schemas.microsoft.com/office/2020/mipLabelMetadata">
   <clbl:label id="{78aac226-2f03-4b4d-9037-b46d56c55210}" enabled="0" method="" siteId="{78aac226-2f03-4b4d-9037-b46d56c55210}" removed="1"/>

</xml_diff>

<commit_message>
got the 5th percentile lower upper altitude bound and made plots
</commit_message>
<xml_diff>
--- a/Midterm Presentation1.pptx
+++ b/Midterm Presentation1.pptx
@@ -137,7 +137,7 @@
 <file path=ppt/revisionInfo.xml><?xml version="1.0" encoding="utf-8"?>
 <p1510:revInfo xmlns:a="http://schemas.openxmlformats.org/drawingml/2006/main" xmlns:r="http://schemas.openxmlformats.org/officeDocument/2006/relationships" xmlns:p1510="http://schemas.microsoft.com/office/powerpoint/2015/10/main">
   <p1510:revLst>
-    <p1510:client id="{5DBE52BC-2832-45EB-BD25-D170F535C554}" v="357" dt="2025-07-15T15:13:37.025"/>
+    <p1510:client id="{5DBE52BC-2832-45EB-BD25-D170F535C554}" v="402" dt="2025-07-17T16:55:33.508"/>
   </p1510:revLst>
 </p1510:revInfo>
 </file>
@@ -147,7 +147,7 @@
   <pc:docChgLst>
     <pc:chgData name="Sallam Saka" userId="f204d973-d51e-47d8-884c-bdcba18d93b4" providerId="ADAL" clId="{5DBE52BC-2832-45EB-BD25-D170F535C554}"/>
     <pc:docChg chg="undo redo custSel addSld delSld modSld sldOrd modMainMaster modNotesMaster">
-      <pc:chgData name="Sallam Saka" userId="f204d973-d51e-47d8-884c-bdcba18d93b4" providerId="ADAL" clId="{5DBE52BC-2832-45EB-BD25-D170F535C554}" dt="2025-07-15T15:59:34.001" v="4828" actId="20577"/>
+      <pc:chgData name="Sallam Saka" userId="f204d973-d51e-47d8-884c-bdcba18d93b4" providerId="ADAL" clId="{5DBE52BC-2832-45EB-BD25-D170F535C554}" dt="2025-07-17T16:55:33.508" v="4901"/>
       <pc:docMkLst>
         <pc:docMk/>
       </pc:docMkLst>
@@ -268,54 +268,6 @@
           <pc:docMk/>
           <pc:sldMk cId="787353098" sldId="265"/>
         </pc:sldMkLst>
-        <pc:spChg chg="add del mod">
-          <ac:chgData name="Sallam Saka" userId="f204d973-d51e-47d8-884c-bdcba18d93b4" providerId="ADAL" clId="{5DBE52BC-2832-45EB-BD25-D170F535C554}" dt="2025-07-15T14:46:53.869" v="4396" actId="478"/>
-          <ac:spMkLst>
-            <pc:docMk/>
-            <pc:sldMk cId="787353098" sldId="265"/>
-            <ac:spMk id="3" creationId="{9F7FBFCE-374C-BA08-E7B0-04DF08478F94}"/>
-          </ac:spMkLst>
-        </pc:spChg>
-        <pc:spChg chg="add del mod">
-          <ac:chgData name="Sallam Saka" userId="f204d973-d51e-47d8-884c-bdcba18d93b4" providerId="ADAL" clId="{5DBE52BC-2832-45EB-BD25-D170F535C554}" dt="2025-07-15T14:46:50.974" v="4395" actId="478"/>
-          <ac:spMkLst>
-            <pc:docMk/>
-            <pc:sldMk cId="787353098" sldId="265"/>
-            <ac:spMk id="4" creationId="{EB4CD4BE-A7F2-47A7-97B6-AF00C74F85EC}"/>
-          </ac:spMkLst>
-        </pc:spChg>
-        <pc:spChg chg="add mod">
-          <ac:chgData name="Sallam Saka" userId="f204d973-d51e-47d8-884c-bdcba18d93b4" providerId="ADAL" clId="{5DBE52BC-2832-45EB-BD25-D170F535C554}" dt="2025-07-15T14:46:14.269" v="4383"/>
-          <ac:spMkLst>
-            <pc:docMk/>
-            <pc:sldMk cId="787353098" sldId="265"/>
-            <ac:spMk id="5" creationId="{5F35A12C-F505-1BB1-97CD-4A5002DCA423}"/>
-          </ac:spMkLst>
-        </pc:spChg>
-        <pc:spChg chg="add mod">
-          <ac:chgData name="Sallam Saka" userId="f204d973-d51e-47d8-884c-bdcba18d93b4" providerId="ADAL" clId="{5DBE52BC-2832-45EB-BD25-D170F535C554}" dt="2025-07-15T14:46:14.269" v="4383"/>
-          <ac:spMkLst>
-            <pc:docMk/>
-            <pc:sldMk cId="787353098" sldId="265"/>
-            <ac:spMk id="6" creationId="{DA4C352C-713C-1CDD-2495-9954E85688E1}"/>
-          </ac:spMkLst>
-        </pc:spChg>
-        <pc:spChg chg="add mod">
-          <ac:chgData name="Sallam Saka" userId="f204d973-d51e-47d8-884c-bdcba18d93b4" providerId="ADAL" clId="{5DBE52BC-2832-45EB-BD25-D170F535C554}" dt="2025-07-15T14:46:32.400" v="4388" actId="1076"/>
-          <ac:spMkLst>
-            <pc:docMk/>
-            <pc:sldMk cId="787353098" sldId="265"/>
-            <ac:spMk id="7" creationId="{375B62C4-D82E-E7DD-6B25-1D230139592A}"/>
-          </ac:spMkLst>
-        </pc:spChg>
-        <pc:spChg chg="add mod">
-          <ac:chgData name="Sallam Saka" userId="f204d973-d51e-47d8-884c-bdcba18d93b4" providerId="ADAL" clId="{5DBE52BC-2832-45EB-BD25-D170F535C554}" dt="2025-07-15T14:46:32.400" v="4388" actId="1076"/>
-          <ac:spMkLst>
-            <pc:docMk/>
-            <pc:sldMk cId="787353098" sldId="265"/>
-            <ac:spMk id="8" creationId="{C987AF7C-7120-3D72-BAAE-E2CBD9B3FAA5}"/>
-          </ac:spMkLst>
-        </pc:spChg>
         <pc:spChg chg="mod">
           <ac:chgData name="Sallam Saka" userId="f204d973-d51e-47d8-884c-bdcba18d93b4" providerId="ADAL" clId="{5DBE52BC-2832-45EB-BD25-D170F535C554}" dt="2025-07-15T13:57:45.085" v="4189" actId="255"/>
           <ac:spMkLst>
@@ -346,22 +298,6 @@
             <pc:docMk/>
             <pc:sldMk cId="787353098" sldId="265"/>
             <ac:spMk id="57" creationId="{1ADC8AA2-17B5-AF67-EE14-A3B95A2E79CA}"/>
-          </ac:spMkLst>
-        </pc:spChg>
-        <pc:spChg chg="add del mod">
-          <ac:chgData name="Sallam Saka" userId="f204d973-d51e-47d8-884c-bdcba18d93b4" providerId="ADAL" clId="{5DBE52BC-2832-45EB-BD25-D170F535C554}" dt="2025-07-15T14:56:10.416" v="4538" actId="478"/>
-          <ac:spMkLst>
-            <pc:docMk/>
-            <pc:sldMk cId="787353098" sldId="265"/>
-            <ac:spMk id="58" creationId="{D2FB3857-4474-302D-212C-B08E452AF301}"/>
-          </ac:spMkLst>
-        </pc:spChg>
-        <pc:spChg chg="add del mod">
-          <ac:chgData name="Sallam Saka" userId="f204d973-d51e-47d8-884c-bdcba18d93b4" providerId="ADAL" clId="{5DBE52BC-2832-45EB-BD25-D170F535C554}" dt="2025-07-15T14:56:07.037" v="4537" actId="478"/>
-          <ac:spMkLst>
-            <pc:docMk/>
-            <pc:sldMk cId="787353098" sldId="265"/>
-            <ac:spMk id="59" creationId="{D34DBC7D-7ECE-63A0-84F6-1C2E1A1080FE}"/>
           </ac:spMkLst>
         </pc:spChg>
         <pc:picChg chg="mod">
@@ -531,8 +467,8 @@
           </ac:spMkLst>
         </pc:spChg>
       </pc:sldChg>
-      <pc:sldChg chg="addSp delSp modSp mod ord modNotesTx">
-        <pc:chgData name="Sallam Saka" userId="f204d973-d51e-47d8-884c-bdcba18d93b4" providerId="ADAL" clId="{5DBE52BC-2832-45EB-BD25-D170F535C554}" dt="2025-07-15T14:57:35.459" v="4573" actId="20577"/>
+      <pc:sldChg chg="addSp delSp modSp mod ord delAnim modAnim modNotesTx">
+        <pc:chgData name="Sallam Saka" userId="f204d973-d51e-47d8-884c-bdcba18d93b4" providerId="ADAL" clId="{5DBE52BC-2832-45EB-BD25-D170F535C554}" dt="2025-07-17T16:55:33.508" v="4901"/>
         <pc:sldMkLst>
           <pc:docMk/>
           <pc:sldMk cId="3182023264" sldId="268"/>
@@ -561,30 +497,6 @@
             <ac:spMk id="22" creationId="{E7102492-FD6C-DD13-8F6B-B56F34B86660}"/>
           </ac:spMkLst>
         </pc:spChg>
-        <pc:grpChg chg="add del mod">
-          <ac:chgData name="Sallam Saka" userId="f204d973-d51e-47d8-884c-bdcba18d93b4" providerId="ADAL" clId="{5DBE52BC-2832-45EB-BD25-D170F535C554}" dt="2025-07-15T14:01:38.092" v="4220" actId="165"/>
-          <ac:grpSpMkLst>
-            <pc:docMk/>
-            <pc:sldMk cId="3182023264" sldId="268"/>
-            <ac:grpSpMk id="2" creationId="{007641A3-CA04-0766-4D4F-1507CC438358}"/>
-          </ac:grpSpMkLst>
-        </pc:grpChg>
-        <pc:grpChg chg="add del mod">
-          <ac:chgData name="Sallam Saka" userId="f204d973-d51e-47d8-884c-bdcba18d93b4" providerId="ADAL" clId="{5DBE52BC-2832-45EB-BD25-D170F535C554}" dt="2025-07-15T14:01:52.649" v="4223" actId="165"/>
-          <ac:grpSpMkLst>
-            <pc:docMk/>
-            <pc:sldMk cId="3182023264" sldId="268"/>
-            <ac:grpSpMk id="4" creationId="{A627D9BA-E1F1-72EE-9594-07EFD89DE4D9}"/>
-          </ac:grpSpMkLst>
-        </pc:grpChg>
-        <pc:grpChg chg="add del mod">
-          <ac:chgData name="Sallam Saka" userId="f204d973-d51e-47d8-884c-bdcba18d93b4" providerId="ADAL" clId="{5DBE52BC-2832-45EB-BD25-D170F535C554}" dt="2025-07-15T14:10:07.781" v="4278" actId="165"/>
-          <ac:grpSpMkLst>
-            <pc:docMk/>
-            <pc:sldMk cId="3182023264" sldId="268"/>
-            <ac:grpSpMk id="16" creationId="{022926D5-8D1A-D656-7F9B-25B6DC7AAC25}"/>
-          </ac:grpSpMkLst>
-        </pc:grpChg>
         <pc:grpChg chg="add mod">
           <ac:chgData name="Sallam Saka" userId="f204d973-d51e-47d8-884c-bdcba18d93b4" providerId="ADAL" clId="{5DBE52BC-2832-45EB-BD25-D170F535C554}" dt="2025-07-15T14:10:20.047" v="4281" actId="164"/>
           <ac:grpSpMkLst>
@@ -601,22 +513,6 @@
             <ac:grpSpMk id="18" creationId="{8363DA86-7686-FAB7-4861-2CCD4F5C3C15}"/>
           </ac:grpSpMkLst>
         </pc:grpChg>
-        <pc:graphicFrameChg chg="add del modGraphic">
-          <ac:chgData name="Sallam Saka" userId="f204d973-d51e-47d8-884c-bdcba18d93b4" providerId="ADAL" clId="{5DBE52BC-2832-45EB-BD25-D170F535C554}" dt="2025-07-14T00:55:08.933" v="4039" actId="27309"/>
-          <ac:graphicFrameMkLst>
-            <pc:docMk/>
-            <pc:sldMk cId="3182023264" sldId="268"/>
-            <ac:graphicFrameMk id="7" creationId="{94DBA0EC-1FFD-9C82-E374-8F95B2DD7F28}"/>
-          </ac:graphicFrameMkLst>
-        </pc:graphicFrameChg>
-        <pc:picChg chg="del mod topLvl modCrop">
-          <ac:chgData name="Sallam Saka" userId="f204d973-d51e-47d8-884c-bdcba18d93b4" providerId="ADAL" clId="{5DBE52BC-2832-45EB-BD25-D170F535C554}" dt="2025-07-15T14:01:40.997" v="4221" actId="478"/>
-          <ac:picMkLst>
-            <pc:docMk/>
-            <pc:sldMk cId="3182023264" sldId="268"/>
-            <ac:picMk id="3" creationId="{AAC26FC4-6B54-E547-8ADB-6F910639DE07}"/>
-          </ac:picMkLst>
-        </pc:picChg>
         <pc:picChg chg="mod topLvl">
           <ac:chgData name="Sallam Saka" userId="f204d973-d51e-47d8-884c-bdcba18d93b4" providerId="ADAL" clId="{5DBE52BC-2832-45EB-BD25-D170F535C554}" dt="2025-07-15T14:10:20.047" v="4281" actId="164"/>
           <ac:picMkLst>
@@ -649,20 +545,76 @@
             <ac:picMk id="14" creationId="{43EB1B27-C611-174A-A02A-C9FDFFFE9BC0}"/>
           </ac:picMkLst>
         </pc:picChg>
-        <pc:picChg chg="del mod topLvl modCrop">
-          <ac:chgData name="Sallam Saka" userId="f204d973-d51e-47d8-884c-bdcba18d93b4" providerId="ADAL" clId="{5DBE52BC-2832-45EB-BD25-D170F535C554}" dt="2025-07-15T14:01:55.496" v="4224" actId="478"/>
-          <ac:picMkLst>
+        <pc:cxnChg chg="add mod">
+          <ac:chgData name="Sallam Saka" userId="f204d973-d51e-47d8-884c-bdcba18d93b4" providerId="ADAL" clId="{5DBE52BC-2832-45EB-BD25-D170F535C554}" dt="2025-07-17T16:49:24.336" v="4837" actId="693"/>
+          <ac:cxnSpMkLst>
             <pc:docMk/>
             <pc:sldMk cId="3182023264" sldId="268"/>
-            <ac:picMk id="15" creationId="{E59250D2-47E6-4188-F8EF-9ACA62700943}"/>
-          </ac:picMkLst>
-        </pc:picChg>
+            <ac:cxnSpMk id="3" creationId="{B77344F0-952D-77D4-C000-B69687A7F41B}"/>
+          </ac:cxnSpMkLst>
+        </pc:cxnChg>
+        <pc:cxnChg chg="add mod">
+          <ac:chgData name="Sallam Saka" userId="f204d973-d51e-47d8-884c-bdcba18d93b4" providerId="ADAL" clId="{5DBE52BC-2832-45EB-BD25-D170F535C554}" dt="2025-07-17T16:50:26.038" v="4856" actId="1076"/>
+          <ac:cxnSpMkLst>
+            <pc:docMk/>
+            <pc:sldMk cId="3182023264" sldId="268"/>
+            <ac:cxnSpMk id="4" creationId="{4C3D99EE-9E1A-A730-8E79-7E084129BF08}"/>
+          </ac:cxnSpMkLst>
+        </pc:cxnChg>
+        <pc:cxnChg chg="add del mod">
+          <ac:chgData name="Sallam Saka" userId="f204d973-d51e-47d8-884c-bdcba18d93b4" providerId="ADAL" clId="{5DBE52BC-2832-45EB-BD25-D170F535C554}" dt="2025-07-17T16:50:33.661" v="4858" actId="478"/>
+          <ac:cxnSpMkLst>
+            <pc:docMk/>
+            <pc:sldMk cId="3182023264" sldId="268"/>
+            <ac:cxnSpMk id="6" creationId="{1C901F0C-1A2C-7034-6ACD-A78D090DA519}"/>
+          </ac:cxnSpMkLst>
+        </pc:cxnChg>
+        <pc:cxnChg chg="add del mod">
+          <ac:chgData name="Sallam Saka" userId="f204d973-d51e-47d8-884c-bdcba18d93b4" providerId="ADAL" clId="{5DBE52BC-2832-45EB-BD25-D170F535C554}" dt="2025-07-17T16:51:27.729" v="4867" actId="478"/>
+          <ac:cxnSpMkLst>
+            <pc:docMk/>
+            <pc:sldMk cId="3182023264" sldId="268"/>
+            <ac:cxnSpMk id="7" creationId="{B8F4FF11-B7AA-E787-BDF8-B9E0D993F23A}"/>
+          </ac:cxnSpMkLst>
+        </pc:cxnChg>
+        <pc:cxnChg chg="add mod">
+          <ac:chgData name="Sallam Saka" userId="f204d973-d51e-47d8-884c-bdcba18d93b4" providerId="ADAL" clId="{5DBE52BC-2832-45EB-BD25-D170F535C554}" dt="2025-07-17T16:51:30.129" v="4868"/>
+          <ac:cxnSpMkLst>
+            <pc:docMk/>
+            <pc:sldMk cId="3182023264" sldId="268"/>
+            <ac:cxnSpMk id="13" creationId="{60A66EBD-155A-19D6-C080-EC33B3FCEAE0}"/>
+          </ac:cxnSpMkLst>
+        </pc:cxnChg>
+        <pc:cxnChg chg="add mod">
+          <ac:chgData name="Sallam Saka" userId="f204d973-d51e-47d8-884c-bdcba18d93b4" providerId="ADAL" clId="{5DBE52BC-2832-45EB-BD25-D170F535C554}" dt="2025-07-17T16:51:42.098" v="4872" actId="1076"/>
+          <ac:cxnSpMkLst>
+            <pc:docMk/>
+            <pc:sldMk cId="3182023264" sldId="268"/>
+            <ac:cxnSpMk id="15" creationId="{5F844550-10CB-C3BA-E204-5DDD6A801205}"/>
+          </ac:cxnSpMkLst>
+        </pc:cxnChg>
+        <pc:cxnChg chg="add mod">
+          <ac:chgData name="Sallam Saka" userId="f204d973-d51e-47d8-884c-bdcba18d93b4" providerId="ADAL" clId="{5DBE52BC-2832-45EB-BD25-D170F535C554}" dt="2025-07-17T16:53:28.051" v="4890" actId="14100"/>
+          <ac:cxnSpMkLst>
+            <pc:docMk/>
+            <pc:sldMk cId="3182023264" sldId="268"/>
+            <ac:cxnSpMk id="16" creationId="{910F3557-1BA3-13B2-EB38-E68DB8D081F2}"/>
+          </ac:cxnSpMkLst>
+        </pc:cxnChg>
         <pc:cxnChg chg="mod ord">
           <ac:chgData name="Sallam Saka" userId="f204d973-d51e-47d8-884c-bdcba18d93b4" providerId="ADAL" clId="{5DBE52BC-2832-45EB-BD25-D170F535C554}" dt="2025-07-15T14:07:53.243" v="4260" actId="1037"/>
           <ac:cxnSpMkLst>
             <pc:docMk/>
             <pc:sldMk cId="3182023264" sldId="268"/>
             <ac:cxnSpMk id="23" creationId="{0BF18332-45E5-DC6D-D012-A939A67AE366}"/>
+          </ac:cxnSpMkLst>
+        </pc:cxnChg>
+        <pc:cxnChg chg="add mod">
+          <ac:chgData name="Sallam Saka" userId="f204d973-d51e-47d8-884c-bdcba18d93b4" providerId="ADAL" clId="{5DBE52BC-2832-45EB-BD25-D170F535C554}" dt="2025-07-17T16:53:18.178" v="4887" actId="14100"/>
+          <ac:cxnSpMkLst>
+            <pc:docMk/>
+            <pc:sldMk cId="3182023264" sldId="268"/>
+            <ac:cxnSpMk id="24" creationId="{EEB51C36-8CB3-B90C-8063-36317C4D6E8F}"/>
           </ac:cxnSpMkLst>
         </pc:cxnChg>
       </pc:sldChg>
@@ -672,14 +624,6 @@
           <pc:docMk/>
           <pc:sldMk cId="3966488039" sldId="269"/>
         </pc:sldMkLst>
-        <pc:spChg chg="add del mod">
-          <ac:chgData name="Sallam Saka" userId="f204d973-d51e-47d8-884c-bdcba18d93b4" providerId="ADAL" clId="{5DBE52BC-2832-45EB-BD25-D170F535C554}" dt="2025-07-15T14:12:19.358" v="4286" actId="22"/>
-          <ac:spMkLst>
-            <pc:docMk/>
-            <pc:sldMk cId="3966488039" sldId="269"/>
-            <ac:spMk id="6" creationId="{3872E9BC-61BA-1986-A3F2-283FAE925D2B}"/>
-          </ac:spMkLst>
-        </pc:spChg>
         <pc:spChg chg="add mod">
           <ac:chgData name="Sallam Saka" userId="f204d973-d51e-47d8-884c-bdcba18d93b4" providerId="ADAL" clId="{5DBE52BC-2832-45EB-BD25-D170F535C554}" dt="2025-07-15T13:55:37.270" v="4168" actId="1076"/>
           <ac:spMkLst>
@@ -760,22 +704,6 @@
             <ac:picMk id="10" creationId="{8A7CD84F-AA25-D7C4-360D-CD9EA48D113B}"/>
           </ac:picMkLst>
         </pc:picChg>
-        <pc:picChg chg="add del mod">
-          <ac:chgData name="Sallam Saka" userId="f204d973-d51e-47d8-884c-bdcba18d93b4" providerId="ADAL" clId="{5DBE52BC-2832-45EB-BD25-D170F535C554}" dt="2025-07-15T14:12:16.160" v="4285" actId="478"/>
-          <ac:picMkLst>
-            <pc:docMk/>
-            <pc:sldMk cId="3966488039" sldId="269"/>
-            <ac:picMk id="14" creationId="{3FCE4965-ABD8-6ED4-A23D-B4ED60437C6A}"/>
-          </ac:picMkLst>
-        </pc:picChg>
-        <pc:inkChg chg="add del">
-          <ac:chgData name="Sallam Saka" userId="f204d973-d51e-47d8-884c-bdcba18d93b4" providerId="ADAL" clId="{5DBE52BC-2832-45EB-BD25-D170F535C554}" dt="2025-07-15T14:58:37.762" v="4575" actId="9405"/>
-          <ac:inkMkLst>
-            <pc:docMk/>
-            <pc:sldMk cId="3966488039" sldId="269"/>
-            <ac:inkMk id="11" creationId="{2769FC0B-603D-3283-B9EB-3B71C1CBF74A}"/>
-          </ac:inkMkLst>
-        </pc:inkChg>
         <pc:cxnChg chg="mod ord">
           <ac:chgData name="Sallam Saka" userId="f204d973-d51e-47d8-884c-bdcba18d93b4" providerId="ADAL" clId="{5DBE52BC-2832-45EB-BD25-D170F535C554}" dt="2025-07-07T16:24:08.889" v="1213" actId="14100"/>
           <ac:cxnSpMkLst>
@@ -790,54 +718,6 @@
             <pc:docMk/>
             <pc:sldMk cId="3966488039" sldId="269"/>
             <ac:cxnSpMk id="8" creationId="{E2668E73-A410-0AC3-C4A7-CBE128CAAAEC}"/>
-          </ac:cxnSpMkLst>
-        </pc:cxnChg>
-        <pc:cxnChg chg="add del mod">
-          <ac:chgData name="Sallam Saka" userId="f204d973-d51e-47d8-884c-bdcba18d93b4" providerId="ADAL" clId="{5DBE52BC-2832-45EB-BD25-D170F535C554}" dt="2025-07-15T15:06:51.676" v="4674" actId="478"/>
-          <ac:cxnSpMkLst>
-            <pc:docMk/>
-            <pc:sldMk cId="3966488039" sldId="269"/>
-            <ac:cxnSpMk id="13" creationId="{F8799592-D9A6-FAF9-B921-A7BD6DEF6561}"/>
-          </ac:cxnSpMkLst>
-        </pc:cxnChg>
-        <pc:cxnChg chg="add del mod">
-          <ac:chgData name="Sallam Saka" userId="f204d973-d51e-47d8-884c-bdcba18d93b4" providerId="ADAL" clId="{5DBE52BC-2832-45EB-BD25-D170F535C554}" dt="2025-07-15T15:06:55.570" v="4681" actId="478"/>
-          <ac:cxnSpMkLst>
-            <pc:docMk/>
-            <pc:sldMk cId="3966488039" sldId="269"/>
-            <ac:cxnSpMk id="18" creationId="{1A39219E-A9D1-3BC3-F0F2-419E6B4FFA16}"/>
-          </ac:cxnSpMkLst>
-        </pc:cxnChg>
-        <pc:cxnChg chg="add del mod">
-          <ac:chgData name="Sallam Saka" userId="f204d973-d51e-47d8-884c-bdcba18d93b4" providerId="ADAL" clId="{5DBE52BC-2832-45EB-BD25-D170F535C554}" dt="2025-07-15T15:06:58.850" v="4682" actId="478"/>
-          <ac:cxnSpMkLst>
-            <pc:docMk/>
-            <pc:sldMk cId="3966488039" sldId="269"/>
-            <ac:cxnSpMk id="19" creationId="{7CE62225-A245-FC44-BB60-E25140BEB22A}"/>
-          </ac:cxnSpMkLst>
-        </pc:cxnChg>
-        <pc:cxnChg chg="add del mod">
-          <ac:chgData name="Sallam Saka" userId="f204d973-d51e-47d8-884c-bdcba18d93b4" providerId="ADAL" clId="{5DBE52BC-2832-45EB-BD25-D170F535C554}" dt="2025-07-15T15:07:01.663" v="4683" actId="478"/>
-          <ac:cxnSpMkLst>
-            <pc:docMk/>
-            <pc:sldMk cId="3966488039" sldId="269"/>
-            <ac:cxnSpMk id="20" creationId="{DEEB00EA-FFE5-B34D-8FFE-34B93E41B428}"/>
-          </ac:cxnSpMkLst>
-        </pc:cxnChg>
-        <pc:cxnChg chg="add del mod">
-          <ac:chgData name="Sallam Saka" userId="f204d973-d51e-47d8-884c-bdcba18d93b4" providerId="ADAL" clId="{5DBE52BC-2832-45EB-BD25-D170F535C554}" dt="2025-07-15T15:08:10.902" v="4715" actId="478"/>
-          <ac:cxnSpMkLst>
-            <pc:docMk/>
-            <pc:sldMk cId="3966488039" sldId="269"/>
-            <ac:cxnSpMk id="23" creationId="{7AC1B67E-2CD2-2BD4-27FD-DB7A7AE38BFF}"/>
-          </ac:cxnSpMkLst>
-        </pc:cxnChg>
-        <pc:cxnChg chg="add del mod">
-          <ac:chgData name="Sallam Saka" userId="f204d973-d51e-47d8-884c-bdcba18d93b4" providerId="ADAL" clId="{5DBE52BC-2832-45EB-BD25-D170F535C554}" dt="2025-07-15T15:08:26.801" v="4722" actId="478"/>
-          <ac:cxnSpMkLst>
-            <pc:docMk/>
-            <pc:sldMk cId="3966488039" sldId="269"/>
-            <ac:cxnSpMk id="24" creationId="{C493E4AB-A7E8-48E6-62B5-6DE8FD6B3676}"/>
           </ac:cxnSpMkLst>
         </pc:cxnChg>
       </pc:sldChg>
@@ -877,14 +757,6 @@
           <pc:docMk/>
           <pc:sldMk cId="451837092" sldId="273"/>
         </pc:sldMkLst>
-        <pc:spChg chg="add del">
-          <ac:chgData name="Sallam Saka" userId="f204d973-d51e-47d8-884c-bdcba18d93b4" providerId="ADAL" clId="{5DBE52BC-2832-45EB-BD25-D170F535C554}" dt="2025-07-15T14:42:47.741" v="4347" actId="22"/>
-          <ac:spMkLst>
-            <pc:docMk/>
-            <pc:sldMk cId="451837092" sldId="273"/>
-            <ac:spMk id="4" creationId="{B561B456-B641-751F-86C7-2D7BC04D5B74}"/>
-          </ac:spMkLst>
-        </pc:spChg>
         <pc:spChg chg="add mod">
           <ac:chgData name="Sallam Saka" userId="f204d973-d51e-47d8-884c-bdcba18d93b4" providerId="ADAL" clId="{5DBE52BC-2832-45EB-BD25-D170F535C554}" dt="2025-07-15T15:13:22.948" v="4743" actId="1037"/>
           <ac:spMkLst>
@@ -931,14 +803,6 @@
             <pc:docMk/>
             <pc:sldMk cId="451837092" sldId="273"/>
             <ac:picMk id="10" creationId="{8A361848-9779-15F3-AFE0-C52BC993E917}"/>
-          </ac:picMkLst>
-        </pc:picChg>
-        <pc:picChg chg="add del mod">
-          <ac:chgData name="Sallam Saka" userId="f204d973-d51e-47d8-884c-bdcba18d93b4" providerId="ADAL" clId="{5DBE52BC-2832-45EB-BD25-D170F535C554}" dt="2025-07-15T14:42:45.330" v="4345" actId="478"/>
-          <ac:picMkLst>
-            <pc:docMk/>
-            <pc:sldMk cId="451837092" sldId="273"/>
-            <ac:picMk id="18" creationId="{FA6568F6-6103-B9AE-5EC4-0DF64D167DA5}"/>
           </ac:picMkLst>
         </pc:picChg>
         <pc:cxnChg chg="add mod">
@@ -1503,7 +1367,7 @@
           <a:p>
             <a:fld id="{4B933C30-B7E7-4080-9C70-75AC29AD909E}" type="datetimeFigureOut">
               <a:rPr lang="en-CA" smtClean="0"/>
-              <a:t>2025-07-15</a:t>
+              <a:t>2025-07-17</a:t>
             </a:fld>
             <a:endParaRPr lang="en-CA"/>
           </a:p>
@@ -1680,7 +1544,7 @@
           <a:p>
             <a:fld id="{9EC6EA57-E00F-4EA4-8324-57F699D5F3BD}" type="datetimeFigureOut">
               <a:rPr lang="en-CA" smtClean="0"/>
-              <a:t>2025-07-15</a:t>
+              <a:t>2025-07-17</a:t>
             </a:fld>
             <a:endParaRPr lang="en-CA"/>
           </a:p>
@@ -3019,7 +2883,7 @@
           <a:p>
             <a:fld id="{7E42272D-C864-4260-9695-DE72F2C3DC59}" type="datetime1">
               <a:rPr lang="en-US" smtClean="0"/>
-              <a:t>7/15/2025</a:t>
+              <a:t>7/17/2025</a:t>
             </a:fld>
             <a:endParaRPr lang="en-US" dirty="0"/>
           </a:p>
@@ -3190,7 +3054,7 @@
           <a:p>
             <a:fld id="{A9F9FB3E-AA8D-444D-B4C0-0BA292B3630C}" type="datetime1">
               <a:rPr lang="en-US" smtClean="0"/>
-              <a:t>7/15/2025</a:t>
+              <a:t>7/17/2025</a:t>
             </a:fld>
             <a:endParaRPr lang="en-US" dirty="0"/>
           </a:p>
@@ -3370,7 +3234,7 @@
           <a:p>
             <a:fld id="{ACDE6FF0-8AAB-4689-A4E7-51B4E11975FD}" type="datetime1">
               <a:rPr lang="en-US" smtClean="0"/>
-              <a:t>7/15/2025</a:t>
+              <a:t>7/17/2025</a:t>
             </a:fld>
             <a:endParaRPr lang="en-US" dirty="0"/>
           </a:p>
@@ -3540,7 +3404,7 @@
           <a:p>
             <a:fld id="{BEB540B3-2366-49F1-A3D9-6CC7C4D7FCCE}" type="datetime1">
               <a:rPr lang="en-US" smtClean="0"/>
-              <a:t>7/15/2025</a:t>
+              <a:t>7/17/2025</a:t>
             </a:fld>
             <a:endParaRPr lang="en-US" dirty="0"/>
           </a:p>
@@ -3809,7 +3673,7 @@
           <a:p>
             <a:fld id="{10F52E3D-C0B7-43E4-A024-214A2690058A}" type="datetime1">
               <a:rPr lang="en-US" smtClean="0"/>
-              <a:t>7/15/2025</a:t>
+              <a:t>7/17/2025</a:t>
             </a:fld>
             <a:endParaRPr lang="en-US" dirty="0"/>
           </a:p>
@@ -4042,7 +3906,7 @@
           <a:p>
             <a:fld id="{20EB94D1-00ED-4FDB-998D-E2672FBBF4C2}" type="datetime1">
               <a:rPr lang="en-US" smtClean="0"/>
-              <a:t>7/15/2025</a:t>
+              <a:t>7/17/2025</a:t>
             </a:fld>
             <a:endParaRPr lang="en-US" dirty="0"/>
           </a:p>
@@ -4401,7 +4265,7 @@
           <a:p>
             <a:fld id="{54E5A78D-3582-4D5A-A41F-774723BEAE38}" type="datetime1">
               <a:rPr lang="en-US" smtClean="0"/>
-              <a:t>7/15/2025</a:t>
+              <a:t>7/17/2025</a:t>
             </a:fld>
             <a:endParaRPr lang="en-US" dirty="0"/>
           </a:p>
@@ -4542,7 +4406,7 @@
           <a:p>
             <a:fld id="{73FFA491-5FCE-43B4-95D3-EA0D3CCC93AF}" type="datetime1">
               <a:rPr lang="en-US" smtClean="0"/>
-              <a:t>7/15/2025</a:t>
+              <a:t>7/17/2025</a:t>
             </a:fld>
             <a:endParaRPr lang="en-US" dirty="0"/>
           </a:p>
@@ -4637,7 +4501,7 @@
           <a:p>
             <a:fld id="{F3D9A1BE-0714-4174-B26A-60B9B3036729}" type="datetime1">
               <a:rPr lang="en-US" smtClean="0"/>
-              <a:t>7/15/2025</a:t>
+              <a:t>7/17/2025</a:t>
             </a:fld>
             <a:endParaRPr lang="en-US" dirty="0"/>
           </a:p>
@@ -4994,7 +4858,7 @@
           <a:p>
             <a:fld id="{F12E75A4-08C5-430B-A942-B1EF97C038F1}" type="datetime1">
               <a:rPr lang="en-US" smtClean="0"/>
-              <a:t>7/15/2025</a:t>
+              <a:t>7/17/2025</a:t>
             </a:fld>
             <a:endParaRPr lang="en-US" dirty="0"/>
           </a:p>
@@ -5351,7 +5215,7 @@
           <a:p>
             <a:fld id="{22CB1FBC-A380-4CB0-BB6A-2458CBD6DD5C}" type="datetime1">
               <a:rPr lang="en-US" smtClean="0"/>
-              <a:t>7/15/2025</a:t>
+              <a:t>7/17/2025</a:t>
             </a:fld>
             <a:endParaRPr lang="en-US" dirty="0"/>
           </a:p>
@@ -5593,7 +5457,7 @@
           <a:p>
             <a:fld id="{7AF78EA4-54E5-41EC-B46D-FBE1A4CE6570}" type="datetime1">
               <a:rPr lang="en-US" smtClean="0"/>
-              <a:t>7/15/2025</a:t>
+              <a:t>7/17/2025</a:t>
             </a:fld>
             <a:endParaRPr lang="en-US" dirty="0"/>
           </a:p>
@@ -12155,6 +12019,272 @@
           </a:fontRef>
         </p:style>
       </p:cxnSp>
+      <p:cxnSp>
+        <p:nvCxnSpPr>
+          <p:cNvPr id="3" name="Straight Arrow Connector 2">
+            <a:extLst>
+              <a:ext uri="{FF2B5EF4-FFF2-40B4-BE49-F238E27FC236}">
+                <a16:creationId xmlns:a16="http://schemas.microsoft.com/office/drawing/2014/main" id="{B77344F0-952D-77D4-C000-B69687A7F41B}"/>
+              </a:ext>
+            </a:extLst>
+          </p:cNvPr>
+          <p:cNvCxnSpPr/>
+          <p:nvPr/>
+        </p:nvCxnSpPr>
+        <p:spPr>
+          <a:xfrm>
+            <a:off x="3129094" y="3573710"/>
+            <a:ext cx="0" cy="2743200"/>
+          </a:xfrm>
+          <a:prstGeom prst="straightConnector1">
+            <a:avLst/>
+          </a:prstGeom>
+          <a:ln w="19050">
+            <a:solidFill>
+              <a:srgbClr val="FF0000"/>
+            </a:solidFill>
+            <a:prstDash val="dash"/>
+            <a:tailEnd type="triangle"/>
+          </a:ln>
+        </p:spPr>
+        <p:style>
+          <a:lnRef idx="1">
+            <a:schemeClr val="accent1"/>
+          </a:lnRef>
+          <a:fillRef idx="0">
+            <a:schemeClr val="accent1"/>
+          </a:fillRef>
+          <a:effectRef idx="0">
+            <a:schemeClr val="accent1"/>
+          </a:effectRef>
+          <a:fontRef idx="minor">
+            <a:schemeClr val="tx1"/>
+          </a:fontRef>
+        </p:style>
+      </p:cxnSp>
+      <p:cxnSp>
+        <p:nvCxnSpPr>
+          <p:cNvPr id="4" name="Straight Arrow Connector 3">
+            <a:extLst>
+              <a:ext uri="{FF2B5EF4-FFF2-40B4-BE49-F238E27FC236}">
+                <a16:creationId xmlns:a16="http://schemas.microsoft.com/office/drawing/2014/main" id="{4C3D99EE-9E1A-A730-8E79-7E084129BF08}"/>
+              </a:ext>
+            </a:extLst>
+          </p:cNvPr>
+          <p:cNvCxnSpPr/>
+          <p:nvPr/>
+        </p:nvCxnSpPr>
+        <p:spPr>
+          <a:xfrm>
+            <a:off x="9812923" y="3573710"/>
+            <a:ext cx="0" cy="2743200"/>
+          </a:xfrm>
+          <a:prstGeom prst="straightConnector1">
+            <a:avLst/>
+          </a:prstGeom>
+          <a:ln w="19050">
+            <a:solidFill>
+              <a:srgbClr val="FF0000"/>
+            </a:solidFill>
+            <a:prstDash val="dash"/>
+            <a:tailEnd type="triangle"/>
+          </a:ln>
+        </p:spPr>
+        <p:style>
+          <a:lnRef idx="1">
+            <a:schemeClr val="accent1"/>
+          </a:lnRef>
+          <a:fillRef idx="0">
+            <a:schemeClr val="accent1"/>
+          </a:fillRef>
+          <a:effectRef idx="0">
+            <a:schemeClr val="accent1"/>
+          </a:effectRef>
+          <a:fontRef idx="minor">
+            <a:schemeClr val="tx1"/>
+          </a:fontRef>
+        </p:style>
+      </p:cxnSp>
+      <p:cxnSp>
+        <p:nvCxnSpPr>
+          <p:cNvPr id="13" name="Straight Arrow Connector 12">
+            <a:extLst>
+              <a:ext uri="{FF2B5EF4-FFF2-40B4-BE49-F238E27FC236}">
+                <a16:creationId xmlns:a16="http://schemas.microsoft.com/office/drawing/2014/main" id="{60A66EBD-155A-19D6-C080-EC33B3FCEAE0}"/>
+              </a:ext>
+            </a:extLst>
+          </p:cNvPr>
+          <p:cNvCxnSpPr>
+            <a:cxnSpLocks/>
+          </p:cNvCxnSpPr>
+          <p:nvPr/>
+        </p:nvCxnSpPr>
+        <p:spPr>
+          <a:xfrm>
+            <a:off x="4173473" y="3722914"/>
+            <a:ext cx="0" cy="2593996"/>
+          </a:xfrm>
+          <a:prstGeom prst="straightConnector1">
+            <a:avLst/>
+          </a:prstGeom>
+          <a:ln w="19050">
+            <a:solidFill>
+              <a:srgbClr val="FF0000"/>
+            </a:solidFill>
+            <a:prstDash val="dash"/>
+            <a:tailEnd type="triangle"/>
+          </a:ln>
+        </p:spPr>
+        <p:style>
+          <a:lnRef idx="1">
+            <a:schemeClr val="accent1"/>
+          </a:lnRef>
+          <a:fillRef idx="0">
+            <a:schemeClr val="accent1"/>
+          </a:fillRef>
+          <a:effectRef idx="0">
+            <a:schemeClr val="accent1"/>
+          </a:effectRef>
+          <a:fontRef idx="minor">
+            <a:schemeClr val="tx1"/>
+          </a:fontRef>
+        </p:style>
+      </p:cxnSp>
+      <p:cxnSp>
+        <p:nvCxnSpPr>
+          <p:cNvPr id="15" name="Straight Arrow Connector 14">
+            <a:extLst>
+              <a:ext uri="{FF2B5EF4-FFF2-40B4-BE49-F238E27FC236}">
+                <a16:creationId xmlns:a16="http://schemas.microsoft.com/office/drawing/2014/main" id="{5F844550-10CB-C3BA-E204-5DDD6A801205}"/>
+              </a:ext>
+            </a:extLst>
+          </p:cNvPr>
+          <p:cNvCxnSpPr>
+            <a:cxnSpLocks/>
+          </p:cNvCxnSpPr>
+          <p:nvPr/>
+        </p:nvCxnSpPr>
+        <p:spPr>
+          <a:xfrm>
+            <a:off x="10596044" y="3722914"/>
+            <a:ext cx="0" cy="2593996"/>
+          </a:xfrm>
+          <a:prstGeom prst="straightConnector1">
+            <a:avLst/>
+          </a:prstGeom>
+          <a:ln w="19050">
+            <a:solidFill>
+              <a:srgbClr val="FF0000"/>
+            </a:solidFill>
+            <a:prstDash val="dash"/>
+            <a:tailEnd type="triangle"/>
+          </a:ln>
+        </p:spPr>
+        <p:style>
+          <a:lnRef idx="1">
+            <a:schemeClr val="accent1"/>
+          </a:lnRef>
+          <a:fillRef idx="0">
+            <a:schemeClr val="accent1"/>
+          </a:fillRef>
+          <a:effectRef idx="0">
+            <a:schemeClr val="accent1"/>
+          </a:effectRef>
+          <a:fontRef idx="minor">
+            <a:schemeClr val="tx1"/>
+          </a:fontRef>
+        </p:style>
+      </p:cxnSp>
+      <p:cxnSp>
+        <p:nvCxnSpPr>
+          <p:cNvPr id="16" name="Straight Arrow Connector 15">
+            <a:extLst>
+              <a:ext uri="{FF2B5EF4-FFF2-40B4-BE49-F238E27FC236}">
+                <a16:creationId xmlns:a16="http://schemas.microsoft.com/office/drawing/2014/main" id="{910F3557-1BA3-13B2-EB38-E68DB8D081F2}"/>
+              </a:ext>
+            </a:extLst>
+          </p:cNvPr>
+          <p:cNvCxnSpPr>
+            <a:cxnSpLocks/>
+          </p:cNvCxnSpPr>
+          <p:nvPr/>
+        </p:nvCxnSpPr>
+        <p:spPr>
+          <a:xfrm>
+            <a:off x="5669481" y="4133461"/>
+            <a:ext cx="0" cy="2183449"/>
+          </a:xfrm>
+          <a:prstGeom prst="straightConnector1">
+            <a:avLst/>
+          </a:prstGeom>
+          <a:ln w="19050">
+            <a:solidFill>
+              <a:srgbClr val="FF0000"/>
+            </a:solidFill>
+            <a:prstDash val="dash"/>
+            <a:tailEnd type="triangle"/>
+          </a:ln>
+        </p:spPr>
+        <p:style>
+          <a:lnRef idx="1">
+            <a:schemeClr val="accent1"/>
+          </a:lnRef>
+          <a:fillRef idx="0">
+            <a:schemeClr val="accent1"/>
+          </a:fillRef>
+          <a:effectRef idx="0">
+            <a:schemeClr val="accent1"/>
+          </a:effectRef>
+          <a:fontRef idx="minor">
+            <a:schemeClr val="tx1"/>
+          </a:fontRef>
+        </p:style>
+      </p:cxnSp>
+      <p:cxnSp>
+        <p:nvCxnSpPr>
+          <p:cNvPr id="24" name="Straight Arrow Connector 23">
+            <a:extLst>
+              <a:ext uri="{FF2B5EF4-FFF2-40B4-BE49-F238E27FC236}">
+                <a16:creationId xmlns:a16="http://schemas.microsoft.com/office/drawing/2014/main" id="{EEB51C36-8CB3-B90C-8063-36317C4D6E8F}"/>
+              </a:ext>
+            </a:extLst>
+          </p:cNvPr>
+          <p:cNvCxnSpPr>
+            <a:cxnSpLocks/>
+          </p:cNvCxnSpPr>
+          <p:nvPr/>
+        </p:nvCxnSpPr>
+        <p:spPr>
+          <a:xfrm>
+            <a:off x="11463791" y="4049486"/>
+            <a:ext cx="0" cy="2267424"/>
+          </a:xfrm>
+          <a:prstGeom prst="straightConnector1">
+            <a:avLst/>
+          </a:prstGeom>
+          <a:ln w="19050">
+            <a:solidFill>
+              <a:srgbClr val="FF0000"/>
+            </a:solidFill>
+            <a:prstDash val="dash"/>
+            <a:tailEnd type="triangle"/>
+          </a:ln>
+        </p:spPr>
+        <p:style>
+          <a:lnRef idx="1">
+            <a:schemeClr val="accent1"/>
+          </a:lnRef>
+          <a:fillRef idx="0">
+            <a:schemeClr val="accent1"/>
+          </a:fillRef>
+          <a:effectRef idx="0">
+            <a:schemeClr val="accent1"/>
+          </a:effectRef>
+          <a:fontRef idx="minor">
+            <a:schemeClr val="tx1"/>
+          </a:fontRef>
+        </p:style>
+      </p:cxnSp>
     </p:spTree>
     <p:extLst>
       <p:ext uri="{BB962C8B-B14F-4D97-AF65-F5344CB8AC3E}">
@@ -12165,6 +12295,354 @@
   <p:clrMapOvr>
     <a:masterClrMapping/>
   </p:clrMapOvr>
+  <p:timing>
+    <p:tnLst>
+      <p:par>
+        <p:cTn id="1" dur="indefinite" restart="never" nodeType="tmRoot">
+          <p:childTnLst>
+            <p:seq concurrent="1" nextAc="seek">
+              <p:cTn id="2" dur="indefinite" nodeType="mainSeq">
+                <p:childTnLst>
+                  <p:par>
+                    <p:cTn id="3" fill="hold">
+                      <p:stCondLst>
+                        <p:cond delay="indefinite"/>
+                      </p:stCondLst>
+                      <p:childTnLst>
+                        <p:par>
+                          <p:cTn id="4" fill="hold">
+                            <p:stCondLst>
+                              <p:cond delay="0"/>
+                            </p:stCondLst>
+                            <p:childTnLst>
+                              <p:par>
+                                <p:cTn id="5" presetID="22" presetClass="entr" presetSubtype="1" fill="hold" nodeType="clickEffect">
+                                  <p:stCondLst>
+                                    <p:cond delay="0"/>
+                                  </p:stCondLst>
+                                  <p:childTnLst>
+                                    <p:set>
+                                      <p:cBhvr>
+                                        <p:cTn id="6" dur="1" fill="hold">
+                                          <p:stCondLst>
+                                            <p:cond delay="0"/>
+                                          </p:stCondLst>
+                                        </p:cTn>
+                                        <p:tgtEl>
+                                          <p:spTgt spid="3"/>
+                                        </p:tgtEl>
+                                        <p:attrNameLst>
+                                          <p:attrName>style.visibility</p:attrName>
+                                        </p:attrNameLst>
+                                      </p:cBhvr>
+                                      <p:to>
+                                        <p:strVal val="visible"/>
+                                      </p:to>
+                                    </p:set>
+                                    <p:animEffect transition="in" filter="wipe(up)">
+                                      <p:cBhvr>
+                                        <p:cTn id="7" dur="500"/>
+                                        <p:tgtEl>
+                                          <p:spTgt spid="3"/>
+                                        </p:tgtEl>
+                                      </p:cBhvr>
+                                    </p:animEffect>
+                                  </p:childTnLst>
+                                </p:cTn>
+                              </p:par>
+                            </p:childTnLst>
+                          </p:cTn>
+                        </p:par>
+                      </p:childTnLst>
+                    </p:cTn>
+                  </p:par>
+                  <p:par>
+                    <p:cTn id="8" fill="hold">
+                      <p:stCondLst>
+                        <p:cond delay="indefinite"/>
+                      </p:stCondLst>
+                      <p:childTnLst>
+                        <p:par>
+                          <p:cTn id="9" fill="hold">
+                            <p:stCondLst>
+                              <p:cond delay="0"/>
+                            </p:stCondLst>
+                            <p:childTnLst>
+                              <p:par>
+                                <p:cTn id="10" presetID="22" presetClass="entr" presetSubtype="1" fill="hold" nodeType="clickEffect">
+                                  <p:stCondLst>
+                                    <p:cond delay="0"/>
+                                  </p:stCondLst>
+                                  <p:childTnLst>
+                                    <p:set>
+                                      <p:cBhvr>
+                                        <p:cTn id="11" dur="1" fill="hold">
+                                          <p:stCondLst>
+                                            <p:cond delay="0"/>
+                                          </p:stCondLst>
+                                        </p:cTn>
+                                        <p:tgtEl>
+                                          <p:spTgt spid="4"/>
+                                        </p:tgtEl>
+                                        <p:attrNameLst>
+                                          <p:attrName>style.visibility</p:attrName>
+                                        </p:attrNameLst>
+                                      </p:cBhvr>
+                                      <p:to>
+                                        <p:strVal val="visible"/>
+                                      </p:to>
+                                    </p:set>
+                                    <p:animEffect transition="in" filter="wipe(up)">
+                                      <p:cBhvr>
+                                        <p:cTn id="12" dur="500"/>
+                                        <p:tgtEl>
+                                          <p:spTgt spid="4"/>
+                                        </p:tgtEl>
+                                      </p:cBhvr>
+                                    </p:animEffect>
+                                  </p:childTnLst>
+                                </p:cTn>
+                              </p:par>
+                            </p:childTnLst>
+                          </p:cTn>
+                        </p:par>
+                      </p:childTnLst>
+                    </p:cTn>
+                  </p:par>
+                  <p:par>
+                    <p:cTn id="13" fill="hold">
+                      <p:stCondLst>
+                        <p:cond delay="indefinite"/>
+                      </p:stCondLst>
+                      <p:childTnLst>
+                        <p:par>
+                          <p:cTn id="14" fill="hold">
+                            <p:stCondLst>
+                              <p:cond delay="0"/>
+                            </p:stCondLst>
+                            <p:childTnLst>
+                              <p:par>
+                                <p:cTn id="15" presetID="22" presetClass="entr" presetSubtype="1" fill="hold" nodeType="clickEffect">
+                                  <p:stCondLst>
+                                    <p:cond delay="0"/>
+                                  </p:stCondLst>
+                                  <p:childTnLst>
+                                    <p:set>
+                                      <p:cBhvr>
+                                        <p:cTn id="16" dur="1" fill="hold">
+                                          <p:stCondLst>
+                                            <p:cond delay="0"/>
+                                          </p:stCondLst>
+                                        </p:cTn>
+                                        <p:tgtEl>
+                                          <p:spTgt spid="13"/>
+                                        </p:tgtEl>
+                                        <p:attrNameLst>
+                                          <p:attrName>style.visibility</p:attrName>
+                                        </p:attrNameLst>
+                                      </p:cBhvr>
+                                      <p:to>
+                                        <p:strVal val="visible"/>
+                                      </p:to>
+                                    </p:set>
+                                    <p:animEffect transition="in" filter="wipe(up)">
+                                      <p:cBhvr>
+                                        <p:cTn id="17" dur="500"/>
+                                        <p:tgtEl>
+                                          <p:spTgt spid="13"/>
+                                        </p:tgtEl>
+                                      </p:cBhvr>
+                                    </p:animEffect>
+                                  </p:childTnLst>
+                                </p:cTn>
+                              </p:par>
+                            </p:childTnLst>
+                          </p:cTn>
+                        </p:par>
+                      </p:childTnLst>
+                    </p:cTn>
+                  </p:par>
+                  <p:par>
+                    <p:cTn id="18" fill="hold">
+                      <p:stCondLst>
+                        <p:cond delay="indefinite"/>
+                      </p:stCondLst>
+                      <p:childTnLst>
+                        <p:par>
+                          <p:cTn id="19" fill="hold">
+                            <p:stCondLst>
+                              <p:cond delay="0"/>
+                            </p:stCondLst>
+                            <p:childTnLst>
+                              <p:par>
+                                <p:cTn id="20" presetID="22" presetClass="entr" presetSubtype="1" fill="hold" nodeType="clickEffect">
+                                  <p:stCondLst>
+                                    <p:cond delay="0"/>
+                                  </p:stCondLst>
+                                  <p:childTnLst>
+                                    <p:set>
+                                      <p:cBhvr>
+                                        <p:cTn id="21" dur="1" fill="hold">
+                                          <p:stCondLst>
+                                            <p:cond delay="0"/>
+                                          </p:stCondLst>
+                                        </p:cTn>
+                                        <p:tgtEl>
+                                          <p:spTgt spid="15"/>
+                                        </p:tgtEl>
+                                        <p:attrNameLst>
+                                          <p:attrName>style.visibility</p:attrName>
+                                        </p:attrNameLst>
+                                      </p:cBhvr>
+                                      <p:to>
+                                        <p:strVal val="visible"/>
+                                      </p:to>
+                                    </p:set>
+                                    <p:animEffect transition="in" filter="wipe(up)">
+                                      <p:cBhvr>
+                                        <p:cTn id="22" dur="500"/>
+                                        <p:tgtEl>
+                                          <p:spTgt spid="15"/>
+                                        </p:tgtEl>
+                                      </p:cBhvr>
+                                    </p:animEffect>
+                                  </p:childTnLst>
+                                </p:cTn>
+                              </p:par>
+                            </p:childTnLst>
+                          </p:cTn>
+                        </p:par>
+                      </p:childTnLst>
+                    </p:cTn>
+                  </p:par>
+                  <p:par>
+                    <p:cTn id="23" fill="hold">
+                      <p:stCondLst>
+                        <p:cond delay="indefinite"/>
+                      </p:stCondLst>
+                      <p:childTnLst>
+                        <p:par>
+                          <p:cTn id="24" fill="hold">
+                            <p:stCondLst>
+                              <p:cond delay="0"/>
+                            </p:stCondLst>
+                            <p:childTnLst>
+                              <p:par>
+                                <p:cTn id="25" presetID="22" presetClass="entr" presetSubtype="1" fill="hold" nodeType="clickEffect">
+                                  <p:stCondLst>
+                                    <p:cond delay="0"/>
+                                  </p:stCondLst>
+                                  <p:childTnLst>
+                                    <p:set>
+                                      <p:cBhvr>
+                                        <p:cTn id="26" dur="1" fill="hold">
+                                          <p:stCondLst>
+                                            <p:cond delay="0"/>
+                                          </p:stCondLst>
+                                        </p:cTn>
+                                        <p:tgtEl>
+                                          <p:spTgt spid="16"/>
+                                        </p:tgtEl>
+                                        <p:attrNameLst>
+                                          <p:attrName>style.visibility</p:attrName>
+                                        </p:attrNameLst>
+                                      </p:cBhvr>
+                                      <p:to>
+                                        <p:strVal val="visible"/>
+                                      </p:to>
+                                    </p:set>
+                                    <p:animEffect transition="in" filter="wipe(up)">
+                                      <p:cBhvr>
+                                        <p:cTn id="27" dur="500"/>
+                                        <p:tgtEl>
+                                          <p:spTgt spid="16"/>
+                                        </p:tgtEl>
+                                      </p:cBhvr>
+                                    </p:animEffect>
+                                  </p:childTnLst>
+                                </p:cTn>
+                              </p:par>
+                            </p:childTnLst>
+                          </p:cTn>
+                        </p:par>
+                      </p:childTnLst>
+                    </p:cTn>
+                  </p:par>
+                  <p:par>
+                    <p:cTn id="28" fill="hold">
+                      <p:stCondLst>
+                        <p:cond delay="indefinite"/>
+                      </p:stCondLst>
+                      <p:childTnLst>
+                        <p:par>
+                          <p:cTn id="29" fill="hold">
+                            <p:stCondLst>
+                              <p:cond delay="0"/>
+                            </p:stCondLst>
+                            <p:childTnLst>
+                              <p:par>
+                                <p:cTn id="30" presetID="22" presetClass="entr" presetSubtype="1" fill="hold" nodeType="clickEffect">
+                                  <p:stCondLst>
+                                    <p:cond delay="0"/>
+                                  </p:stCondLst>
+                                  <p:childTnLst>
+                                    <p:set>
+                                      <p:cBhvr>
+                                        <p:cTn id="31" dur="1" fill="hold">
+                                          <p:stCondLst>
+                                            <p:cond delay="0"/>
+                                          </p:stCondLst>
+                                        </p:cTn>
+                                        <p:tgtEl>
+                                          <p:spTgt spid="24"/>
+                                        </p:tgtEl>
+                                        <p:attrNameLst>
+                                          <p:attrName>style.visibility</p:attrName>
+                                        </p:attrNameLst>
+                                      </p:cBhvr>
+                                      <p:to>
+                                        <p:strVal val="visible"/>
+                                      </p:to>
+                                    </p:set>
+                                    <p:animEffect transition="in" filter="wipe(up)">
+                                      <p:cBhvr>
+                                        <p:cTn id="32" dur="500"/>
+                                        <p:tgtEl>
+                                          <p:spTgt spid="24"/>
+                                        </p:tgtEl>
+                                      </p:cBhvr>
+                                    </p:animEffect>
+                                  </p:childTnLst>
+                                </p:cTn>
+                              </p:par>
+                            </p:childTnLst>
+                          </p:cTn>
+                        </p:par>
+                      </p:childTnLst>
+                    </p:cTn>
+                  </p:par>
+                </p:childTnLst>
+              </p:cTn>
+              <p:prevCondLst>
+                <p:cond evt="onPrev" delay="0">
+                  <p:tgtEl>
+                    <p:sldTgt/>
+                  </p:tgtEl>
+                </p:cond>
+              </p:prevCondLst>
+              <p:nextCondLst>
+                <p:cond evt="onNext" delay="0">
+                  <p:tgtEl>
+                    <p:sldTgt/>
+                  </p:tgtEl>
+                </p:cond>
+              </p:nextCondLst>
+            </p:seq>
+          </p:childTnLst>
+        </p:cTn>
+      </p:par>
+    </p:tnLst>
+  </p:timing>
 </p:sld>
 </file>
 
@@ -12220,8 +12698,8 @@
           </a:p>
         </p:txBody>
       </p:sp>
-      <mc:AlternateContent xmlns:mc="http://schemas.openxmlformats.org/markup-compatibility/2006">
-        <mc:Choice xmlns:a14="http://schemas.microsoft.com/office/drawing/2010/main" Requires="a14">
+      <mc:AlternateContent xmlns:mc="http://schemas.openxmlformats.org/markup-compatibility/2006" xmlns:a14="http://schemas.microsoft.com/office/drawing/2010/main">
+        <mc:Choice Requires="a14">
           <p:sp>
             <p:nvSpPr>
               <p:cNvPr id="3" name="Content Placeholder 2">
@@ -13018,7 +13496,7 @@
             </p:txBody>
           </p:sp>
         </mc:Choice>
-        <mc:Fallback>
+        <mc:Fallback xmlns="">
           <p:sp>
             <p:nvSpPr>
               <p:cNvPr id="3" name="Content Placeholder 2">

</xml_diff>

<commit_message>
Total progress reached up to midterm presentation day
</commit_message>
<xml_diff>
--- a/Midterm Presentation1.pptx
+++ b/Midterm Presentation1.pptx
@@ -147,7 +147,7 @@
   <pc:docChgLst>
     <pc:chgData name="Sallam Saka" userId="f204d973-d51e-47d8-884c-bdcba18d93b4" providerId="ADAL" clId="{5DBE52BC-2832-45EB-BD25-D170F535C554}"/>
     <pc:docChg chg="undo redo custSel addSld delSld modSld sldOrd modMainMaster modNotesMaster">
-      <pc:chgData name="Sallam Saka" userId="f204d973-d51e-47d8-884c-bdcba18d93b4" providerId="ADAL" clId="{5DBE52BC-2832-45EB-BD25-D170F535C554}" dt="2025-07-17T16:55:33.508" v="4901"/>
+      <pc:chgData name="Sallam Saka" userId="f204d973-d51e-47d8-884c-bdcba18d93b4" providerId="ADAL" clId="{5DBE52BC-2832-45EB-BD25-D170F535C554}" dt="2025-07-18T15:08:33.784" v="4905" actId="20577"/>
       <pc:docMkLst>
         <pc:docMk/>
       </pc:docMkLst>
@@ -468,7 +468,7 @@
         </pc:spChg>
       </pc:sldChg>
       <pc:sldChg chg="addSp delSp modSp mod ord delAnim modAnim modNotesTx">
-        <pc:chgData name="Sallam Saka" userId="f204d973-d51e-47d8-884c-bdcba18d93b4" providerId="ADAL" clId="{5DBE52BC-2832-45EB-BD25-D170F535C554}" dt="2025-07-17T16:55:33.508" v="4901"/>
+        <pc:chgData name="Sallam Saka" userId="f204d973-d51e-47d8-884c-bdcba18d93b4" providerId="ADAL" clId="{5DBE52BC-2832-45EB-BD25-D170F535C554}" dt="2025-07-18T15:08:28.437" v="4903" actId="20577"/>
         <pc:sldMkLst>
           <pc:docMk/>
           <pc:sldMk cId="3182023264" sldId="268"/>
@@ -844,7 +844,7 @@
         </pc:sldMkLst>
       </pc:sldChg>
       <pc:sldChg chg="addSp delSp modSp new mod delAnim modAnim modNotesTx">
-        <pc:chgData name="Sallam Saka" userId="f204d973-d51e-47d8-884c-bdcba18d93b4" providerId="ADAL" clId="{5DBE52BC-2832-45EB-BD25-D170F535C554}" dt="2025-07-15T15:59:34.001" v="4828" actId="20577"/>
+        <pc:chgData name="Sallam Saka" userId="f204d973-d51e-47d8-884c-bdcba18d93b4" providerId="ADAL" clId="{5DBE52BC-2832-45EB-BD25-D170F535C554}" dt="2025-07-18T15:08:33.784" v="4905" actId="20577"/>
         <pc:sldMkLst>
           <pc:docMk/>
           <pc:sldMk cId="2912614909" sldId="278"/>
@@ -858,7 +858,7 @@
           </ac:spMkLst>
         </pc:spChg>
         <pc:spChg chg="add mod">
-          <ac:chgData name="Sallam Saka" userId="f204d973-d51e-47d8-884c-bdcba18d93b4" providerId="ADAL" clId="{5DBE52BC-2832-45EB-BD25-D170F535C554}" dt="2025-07-15T13:56:18.717" v="4177" actId="20577"/>
+          <ac:chgData name="Sallam Saka" userId="f204d973-d51e-47d8-884c-bdcba18d93b4" providerId="ADAL" clId="{5DBE52BC-2832-45EB-BD25-D170F535C554}" dt="2025-07-17T22:19:28.084" v="4902" actId="14100"/>
           <ac:spMkLst>
             <pc:docMk/>
             <pc:sldMk cId="2912614909" sldId="278"/>
@@ -958,7 +958,7 @@
         </pc:sldMkLst>
       </pc:sldChg>
       <pc:sldChg chg="addSp delSp modSp add mod modAnim modNotesTx">
-        <pc:chgData name="Sallam Saka" userId="f204d973-d51e-47d8-884c-bdcba18d93b4" providerId="ADAL" clId="{5DBE52BC-2832-45EB-BD25-D170F535C554}" dt="2025-07-15T15:59:19.775" v="4798" actId="20577"/>
+        <pc:chgData name="Sallam Saka" userId="f204d973-d51e-47d8-884c-bdcba18d93b4" providerId="ADAL" clId="{5DBE52BC-2832-45EB-BD25-D170F535C554}" dt="2025-07-18T15:08:31.388" v="4904" actId="20577"/>
         <pc:sldMkLst>
           <pc:docMk/>
           <pc:sldMk cId="2974313499" sldId="284"/>
@@ -1367,7 +1367,7 @@
           <a:p>
             <a:fld id="{4B933C30-B7E7-4080-9C70-75AC29AD909E}" type="datetimeFigureOut">
               <a:rPr lang="en-CA" smtClean="0"/>
-              <a:t>2025-07-17</a:t>
+              <a:t>2025-07-18</a:t>
             </a:fld>
             <a:endParaRPr lang="en-CA"/>
           </a:p>
@@ -1544,7 +1544,7 @@
           <a:p>
             <a:fld id="{9EC6EA57-E00F-4EA4-8324-57F699D5F3BD}" type="datetimeFigureOut">
               <a:rPr lang="en-CA" smtClean="0"/>
-              <a:t>2025-07-17</a:t>
+              <a:t>2025-07-18</a:t>
             </a:fld>
             <a:endParaRPr lang="en-CA"/>
           </a:p>
@@ -2125,10 +2125,6 @@
               <a:tabLst/>
               <a:defRPr/>
             </a:pPr>
-            <a:r>
-              <a:rPr lang="en-CA" baseline="0"/>
-              <a:t>Vertical resolution of 4km</a:t>
-            </a:r>
             <a:endParaRPr lang="en-CA" baseline="0" dirty="0"/>
           </a:p>
         </p:txBody>
@@ -2248,10 +2244,7 @@
               <a:tabLst/>
               <a:defRPr/>
             </a:pPr>
-            <a:r>
-              <a:rPr lang="en-CA" baseline="0" dirty="0"/>
-              <a:t>Vertical resolution of 1-2km depending on altitude</a:t>
-            </a:r>
+            <a:endParaRPr lang="en-CA" baseline="0" dirty="0"/>
           </a:p>
         </p:txBody>
       </p:sp>
@@ -2509,10 +2502,7 @@
           <a:bodyPr/>
           <a:lstStyle/>
           <a:p>
-            <a:r>
-              <a:rPr lang="en-CA" dirty="0"/>
-              <a:t>Yellow line, then green line</a:t>
-            </a:r>
+            <a:endParaRPr lang="en-CA" dirty="0"/>
           </a:p>
         </p:txBody>
       </p:sp>
@@ -2883,7 +2873,7 @@
           <a:p>
             <a:fld id="{7E42272D-C864-4260-9695-DE72F2C3DC59}" type="datetime1">
               <a:rPr lang="en-US" smtClean="0"/>
-              <a:t>7/17/2025</a:t>
+              <a:t>7/18/2025</a:t>
             </a:fld>
             <a:endParaRPr lang="en-US" dirty="0"/>
           </a:p>
@@ -3054,7 +3044,7 @@
           <a:p>
             <a:fld id="{A9F9FB3E-AA8D-444D-B4C0-0BA292B3630C}" type="datetime1">
               <a:rPr lang="en-US" smtClean="0"/>
-              <a:t>7/17/2025</a:t>
+              <a:t>7/18/2025</a:t>
             </a:fld>
             <a:endParaRPr lang="en-US" dirty="0"/>
           </a:p>
@@ -3234,7 +3224,7 @@
           <a:p>
             <a:fld id="{ACDE6FF0-8AAB-4689-A4E7-51B4E11975FD}" type="datetime1">
               <a:rPr lang="en-US" smtClean="0"/>
-              <a:t>7/17/2025</a:t>
+              <a:t>7/18/2025</a:t>
             </a:fld>
             <a:endParaRPr lang="en-US" dirty="0"/>
           </a:p>
@@ -3404,7 +3394,7 @@
           <a:p>
             <a:fld id="{BEB540B3-2366-49F1-A3D9-6CC7C4D7FCCE}" type="datetime1">
               <a:rPr lang="en-US" smtClean="0"/>
-              <a:t>7/17/2025</a:t>
+              <a:t>7/18/2025</a:t>
             </a:fld>
             <a:endParaRPr lang="en-US" dirty="0"/>
           </a:p>
@@ -3673,7 +3663,7 @@
           <a:p>
             <a:fld id="{10F52E3D-C0B7-43E4-A024-214A2690058A}" type="datetime1">
               <a:rPr lang="en-US" smtClean="0"/>
-              <a:t>7/17/2025</a:t>
+              <a:t>7/18/2025</a:t>
             </a:fld>
             <a:endParaRPr lang="en-US" dirty="0"/>
           </a:p>
@@ -3906,7 +3896,7 @@
           <a:p>
             <a:fld id="{20EB94D1-00ED-4FDB-998D-E2672FBBF4C2}" type="datetime1">
               <a:rPr lang="en-US" smtClean="0"/>
-              <a:t>7/17/2025</a:t>
+              <a:t>7/18/2025</a:t>
             </a:fld>
             <a:endParaRPr lang="en-US" dirty="0"/>
           </a:p>
@@ -4265,7 +4255,7 @@
           <a:p>
             <a:fld id="{54E5A78D-3582-4D5A-A41F-774723BEAE38}" type="datetime1">
               <a:rPr lang="en-US" smtClean="0"/>
-              <a:t>7/17/2025</a:t>
+              <a:t>7/18/2025</a:t>
             </a:fld>
             <a:endParaRPr lang="en-US" dirty="0"/>
           </a:p>
@@ -4406,7 +4396,7 @@
           <a:p>
             <a:fld id="{73FFA491-5FCE-43B4-95D3-EA0D3CCC93AF}" type="datetime1">
               <a:rPr lang="en-US" smtClean="0"/>
-              <a:t>7/17/2025</a:t>
+              <a:t>7/18/2025</a:t>
             </a:fld>
             <a:endParaRPr lang="en-US" dirty="0"/>
           </a:p>
@@ -4501,7 +4491,7 @@
           <a:p>
             <a:fld id="{F3D9A1BE-0714-4174-B26A-60B9B3036729}" type="datetime1">
               <a:rPr lang="en-US" smtClean="0"/>
-              <a:t>7/17/2025</a:t>
+              <a:t>7/18/2025</a:t>
             </a:fld>
             <a:endParaRPr lang="en-US" dirty="0"/>
           </a:p>
@@ -4858,7 +4848,7 @@
           <a:p>
             <a:fld id="{F12E75A4-08C5-430B-A942-B1EF97C038F1}" type="datetime1">
               <a:rPr lang="en-US" smtClean="0"/>
-              <a:t>7/17/2025</a:t>
+              <a:t>7/18/2025</a:t>
             </a:fld>
             <a:endParaRPr lang="en-US" dirty="0"/>
           </a:p>
@@ -5215,7 +5205,7 @@
           <a:p>
             <a:fld id="{22CB1FBC-A380-4CB0-BB6A-2458CBD6DD5C}" type="datetime1">
               <a:rPr lang="en-US" smtClean="0"/>
-              <a:t>7/17/2025</a:t>
+              <a:t>7/18/2025</a:t>
             </a:fld>
             <a:endParaRPr lang="en-US" dirty="0"/>
           </a:p>
@@ -5457,7 +5447,7 @@
           <a:p>
             <a:fld id="{7AF78EA4-54E5-41EC-B46D-FBE1A4CE6570}" type="datetime1">
               <a:rPr lang="en-US" smtClean="0"/>
-              <a:t>7/17/2025</a:t>
+              <a:t>7/18/2025</a:t>
             </a:fld>
             <a:endParaRPr lang="en-US" dirty="0"/>
           </a:p>
@@ -8491,7 +8481,7 @@
         <p:spPr>
           <a:xfrm>
             <a:off x="958716" y="2155803"/>
-            <a:ext cx="6373262" cy="2781958"/>
+            <a:ext cx="6373262" cy="3489988"/>
           </a:xfrm>
         </p:spPr>
         <p:txBody>

</xml_diff>